<commit_message>
Finished Hydraulic Design Updated BOM.xlsx with new parts
</commit_message>
<xml_diff>
--- a/Design/Subsystems/Hydraulic.pptx
+++ b/Design/Subsystems/Hydraulic.pptx
@@ -6,6 +6,7 @@
   </p:sldMasterIdLst>
   <p:sldIdLst>
     <p:sldId id="257" r:id="rId2"/>
+    <p:sldId id="258" r:id="rId3"/>
   </p:sldIdLst>
   <p:sldSz cx="9144000" cy="6858000" type="screen4x3"/>
   <p:notesSz cx="6858000" cy="9144000"/>
@@ -5328,8 +5329,170 @@
           <a:lstStyle/>
           <a:p>
             <a:r>
-              <a:rPr lang="en-US" smtClean="0"/>
+              <a:rPr lang="en-US" dirty="0" smtClean="0"/>
               <a:t>Pressure Relief</a:t>
+            </a:r>
+          </a:p>
+        </p:txBody>
+      </p:sp>
+      <p:grpSp>
+        <p:nvGrpSpPr>
+          <p:cNvPr id="139" name="Group 138"/>
+          <p:cNvGrpSpPr/>
+          <p:nvPr/>
+        </p:nvGrpSpPr>
+        <p:grpSpPr>
+          <a:xfrm>
+            <a:off x="4191000" y="4114800"/>
+            <a:ext cx="914400" cy="1260470"/>
+            <a:chOff x="4191000" y="4114800"/>
+            <a:chExt cx="914400" cy="1260470"/>
+          </a:xfrm>
+        </p:grpSpPr>
+        <p:sp>
+          <p:nvSpPr>
+            <p:cNvPr id="135" name="Diamond 134"/>
+            <p:cNvSpPr/>
+            <p:nvPr/>
+          </p:nvSpPr>
+          <p:spPr>
+            <a:xfrm>
+              <a:off x="4191000" y="4267200"/>
+              <a:ext cx="914400" cy="959919"/>
+            </a:xfrm>
+            <a:prstGeom prst="diamond">
+              <a:avLst/>
+            </a:prstGeom>
+            <a:solidFill>
+              <a:schemeClr val="bg1"/>
+            </a:solidFill>
+            <a:ln>
+              <a:solidFill>
+                <a:schemeClr val="tx1"/>
+              </a:solidFill>
+            </a:ln>
+          </p:spPr>
+          <p:style>
+            <a:lnRef idx="2">
+              <a:schemeClr val="accent1">
+                <a:shade val="50000"/>
+              </a:schemeClr>
+            </a:lnRef>
+            <a:fillRef idx="1">
+              <a:schemeClr val="accent1"/>
+            </a:fillRef>
+            <a:effectRef idx="0">
+              <a:schemeClr val="accent1"/>
+            </a:effectRef>
+            <a:fontRef idx="minor">
+              <a:schemeClr val="lt1"/>
+            </a:fontRef>
+          </p:style>
+          <p:txBody>
+            <a:bodyPr rtlCol="0" anchor="ctr"/>
+            <a:lstStyle/>
+            <a:p>
+              <a:pPr algn="ctr"/>
+              <a:endParaRPr lang="en-US"/>
+            </a:p>
+          </p:txBody>
+        </p:sp>
+        <p:cxnSp>
+          <p:nvCxnSpPr>
+            <p:cNvPr id="136" name="Straight Connector 135"/>
+            <p:cNvCxnSpPr/>
+            <p:nvPr/>
+          </p:nvCxnSpPr>
+          <p:spPr>
+            <a:xfrm flipV="1">
+              <a:off x="4648200" y="4114800"/>
+              <a:ext cx="0" cy="152400"/>
+            </a:xfrm>
+            <a:prstGeom prst="line">
+              <a:avLst/>
+            </a:prstGeom>
+            <a:ln w="38100">
+              <a:solidFill>
+                <a:schemeClr val="tx1"/>
+              </a:solidFill>
+            </a:ln>
+          </p:spPr>
+          <p:style>
+            <a:lnRef idx="1">
+              <a:schemeClr val="accent1"/>
+            </a:lnRef>
+            <a:fillRef idx="0">
+              <a:schemeClr val="accent1"/>
+            </a:fillRef>
+            <a:effectRef idx="0">
+              <a:schemeClr val="accent1"/>
+            </a:effectRef>
+            <a:fontRef idx="minor">
+              <a:schemeClr val="tx1"/>
+            </a:fontRef>
+          </p:style>
+        </p:cxnSp>
+        <p:cxnSp>
+          <p:nvCxnSpPr>
+            <p:cNvPr id="138" name="Straight Connector 137"/>
+            <p:cNvCxnSpPr/>
+            <p:nvPr/>
+          </p:nvCxnSpPr>
+          <p:spPr>
+            <a:xfrm flipV="1">
+              <a:off x="4648200" y="5222870"/>
+              <a:ext cx="0" cy="152400"/>
+            </a:xfrm>
+            <a:prstGeom prst="line">
+              <a:avLst/>
+            </a:prstGeom>
+            <a:ln w="38100">
+              <a:solidFill>
+                <a:schemeClr val="tx1"/>
+              </a:solidFill>
+            </a:ln>
+          </p:spPr>
+          <p:style>
+            <a:lnRef idx="1">
+              <a:schemeClr val="accent1"/>
+            </a:lnRef>
+            <a:fillRef idx="0">
+              <a:schemeClr val="accent1"/>
+            </a:fillRef>
+            <a:effectRef idx="0">
+              <a:schemeClr val="accent1"/>
+            </a:effectRef>
+            <a:fontRef idx="minor">
+              <a:schemeClr val="tx1"/>
+            </a:fontRef>
+          </p:style>
+        </p:cxnSp>
+      </p:grpSp>
+      <p:sp>
+        <p:nvSpPr>
+          <p:cNvPr id="140" name="TextBox 139"/>
+          <p:cNvSpPr txBox="1"/>
+          <p:nvPr/>
+        </p:nvSpPr>
+        <p:spPr>
+          <a:xfrm>
+            <a:off x="5235418" y="4578686"/>
+            <a:ext cx="989630" cy="369332"/>
+          </a:xfrm>
+          <a:prstGeom prst="rect">
+            <a:avLst/>
+          </a:prstGeom>
+          <a:noFill/>
+        </p:spPr>
+        <p:txBody>
+          <a:bodyPr wrap="none" rtlCol="0">
+            <a:spAutoFit/>
+          </a:bodyPr>
+          <a:lstStyle/>
+          <a:p>
+            <a:r>
+              <a:rPr lang="en-US" dirty="0" err="1" smtClean="0"/>
+              <a:t>Resivour</a:t>
             </a:r>
             <a:endParaRPr lang="en-US" dirty="0" smtClean="0"/>
           </a:p>
@@ -5339,6 +5502,2667 @@
     <p:extLst>
       <p:ext uri="{BB962C8B-B14F-4D97-AF65-F5344CB8AC3E}">
         <p14:creationId xmlns:p14="http://schemas.microsoft.com/office/powerpoint/2010/main" val="450404169"/>
+      </p:ext>
+    </p:extLst>
+  </p:cSld>
+  <p:clrMapOvr>
+    <a:masterClrMapping/>
+  </p:clrMapOvr>
+</p:sld>
+</file>
+
+<file path=ppt/slides/slide2.xml><?xml version="1.0" encoding="utf-8"?>
+<p:sld xmlns:a="http://schemas.openxmlformats.org/drawingml/2006/main" xmlns:r="http://schemas.openxmlformats.org/officeDocument/2006/relationships" xmlns:p="http://schemas.openxmlformats.org/presentationml/2006/main">
+  <p:cSld>
+    <p:spTree>
+      <p:nvGrpSpPr>
+        <p:cNvPr id="1" name=""/>
+        <p:cNvGrpSpPr/>
+        <p:nvPr/>
+      </p:nvGrpSpPr>
+      <p:grpSpPr>
+        <a:xfrm>
+          <a:off x="0" y="0"/>
+          <a:ext cx="0" cy="0"/>
+          <a:chOff x="0" y="0"/>
+          <a:chExt cx="0" cy="0"/>
+        </a:xfrm>
+      </p:grpSpPr>
+      <p:sp>
+        <p:nvSpPr>
+          <p:cNvPr id="2" name="Title 1"/>
+          <p:cNvSpPr>
+            <a:spLocks noGrp="1"/>
+          </p:cNvSpPr>
+          <p:nvPr>
+            <p:ph type="title"/>
+          </p:nvPr>
+        </p:nvSpPr>
+        <p:spPr>
+          <a:xfrm>
+            <a:off x="381000" y="83582"/>
+            <a:ext cx="8229600" cy="1143000"/>
+          </a:xfrm>
+        </p:spPr>
+        <p:txBody>
+          <a:bodyPr>
+            <a:normAutofit/>
+          </a:bodyPr>
+          <a:lstStyle/>
+          <a:p>
+            <a:r>
+              <a:rPr lang="en-US" dirty="0" smtClean="0"/>
+              <a:t>Hydraulic Subsyste</a:t>
+            </a:r>
+            <a:r>
+              <a:rPr lang="en-US" dirty="0"/>
+              <a:t>m</a:t>
+            </a:r>
+          </a:p>
+        </p:txBody>
+      </p:sp>
+      <p:sp>
+        <p:nvSpPr>
+          <p:cNvPr id="13" name="TextBox 12"/>
+          <p:cNvSpPr txBox="1"/>
+          <p:nvPr/>
+        </p:nvSpPr>
+        <p:spPr>
+          <a:xfrm>
+            <a:off x="507179" y="1526060"/>
+            <a:ext cx="771943" cy="369332"/>
+          </a:xfrm>
+          <a:prstGeom prst="rect">
+            <a:avLst/>
+          </a:prstGeom>
+          <a:noFill/>
+        </p:spPr>
+        <p:txBody>
+          <a:bodyPr wrap="none" rtlCol="0">
+            <a:spAutoFit/>
+          </a:bodyPr>
+          <a:lstStyle/>
+          <a:p>
+            <a:r>
+              <a:rPr lang="en-US" dirty="0" smtClean="0"/>
+              <a:t>½ NPT</a:t>
+            </a:r>
+          </a:p>
+        </p:txBody>
+      </p:sp>
+      <p:grpSp>
+        <p:nvGrpSpPr>
+          <p:cNvPr id="15" name="Group 14"/>
+          <p:cNvGrpSpPr/>
+          <p:nvPr/>
+        </p:nvGrpSpPr>
+        <p:grpSpPr>
+          <a:xfrm>
+            <a:off x="4914900" y="2377475"/>
+            <a:ext cx="685800" cy="990600"/>
+            <a:chOff x="1600200" y="1981200"/>
+            <a:chExt cx="685800" cy="990600"/>
+          </a:xfrm>
+        </p:grpSpPr>
+        <p:sp>
+          <p:nvSpPr>
+            <p:cNvPr id="4" name="Oval 3"/>
+            <p:cNvSpPr/>
+            <p:nvPr/>
+          </p:nvSpPr>
+          <p:spPr>
+            <a:xfrm>
+              <a:off x="1600200" y="2133600"/>
+              <a:ext cx="685800" cy="685800"/>
+            </a:xfrm>
+            <a:prstGeom prst="ellipse">
+              <a:avLst/>
+            </a:prstGeom>
+            <a:solidFill>
+              <a:schemeClr val="bg1"/>
+            </a:solidFill>
+            <a:ln>
+              <a:solidFill>
+                <a:schemeClr val="tx1"/>
+              </a:solidFill>
+            </a:ln>
+          </p:spPr>
+          <p:style>
+            <a:lnRef idx="2">
+              <a:schemeClr val="accent1">
+                <a:shade val="50000"/>
+              </a:schemeClr>
+            </a:lnRef>
+            <a:fillRef idx="1">
+              <a:schemeClr val="accent1"/>
+            </a:fillRef>
+            <a:effectRef idx="0">
+              <a:schemeClr val="accent1"/>
+            </a:effectRef>
+            <a:fontRef idx="minor">
+              <a:schemeClr val="lt1"/>
+            </a:fontRef>
+          </p:style>
+          <p:txBody>
+            <a:bodyPr rtlCol="0" anchor="ctr"/>
+            <a:lstStyle/>
+            <a:p>
+              <a:pPr algn="ctr"/>
+              <a:endParaRPr lang="en-US"/>
+            </a:p>
+          </p:txBody>
+        </p:sp>
+        <p:cxnSp>
+          <p:nvCxnSpPr>
+            <p:cNvPr id="6" name="Straight Connector 5"/>
+            <p:cNvCxnSpPr>
+              <a:stCxn id="4" idx="0"/>
+            </p:cNvCxnSpPr>
+            <p:nvPr/>
+          </p:nvCxnSpPr>
+          <p:spPr>
+            <a:xfrm flipV="1">
+              <a:off x="1943100" y="1981200"/>
+              <a:ext cx="0" cy="152400"/>
+            </a:xfrm>
+            <a:prstGeom prst="line">
+              <a:avLst/>
+            </a:prstGeom>
+            <a:ln w="38100">
+              <a:solidFill>
+                <a:srgbClr val="FF0000"/>
+              </a:solidFill>
+            </a:ln>
+          </p:spPr>
+          <p:style>
+            <a:lnRef idx="1">
+              <a:schemeClr val="accent1"/>
+            </a:lnRef>
+            <a:fillRef idx="0">
+              <a:schemeClr val="accent1"/>
+            </a:fillRef>
+            <a:effectRef idx="0">
+              <a:schemeClr val="accent1"/>
+            </a:effectRef>
+            <a:fontRef idx="minor">
+              <a:schemeClr val="tx1"/>
+            </a:fontRef>
+          </p:style>
+        </p:cxnSp>
+        <p:cxnSp>
+          <p:nvCxnSpPr>
+            <p:cNvPr id="9" name="Straight Connector 8"/>
+            <p:cNvCxnSpPr>
+              <a:endCxn id="4" idx="4"/>
+            </p:cNvCxnSpPr>
+            <p:nvPr/>
+          </p:nvCxnSpPr>
+          <p:spPr>
+            <a:xfrm flipV="1">
+              <a:off x="1943100" y="2819400"/>
+              <a:ext cx="0" cy="152400"/>
+            </a:xfrm>
+            <a:prstGeom prst="line">
+              <a:avLst/>
+            </a:prstGeom>
+            <a:ln w="38100">
+              <a:solidFill>
+                <a:srgbClr val="FF0000"/>
+              </a:solidFill>
+            </a:ln>
+          </p:spPr>
+          <p:style>
+            <a:lnRef idx="1">
+              <a:schemeClr val="accent1"/>
+            </a:lnRef>
+            <a:fillRef idx="0">
+              <a:schemeClr val="accent1"/>
+            </a:fillRef>
+            <a:effectRef idx="0">
+              <a:schemeClr val="accent1"/>
+            </a:effectRef>
+            <a:fontRef idx="minor">
+              <a:schemeClr val="tx1"/>
+            </a:fontRef>
+          </p:style>
+        </p:cxnSp>
+        <p:sp>
+          <p:nvSpPr>
+            <p:cNvPr id="14" name="Flowchart: Extract 13"/>
+            <p:cNvSpPr/>
+            <p:nvPr/>
+          </p:nvSpPr>
+          <p:spPr>
+            <a:xfrm>
+              <a:off x="1752600" y="2124558"/>
+              <a:ext cx="381000" cy="237641"/>
+            </a:xfrm>
+            <a:prstGeom prst="flowChartExtract">
+              <a:avLst/>
+            </a:prstGeom>
+            <a:solidFill>
+              <a:schemeClr val="tx1"/>
+            </a:solidFill>
+            <a:ln>
+              <a:solidFill>
+                <a:schemeClr val="tx1"/>
+              </a:solidFill>
+            </a:ln>
+          </p:spPr>
+          <p:style>
+            <a:lnRef idx="2">
+              <a:schemeClr val="accent1">
+                <a:shade val="50000"/>
+              </a:schemeClr>
+            </a:lnRef>
+            <a:fillRef idx="1">
+              <a:schemeClr val="accent1"/>
+            </a:fillRef>
+            <a:effectRef idx="0">
+              <a:schemeClr val="accent1"/>
+            </a:effectRef>
+            <a:fontRef idx="minor">
+              <a:schemeClr val="lt1"/>
+            </a:fontRef>
+          </p:style>
+          <p:txBody>
+            <a:bodyPr rtlCol="0" anchor="ctr"/>
+            <a:lstStyle/>
+            <a:p>
+              <a:pPr algn="ctr"/>
+              <a:endParaRPr lang="en-US"/>
+            </a:p>
+          </p:txBody>
+        </p:sp>
+      </p:grpSp>
+      <p:grpSp>
+        <p:nvGrpSpPr>
+          <p:cNvPr id="35" name="Group 34"/>
+          <p:cNvGrpSpPr/>
+          <p:nvPr/>
+        </p:nvGrpSpPr>
+        <p:grpSpPr>
+          <a:xfrm rot="5400000">
+            <a:off x="86181" y="3128705"/>
+            <a:ext cx="1524000" cy="609600"/>
+            <a:chOff x="1524000" y="3733800"/>
+            <a:chExt cx="1524000" cy="609600"/>
+          </a:xfrm>
+        </p:grpSpPr>
+        <p:sp>
+          <p:nvSpPr>
+            <p:cNvPr id="25" name="Rectangle 24"/>
+            <p:cNvSpPr/>
+            <p:nvPr/>
+          </p:nvSpPr>
+          <p:spPr>
+            <a:xfrm>
+              <a:off x="1524000" y="3886200"/>
+              <a:ext cx="1295400" cy="457200"/>
+            </a:xfrm>
+            <a:prstGeom prst="rect">
+              <a:avLst/>
+            </a:prstGeom>
+            <a:solidFill>
+              <a:schemeClr val="bg1"/>
+            </a:solidFill>
+            <a:ln>
+              <a:solidFill>
+                <a:schemeClr val="tx1"/>
+              </a:solidFill>
+            </a:ln>
+          </p:spPr>
+          <p:style>
+            <a:lnRef idx="2">
+              <a:schemeClr val="accent1">
+                <a:shade val="50000"/>
+              </a:schemeClr>
+            </a:lnRef>
+            <a:fillRef idx="1">
+              <a:schemeClr val="accent1"/>
+            </a:fillRef>
+            <a:effectRef idx="0">
+              <a:schemeClr val="accent1"/>
+            </a:effectRef>
+            <a:fontRef idx="minor">
+              <a:schemeClr val="lt1"/>
+            </a:fontRef>
+          </p:style>
+          <p:txBody>
+            <a:bodyPr rtlCol="0" anchor="ctr"/>
+            <a:lstStyle/>
+            <a:p>
+              <a:pPr algn="ctr"/>
+              <a:endParaRPr lang="en-US"/>
+            </a:p>
+          </p:txBody>
+        </p:sp>
+        <p:cxnSp>
+          <p:nvCxnSpPr>
+            <p:cNvPr id="26" name="Straight Connector 25"/>
+            <p:cNvCxnSpPr/>
+            <p:nvPr/>
+          </p:nvCxnSpPr>
+          <p:spPr>
+            <a:xfrm flipV="1">
+              <a:off x="2743200" y="3733800"/>
+              <a:ext cx="0" cy="152400"/>
+            </a:xfrm>
+            <a:prstGeom prst="line">
+              <a:avLst/>
+            </a:prstGeom>
+            <a:ln w="38100">
+              <a:solidFill>
+                <a:srgbClr val="00B0F0"/>
+              </a:solidFill>
+            </a:ln>
+          </p:spPr>
+          <p:style>
+            <a:lnRef idx="1">
+              <a:schemeClr val="accent1"/>
+            </a:lnRef>
+            <a:fillRef idx="0">
+              <a:schemeClr val="accent1"/>
+            </a:fillRef>
+            <a:effectRef idx="0">
+              <a:schemeClr val="accent1"/>
+            </a:effectRef>
+            <a:fontRef idx="minor">
+              <a:schemeClr val="tx1"/>
+            </a:fontRef>
+          </p:style>
+        </p:cxnSp>
+        <p:cxnSp>
+          <p:nvCxnSpPr>
+            <p:cNvPr id="27" name="Straight Connector 26"/>
+            <p:cNvCxnSpPr/>
+            <p:nvPr/>
+          </p:nvCxnSpPr>
+          <p:spPr>
+            <a:xfrm flipV="1">
+              <a:off x="1634425" y="3733800"/>
+              <a:ext cx="0" cy="152400"/>
+            </a:xfrm>
+            <a:prstGeom prst="line">
+              <a:avLst/>
+            </a:prstGeom>
+            <a:ln w="38100">
+              <a:solidFill>
+                <a:srgbClr val="00B0F0"/>
+              </a:solidFill>
+            </a:ln>
+          </p:spPr>
+          <p:style>
+            <a:lnRef idx="1">
+              <a:schemeClr val="accent1"/>
+            </a:lnRef>
+            <a:fillRef idx="0">
+              <a:schemeClr val="accent1"/>
+            </a:fillRef>
+            <a:effectRef idx="0">
+              <a:schemeClr val="accent1"/>
+            </a:effectRef>
+            <a:fontRef idx="minor">
+              <a:schemeClr val="tx1"/>
+            </a:fontRef>
+          </p:style>
+        </p:cxnSp>
+        <p:cxnSp>
+          <p:nvCxnSpPr>
+            <p:cNvPr id="28" name="Straight Connector 27"/>
+            <p:cNvCxnSpPr/>
+            <p:nvPr/>
+          </p:nvCxnSpPr>
+          <p:spPr>
+            <a:xfrm>
+              <a:off x="1946831" y="4114800"/>
+              <a:ext cx="1101169" cy="0"/>
+            </a:xfrm>
+            <a:prstGeom prst="line">
+              <a:avLst/>
+            </a:prstGeom>
+            <a:ln w="38100">
+              <a:solidFill>
+                <a:schemeClr val="tx1"/>
+              </a:solidFill>
+            </a:ln>
+          </p:spPr>
+          <p:style>
+            <a:lnRef idx="1">
+              <a:schemeClr val="accent1"/>
+            </a:lnRef>
+            <a:fillRef idx="0">
+              <a:schemeClr val="accent1"/>
+            </a:fillRef>
+            <a:effectRef idx="0">
+              <a:schemeClr val="accent1"/>
+            </a:effectRef>
+            <a:fontRef idx="minor">
+              <a:schemeClr val="tx1"/>
+            </a:fontRef>
+          </p:style>
+        </p:cxnSp>
+        <p:cxnSp>
+          <p:nvCxnSpPr>
+            <p:cNvPr id="30" name="Straight Connector 29"/>
+            <p:cNvCxnSpPr/>
+            <p:nvPr/>
+          </p:nvCxnSpPr>
+          <p:spPr>
+            <a:xfrm flipV="1">
+              <a:off x="1943100" y="3962400"/>
+              <a:ext cx="0" cy="304800"/>
+            </a:xfrm>
+            <a:prstGeom prst="line">
+              <a:avLst/>
+            </a:prstGeom>
+            <a:ln w="38100">
+              <a:solidFill>
+                <a:schemeClr val="tx1"/>
+              </a:solidFill>
+            </a:ln>
+          </p:spPr>
+          <p:style>
+            <a:lnRef idx="1">
+              <a:schemeClr val="accent1"/>
+            </a:lnRef>
+            <a:fillRef idx="0">
+              <a:schemeClr val="accent1"/>
+            </a:fillRef>
+            <a:effectRef idx="0">
+              <a:schemeClr val="accent1"/>
+            </a:effectRef>
+            <a:fontRef idx="minor">
+              <a:schemeClr val="tx1"/>
+            </a:fontRef>
+          </p:style>
+        </p:cxnSp>
+      </p:grpSp>
+      <p:sp>
+        <p:nvSpPr>
+          <p:cNvPr id="36" name="TextBox 35"/>
+          <p:cNvSpPr txBox="1"/>
+          <p:nvPr/>
+        </p:nvSpPr>
+        <p:spPr>
+          <a:xfrm>
+            <a:off x="1118929" y="2947799"/>
+            <a:ext cx="1098378" cy="261610"/>
+          </a:xfrm>
+          <a:prstGeom prst="rect">
+            <a:avLst/>
+          </a:prstGeom>
+          <a:noFill/>
+        </p:spPr>
+        <p:txBody>
+          <a:bodyPr wrap="none" rtlCol="0">
+            <a:spAutoFit/>
+          </a:bodyPr>
+          <a:lstStyle/>
+          <a:p>
+            <a:r>
+              <a:rPr lang="en-US" sz="1050" dirty="0" smtClean="0"/>
+              <a:t>Pressure Sensor</a:t>
+            </a:r>
+          </a:p>
+        </p:txBody>
+      </p:sp>
+      <p:grpSp>
+        <p:nvGrpSpPr>
+          <p:cNvPr id="71" name="Group 70"/>
+          <p:cNvGrpSpPr/>
+          <p:nvPr/>
+        </p:nvGrpSpPr>
+        <p:grpSpPr>
+          <a:xfrm rot="5400000">
+            <a:off x="2140158" y="2461488"/>
+            <a:ext cx="1828800" cy="1002742"/>
+            <a:chOff x="5181600" y="3897868"/>
+            <a:chExt cx="1828800" cy="1002742"/>
+          </a:xfrm>
+        </p:grpSpPr>
+        <p:sp>
+          <p:nvSpPr>
+            <p:cNvPr id="70" name="Oval 69"/>
+            <p:cNvSpPr/>
+            <p:nvPr/>
+          </p:nvSpPr>
+          <p:spPr>
+            <a:xfrm>
+              <a:off x="5334000" y="4133849"/>
+              <a:ext cx="114300" cy="114300"/>
+            </a:xfrm>
+            <a:prstGeom prst="ellipse">
+              <a:avLst/>
+            </a:prstGeom>
+            <a:solidFill>
+              <a:schemeClr val="bg1"/>
+            </a:solidFill>
+            <a:ln>
+              <a:solidFill>
+                <a:schemeClr val="tx1"/>
+              </a:solidFill>
+            </a:ln>
+          </p:spPr>
+          <p:style>
+            <a:lnRef idx="2">
+              <a:schemeClr val="accent1">
+                <a:shade val="50000"/>
+              </a:schemeClr>
+            </a:lnRef>
+            <a:fillRef idx="1">
+              <a:schemeClr val="accent1"/>
+            </a:fillRef>
+            <a:effectRef idx="0">
+              <a:schemeClr val="accent1"/>
+            </a:effectRef>
+            <a:fontRef idx="minor">
+              <a:schemeClr val="lt1"/>
+            </a:fontRef>
+          </p:style>
+          <p:txBody>
+            <a:bodyPr rtlCol="0" anchor="ctr"/>
+            <a:lstStyle/>
+            <a:p>
+              <a:pPr algn="ctr"/>
+              <a:endParaRPr lang="en-US"/>
+            </a:p>
+          </p:txBody>
+        </p:sp>
+        <p:sp>
+          <p:nvSpPr>
+            <p:cNvPr id="37" name="Rectangle 36"/>
+            <p:cNvSpPr/>
+            <p:nvPr/>
+          </p:nvSpPr>
+          <p:spPr>
+            <a:xfrm>
+              <a:off x="5638800" y="4114800"/>
+              <a:ext cx="1371600" cy="533400"/>
+            </a:xfrm>
+            <a:prstGeom prst="rect">
+              <a:avLst/>
+            </a:prstGeom>
+            <a:solidFill>
+              <a:schemeClr val="bg1"/>
+            </a:solidFill>
+            <a:ln>
+              <a:solidFill>
+                <a:schemeClr val="tx1"/>
+              </a:solidFill>
+            </a:ln>
+          </p:spPr>
+          <p:style>
+            <a:lnRef idx="2">
+              <a:schemeClr val="accent1">
+                <a:shade val="50000"/>
+              </a:schemeClr>
+            </a:lnRef>
+            <a:fillRef idx="1">
+              <a:schemeClr val="accent1"/>
+            </a:fillRef>
+            <a:effectRef idx="0">
+              <a:schemeClr val="accent1"/>
+            </a:effectRef>
+            <a:fontRef idx="minor">
+              <a:schemeClr val="lt1"/>
+            </a:fontRef>
+          </p:style>
+          <p:txBody>
+            <a:bodyPr rtlCol="0" anchor="ctr"/>
+            <a:lstStyle/>
+            <a:p>
+              <a:pPr algn="ctr"/>
+              <a:endParaRPr lang="en-US"/>
+            </a:p>
+          </p:txBody>
+        </p:sp>
+        <p:cxnSp>
+          <p:nvCxnSpPr>
+            <p:cNvPr id="38" name="Straight Connector 37"/>
+            <p:cNvCxnSpPr/>
+            <p:nvPr/>
+          </p:nvCxnSpPr>
+          <p:spPr>
+            <a:xfrm flipV="1">
+              <a:off x="6096000" y="4114801"/>
+              <a:ext cx="0" cy="533399"/>
+            </a:xfrm>
+            <a:prstGeom prst="line">
+              <a:avLst/>
+            </a:prstGeom>
+            <a:ln w="38100">
+              <a:solidFill>
+                <a:schemeClr val="tx1"/>
+              </a:solidFill>
+            </a:ln>
+          </p:spPr>
+          <p:style>
+            <a:lnRef idx="1">
+              <a:schemeClr val="accent1"/>
+            </a:lnRef>
+            <a:fillRef idx="0">
+              <a:schemeClr val="accent1"/>
+            </a:fillRef>
+            <a:effectRef idx="0">
+              <a:schemeClr val="accent1"/>
+            </a:effectRef>
+            <a:fontRef idx="minor">
+              <a:schemeClr val="tx1"/>
+            </a:fontRef>
+          </p:style>
+        </p:cxnSp>
+        <p:cxnSp>
+          <p:nvCxnSpPr>
+            <p:cNvPr id="41" name="Straight Connector 40"/>
+            <p:cNvCxnSpPr/>
+            <p:nvPr/>
+          </p:nvCxnSpPr>
+          <p:spPr>
+            <a:xfrm flipV="1">
+              <a:off x="6553200" y="4114800"/>
+              <a:ext cx="0" cy="533399"/>
+            </a:xfrm>
+            <a:prstGeom prst="line">
+              <a:avLst/>
+            </a:prstGeom>
+            <a:ln w="38100">
+              <a:solidFill>
+                <a:schemeClr val="tx1"/>
+              </a:solidFill>
+            </a:ln>
+          </p:spPr>
+          <p:style>
+            <a:lnRef idx="1">
+              <a:schemeClr val="accent1"/>
+            </a:lnRef>
+            <a:fillRef idx="0">
+              <a:schemeClr val="accent1"/>
+            </a:fillRef>
+            <a:effectRef idx="0">
+              <a:schemeClr val="accent1"/>
+            </a:effectRef>
+            <a:fontRef idx="minor">
+              <a:schemeClr val="tx1"/>
+            </a:fontRef>
+          </p:style>
+        </p:cxnSp>
+        <p:cxnSp>
+          <p:nvCxnSpPr>
+            <p:cNvPr id="43" name="Straight Connector 42"/>
+            <p:cNvCxnSpPr/>
+            <p:nvPr/>
+          </p:nvCxnSpPr>
+          <p:spPr>
+            <a:xfrm flipV="1">
+              <a:off x="6203156" y="3897868"/>
+              <a:ext cx="0" cy="331232"/>
+            </a:xfrm>
+            <a:prstGeom prst="line">
+              <a:avLst/>
+            </a:prstGeom>
+            <a:ln w="38100">
+              <a:solidFill>
+                <a:srgbClr val="FFC000"/>
+              </a:solidFill>
+            </a:ln>
+          </p:spPr>
+          <p:style>
+            <a:lnRef idx="1">
+              <a:schemeClr val="accent1"/>
+            </a:lnRef>
+            <a:fillRef idx="0">
+              <a:schemeClr val="accent1"/>
+            </a:fillRef>
+            <a:effectRef idx="0">
+              <a:schemeClr val="accent1"/>
+            </a:effectRef>
+            <a:fontRef idx="minor">
+              <a:schemeClr val="tx1"/>
+            </a:fontRef>
+          </p:style>
+        </p:cxnSp>
+        <p:cxnSp>
+          <p:nvCxnSpPr>
+            <p:cNvPr id="45" name="Straight Arrow Connector 44"/>
+            <p:cNvCxnSpPr/>
+            <p:nvPr/>
+          </p:nvCxnSpPr>
+          <p:spPr>
+            <a:xfrm flipV="1">
+              <a:off x="5786437" y="4114802"/>
+              <a:ext cx="0" cy="533399"/>
+            </a:xfrm>
+            <a:prstGeom prst="straightConnector1">
+              <a:avLst/>
+            </a:prstGeom>
+            <a:ln w="28575">
+              <a:solidFill>
+                <a:schemeClr val="tx1"/>
+              </a:solidFill>
+              <a:headEnd type="none"/>
+              <a:tailEnd type="triangle"/>
+            </a:ln>
+          </p:spPr>
+          <p:style>
+            <a:lnRef idx="1">
+              <a:schemeClr val="accent1"/>
+            </a:lnRef>
+            <a:fillRef idx="0">
+              <a:schemeClr val="accent1"/>
+            </a:fillRef>
+            <a:effectRef idx="0">
+              <a:schemeClr val="accent1"/>
+            </a:effectRef>
+            <a:fontRef idx="minor">
+              <a:schemeClr val="tx1"/>
+            </a:fontRef>
+          </p:style>
+        </p:cxnSp>
+        <p:cxnSp>
+          <p:nvCxnSpPr>
+            <p:cNvPr id="46" name="Straight Arrow Connector 45"/>
+            <p:cNvCxnSpPr/>
+            <p:nvPr/>
+          </p:nvCxnSpPr>
+          <p:spPr>
+            <a:xfrm flipV="1">
+              <a:off x="5943600" y="4114801"/>
+              <a:ext cx="0" cy="533399"/>
+            </a:xfrm>
+            <a:prstGeom prst="straightConnector1">
+              <a:avLst/>
+            </a:prstGeom>
+            <a:ln w="28575">
+              <a:solidFill>
+                <a:schemeClr val="tx1"/>
+              </a:solidFill>
+              <a:headEnd type="none"/>
+              <a:tailEnd type="triangle"/>
+            </a:ln>
+          </p:spPr>
+          <p:style>
+            <a:lnRef idx="1">
+              <a:schemeClr val="accent1"/>
+            </a:lnRef>
+            <a:fillRef idx="0">
+              <a:schemeClr val="accent1"/>
+            </a:fillRef>
+            <a:effectRef idx="0">
+              <a:schemeClr val="accent1"/>
+            </a:effectRef>
+            <a:fontRef idx="minor">
+              <a:schemeClr val="tx1"/>
+            </a:fontRef>
+          </p:style>
+        </p:cxnSp>
+        <p:cxnSp>
+          <p:nvCxnSpPr>
+            <p:cNvPr id="47" name="Straight Arrow Connector 46"/>
+            <p:cNvCxnSpPr/>
+            <p:nvPr/>
+          </p:nvCxnSpPr>
+          <p:spPr>
+            <a:xfrm flipV="1">
+              <a:off x="6705600" y="4114800"/>
+              <a:ext cx="152400" cy="533399"/>
+            </a:xfrm>
+            <a:prstGeom prst="straightConnector1">
+              <a:avLst/>
+            </a:prstGeom>
+            <a:ln w="28575">
+              <a:solidFill>
+                <a:schemeClr val="tx1"/>
+              </a:solidFill>
+              <a:headEnd type="none"/>
+              <a:tailEnd type="triangle"/>
+            </a:ln>
+          </p:spPr>
+          <p:style>
+            <a:lnRef idx="1">
+              <a:schemeClr val="accent1"/>
+            </a:lnRef>
+            <a:fillRef idx="0">
+              <a:schemeClr val="accent1"/>
+            </a:fillRef>
+            <a:effectRef idx="0">
+              <a:schemeClr val="accent1"/>
+            </a:effectRef>
+            <a:fontRef idx="minor">
+              <a:schemeClr val="tx1"/>
+            </a:fontRef>
+          </p:style>
+        </p:cxnSp>
+        <p:cxnSp>
+          <p:nvCxnSpPr>
+            <p:cNvPr id="48" name="Straight Arrow Connector 47"/>
+            <p:cNvCxnSpPr/>
+            <p:nvPr/>
+          </p:nvCxnSpPr>
+          <p:spPr>
+            <a:xfrm flipH="1" flipV="1">
+              <a:off x="6705600" y="4114799"/>
+              <a:ext cx="152400" cy="533402"/>
+            </a:xfrm>
+            <a:prstGeom prst="straightConnector1">
+              <a:avLst/>
+            </a:prstGeom>
+            <a:ln w="28575">
+              <a:solidFill>
+                <a:schemeClr val="tx1"/>
+              </a:solidFill>
+              <a:headEnd type="none"/>
+              <a:tailEnd type="triangle"/>
+            </a:ln>
+          </p:spPr>
+          <p:style>
+            <a:lnRef idx="1">
+              <a:schemeClr val="accent1"/>
+            </a:lnRef>
+            <a:fillRef idx="0">
+              <a:schemeClr val="accent1"/>
+            </a:fillRef>
+            <a:effectRef idx="0">
+              <a:schemeClr val="accent1"/>
+            </a:effectRef>
+            <a:fontRef idx="minor">
+              <a:schemeClr val="tx1"/>
+            </a:fontRef>
+          </p:style>
+        </p:cxnSp>
+        <p:cxnSp>
+          <p:nvCxnSpPr>
+            <p:cNvPr id="52" name="Straight Connector 51"/>
+            <p:cNvCxnSpPr/>
+            <p:nvPr/>
+          </p:nvCxnSpPr>
+          <p:spPr>
+            <a:xfrm flipV="1">
+              <a:off x="6431573" y="3897868"/>
+              <a:ext cx="0" cy="331232"/>
+            </a:xfrm>
+            <a:prstGeom prst="line">
+              <a:avLst/>
+            </a:prstGeom>
+            <a:ln w="38100">
+              <a:solidFill>
+                <a:srgbClr val="FFC000"/>
+              </a:solidFill>
+            </a:ln>
+          </p:spPr>
+          <p:style>
+            <a:lnRef idx="1">
+              <a:schemeClr val="accent1"/>
+            </a:lnRef>
+            <a:fillRef idx="0">
+              <a:schemeClr val="accent1"/>
+            </a:fillRef>
+            <a:effectRef idx="0">
+              <a:schemeClr val="accent1"/>
+            </a:effectRef>
+            <a:fontRef idx="minor">
+              <a:schemeClr val="tx1"/>
+            </a:fontRef>
+          </p:style>
+        </p:cxnSp>
+        <p:cxnSp>
+          <p:nvCxnSpPr>
+            <p:cNvPr id="53" name="Straight Connector 52"/>
+            <p:cNvCxnSpPr/>
+            <p:nvPr/>
+          </p:nvCxnSpPr>
+          <p:spPr>
+            <a:xfrm flipV="1">
+              <a:off x="6426810" y="4569378"/>
+              <a:ext cx="0" cy="331232"/>
+            </a:xfrm>
+            <a:prstGeom prst="line">
+              <a:avLst/>
+            </a:prstGeom>
+            <a:ln w="38100">
+              <a:solidFill>
+                <a:srgbClr val="00B0F0"/>
+              </a:solidFill>
+            </a:ln>
+          </p:spPr>
+          <p:style>
+            <a:lnRef idx="1">
+              <a:schemeClr val="accent1"/>
+            </a:lnRef>
+            <a:fillRef idx="0">
+              <a:schemeClr val="accent1"/>
+            </a:fillRef>
+            <a:effectRef idx="0">
+              <a:schemeClr val="accent1"/>
+            </a:effectRef>
+            <a:fontRef idx="minor">
+              <a:schemeClr val="tx1"/>
+            </a:fontRef>
+          </p:style>
+        </p:cxnSp>
+        <p:cxnSp>
+          <p:nvCxnSpPr>
+            <p:cNvPr id="54" name="Straight Connector 53"/>
+            <p:cNvCxnSpPr/>
+            <p:nvPr/>
+          </p:nvCxnSpPr>
+          <p:spPr>
+            <a:xfrm flipV="1">
+              <a:off x="6203156" y="4569378"/>
+              <a:ext cx="0" cy="331232"/>
+            </a:xfrm>
+            <a:prstGeom prst="line">
+              <a:avLst/>
+            </a:prstGeom>
+            <a:ln w="38100">
+              <a:solidFill>
+                <a:srgbClr val="00B0F0"/>
+              </a:solidFill>
+            </a:ln>
+          </p:spPr>
+          <p:style>
+            <a:lnRef idx="1">
+              <a:schemeClr val="accent1"/>
+            </a:lnRef>
+            <a:fillRef idx="0">
+              <a:schemeClr val="accent1"/>
+            </a:fillRef>
+            <a:effectRef idx="0">
+              <a:schemeClr val="accent1"/>
+            </a:effectRef>
+            <a:fontRef idx="minor">
+              <a:schemeClr val="tx1"/>
+            </a:fontRef>
+          </p:style>
+        </p:cxnSp>
+        <p:cxnSp>
+          <p:nvCxnSpPr>
+            <p:cNvPr id="55" name="Straight Connector 54"/>
+            <p:cNvCxnSpPr/>
+            <p:nvPr/>
+          </p:nvCxnSpPr>
+          <p:spPr>
+            <a:xfrm flipH="1">
+              <a:off x="6393473" y="4229100"/>
+              <a:ext cx="76200" cy="0"/>
+            </a:xfrm>
+            <a:prstGeom prst="line">
+              <a:avLst/>
+            </a:prstGeom>
+            <a:ln w="38100">
+              <a:solidFill>
+                <a:schemeClr val="tx1"/>
+              </a:solidFill>
+            </a:ln>
+          </p:spPr>
+          <p:style>
+            <a:lnRef idx="1">
+              <a:schemeClr val="accent1"/>
+            </a:lnRef>
+            <a:fillRef idx="0">
+              <a:schemeClr val="accent1"/>
+            </a:fillRef>
+            <a:effectRef idx="0">
+              <a:schemeClr val="accent1"/>
+            </a:effectRef>
+            <a:fontRef idx="minor">
+              <a:schemeClr val="tx1"/>
+            </a:fontRef>
+          </p:style>
+        </p:cxnSp>
+        <p:cxnSp>
+          <p:nvCxnSpPr>
+            <p:cNvPr id="57" name="Straight Connector 56"/>
+            <p:cNvCxnSpPr/>
+            <p:nvPr/>
+          </p:nvCxnSpPr>
+          <p:spPr>
+            <a:xfrm flipH="1">
+              <a:off x="6165056" y="4231481"/>
+              <a:ext cx="76200" cy="0"/>
+            </a:xfrm>
+            <a:prstGeom prst="line">
+              <a:avLst/>
+            </a:prstGeom>
+            <a:ln w="38100">
+              <a:solidFill>
+                <a:schemeClr val="tx1"/>
+              </a:solidFill>
+            </a:ln>
+          </p:spPr>
+          <p:style>
+            <a:lnRef idx="1">
+              <a:schemeClr val="accent1"/>
+            </a:lnRef>
+            <a:fillRef idx="0">
+              <a:schemeClr val="accent1"/>
+            </a:fillRef>
+            <a:effectRef idx="0">
+              <a:schemeClr val="accent1"/>
+            </a:effectRef>
+            <a:fontRef idx="minor">
+              <a:schemeClr val="tx1"/>
+            </a:fontRef>
+          </p:style>
+        </p:cxnSp>
+        <p:cxnSp>
+          <p:nvCxnSpPr>
+            <p:cNvPr id="58" name="Straight Connector 57"/>
+            <p:cNvCxnSpPr/>
+            <p:nvPr/>
+          </p:nvCxnSpPr>
+          <p:spPr>
+            <a:xfrm flipH="1">
+              <a:off x="6388710" y="4569378"/>
+              <a:ext cx="76200" cy="0"/>
+            </a:xfrm>
+            <a:prstGeom prst="line">
+              <a:avLst/>
+            </a:prstGeom>
+            <a:ln w="38100">
+              <a:solidFill>
+                <a:schemeClr val="tx1"/>
+              </a:solidFill>
+            </a:ln>
+          </p:spPr>
+          <p:style>
+            <a:lnRef idx="1">
+              <a:schemeClr val="accent1"/>
+            </a:lnRef>
+            <a:fillRef idx="0">
+              <a:schemeClr val="accent1"/>
+            </a:fillRef>
+            <a:effectRef idx="0">
+              <a:schemeClr val="accent1"/>
+            </a:effectRef>
+            <a:fontRef idx="minor">
+              <a:schemeClr val="tx1"/>
+            </a:fontRef>
+          </p:style>
+        </p:cxnSp>
+        <p:cxnSp>
+          <p:nvCxnSpPr>
+            <p:cNvPr id="59" name="Straight Connector 58"/>
+            <p:cNvCxnSpPr/>
+            <p:nvPr/>
+          </p:nvCxnSpPr>
+          <p:spPr>
+            <a:xfrm flipH="1">
+              <a:off x="6165056" y="4569378"/>
+              <a:ext cx="76200" cy="0"/>
+            </a:xfrm>
+            <a:prstGeom prst="line">
+              <a:avLst/>
+            </a:prstGeom>
+            <a:ln w="38100">
+              <a:solidFill>
+                <a:schemeClr val="tx1"/>
+              </a:solidFill>
+            </a:ln>
+          </p:spPr>
+          <p:style>
+            <a:lnRef idx="1">
+              <a:schemeClr val="accent1"/>
+            </a:lnRef>
+            <a:fillRef idx="0">
+              <a:schemeClr val="accent1"/>
+            </a:fillRef>
+            <a:effectRef idx="0">
+              <a:schemeClr val="accent1"/>
+            </a:effectRef>
+            <a:fontRef idx="minor">
+              <a:schemeClr val="tx1"/>
+            </a:fontRef>
+          </p:style>
+        </p:cxnSp>
+        <p:cxnSp>
+          <p:nvCxnSpPr>
+            <p:cNvPr id="60" name="Straight Connector 59"/>
+            <p:cNvCxnSpPr/>
+            <p:nvPr/>
+          </p:nvCxnSpPr>
+          <p:spPr>
+            <a:xfrm flipH="1">
+              <a:off x="5334000" y="4340778"/>
+              <a:ext cx="304800" cy="0"/>
+            </a:xfrm>
+            <a:prstGeom prst="line">
+              <a:avLst/>
+            </a:prstGeom>
+            <a:ln w="25400">
+              <a:solidFill>
+                <a:schemeClr val="tx1"/>
+              </a:solidFill>
+            </a:ln>
+          </p:spPr>
+          <p:style>
+            <a:lnRef idx="1">
+              <a:schemeClr val="accent1"/>
+            </a:lnRef>
+            <a:fillRef idx="0">
+              <a:schemeClr val="accent1"/>
+            </a:fillRef>
+            <a:effectRef idx="0">
+              <a:schemeClr val="accent1"/>
+            </a:effectRef>
+            <a:fontRef idx="minor">
+              <a:schemeClr val="tx1"/>
+            </a:fontRef>
+          </p:style>
+        </p:cxnSp>
+        <p:cxnSp>
+          <p:nvCxnSpPr>
+            <p:cNvPr id="63" name="Straight Connector 62"/>
+            <p:cNvCxnSpPr/>
+            <p:nvPr/>
+          </p:nvCxnSpPr>
+          <p:spPr>
+            <a:xfrm flipH="1">
+              <a:off x="5257800" y="4493178"/>
+              <a:ext cx="376783" cy="0"/>
+            </a:xfrm>
+            <a:prstGeom prst="line">
+              <a:avLst/>
+            </a:prstGeom>
+            <a:ln w="25400">
+              <a:solidFill>
+                <a:schemeClr val="tx1"/>
+              </a:solidFill>
+            </a:ln>
+          </p:spPr>
+          <p:style>
+            <a:lnRef idx="1">
+              <a:schemeClr val="accent1"/>
+            </a:lnRef>
+            <a:fillRef idx="0">
+              <a:schemeClr val="accent1"/>
+            </a:fillRef>
+            <a:effectRef idx="0">
+              <a:schemeClr val="accent1"/>
+            </a:effectRef>
+            <a:fontRef idx="minor">
+              <a:schemeClr val="tx1"/>
+            </a:fontRef>
+          </p:style>
+        </p:cxnSp>
+        <p:cxnSp>
+          <p:nvCxnSpPr>
+            <p:cNvPr id="65" name="Straight Connector 64"/>
+            <p:cNvCxnSpPr/>
+            <p:nvPr/>
+          </p:nvCxnSpPr>
+          <p:spPr>
+            <a:xfrm flipH="1">
+              <a:off x="5181600" y="4229100"/>
+              <a:ext cx="195810" cy="419099"/>
+            </a:xfrm>
+            <a:prstGeom prst="line">
+              <a:avLst/>
+            </a:prstGeom>
+            <a:ln w="25400">
+              <a:solidFill>
+                <a:schemeClr val="tx1"/>
+              </a:solidFill>
+            </a:ln>
+          </p:spPr>
+          <p:style>
+            <a:lnRef idx="1">
+              <a:schemeClr val="accent1"/>
+            </a:lnRef>
+            <a:fillRef idx="0">
+              <a:schemeClr val="accent1"/>
+            </a:fillRef>
+            <a:effectRef idx="0">
+              <a:schemeClr val="accent1"/>
+            </a:effectRef>
+            <a:fontRef idx="minor">
+              <a:schemeClr val="tx1"/>
+            </a:fontRef>
+          </p:style>
+        </p:cxnSp>
+      </p:grpSp>
+      <p:cxnSp>
+        <p:nvCxnSpPr>
+          <p:cNvPr id="67" name="Straight Connector 66"/>
+          <p:cNvCxnSpPr/>
+          <p:nvPr/>
+        </p:nvCxnSpPr>
+        <p:spPr>
+          <a:xfrm flipV="1">
+            <a:off x="284473" y="1545110"/>
+            <a:ext cx="0" cy="331232"/>
+          </a:xfrm>
+          <a:prstGeom prst="line">
+            <a:avLst/>
+          </a:prstGeom>
+          <a:ln w="38100">
+            <a:solidFill>
+              <a:srgbClr val="00B0F0"/>
+            </a:solidFill>
+          </a:ln>
+        </p:spPr>
+        <p:style>
+          <a:lnRef idx="1">
+            <a:schemeClr val="accent1"/>
+          </a:lnRef>
+          <a:fillRef idx="0">
+            <a:schemeClr val="accent1"/>
+          </a:fillRef>
+          <a:effectRef idx="0">
+            <a:schemeClr val="accent1"/>
+          </a:effectRef>
+          <a:fontRef idx="minor">
+            <a:schemeClr val="tx1"/>
+          </a:fontRef>
+        </p:style>
+      </p:cxnSp>
+      <p:cxnSp>
+        <p:nvCxnSpPr>
+          <p:cNvPr id="68" name="Straight Connector 67"/>
+          <p:cNvCxnSpPr/>
+          <p:nvPr/>
+        </p:nvCxnSpPr>
+        <p:spPr>
+          <a:xfrm flipH="1">
+            <a:off x="1118929" y="2781930"/>
+            <a:ext cx="1471871" cy="0"/>
+          </a:xfrm>
+          <a:prstGeom prst="line">
+            <a:avLst/>
+          </a:prstGeom>
+          <a:ln w="38100">
+            <a:solidFill>
+              <a:srgbClr val="00B0F0"/>
+            </a:solidFill>
+          </a:ln>
+        </p:spPr>
+        <p:style>
+          <a:lnRef idx="1">
+            <a:schemeClr val="accent1"/>
+          </a:lnRef>
+          <a:fillRef idx="0">
+            <a:schemeClr val="accent1"/>
+          </a:fillRef>
+          <a:effectRef idx="0">
+            <a:schemeClr val="accent1"/>
+          </a:effectRef>
+          <a:fontRef idx="minor">
+            <a:schemeClr val="tx1"/>
+          </a:fontRef>
+        </p:style>
+      </p:cxnSp>
+      <p:sp>
+        <p:nvSpPr>
+          <p:cNvPr id="75" name="TextBox 74"/>
+          <p:cNvSpPr txBox="1"/>
+          <p:nvPr/>
+        </p:nvSpPr>
+        <p:spPr>
+          <a:xfrm>
+            <a:off x="507179" y="1895392"/>
+            <a:ext cx="763927" cy="369332"/>
+          </a:xfrm>
+          <a:prstGeom prst="rect">
+            <a:avLst/>
+          </a:prstGeom>
+          <a:noFill/>
+        </p:spPr>
+        <p:txBody>
+          <a:bodyPr wrap="none" rtlCol="0">
+            <a:spAutoFit/>
+          </a:bodyPr>
+          <a:lstStyle/>
+          <a:p>
+            <a:r>
+              <a:rPr lang="en-US" dirty="0" smtClean="0"/>
+              <a:t>¼ NPT</a:t>
+            </a:r>
+          </a:p>
+        </p:txBody>
+      </p:sp>
+      <p:cxnSp>
+        <p:nvCxnSpPr>
+          <p:cNvPr id="76" name="Straight Connector 75"/>
+          <p:cNvCxnSpPr/>
+          <p:nvPr/>
+        </p:nvCxnSpPr>
+        <p:spPr>
+          <a:xfrm flipV="1">
+            <a:off x="284473" y="1914442"/>
+            <a:ext cx="0" cy="331232"/>
+          </a:xfrm>
+          <a:prstGeom prst="line">
+            <a:avLst/>
+          </a:prstGeom>
+          <a:ln w="38100">
+            <a:solidFill>
+              <a:srgbClr val="00B050"/>
+            </a:solidFill>
+          </a:ln>
+        </p:spPr>
+        <p:style>
+          <a:lnRef idx="1">
+            <a:schemeClr val="accent1"/>
+          </a:lnRef>
+          <a:fillRef idx="0">
+            <a:schemeClr val="accent1"/>
+          </a:fillRef>
+          <a:effectRef idx="0">
+            <a:schemeClr val="accent1"/>
+          </a:effectRef>
+          <a:fontRef idx="minor">
+            <a:schemeClr val="tx1"/>
+          </a:fontRef>
+        </p:style>
+      </p:cxnSp>
+      <p:cxnSp>
+        <p:nvCxnSpPr>
+          <p:cNvPr id="78" name="Straight Connector 77"/>
+          <p:cNvCxnSpPr/>
+          <p:nvPr/>
+        </p:nvCxnSpPr>
+        <p:spPr>
+          <a:xfrm flipV="1">
+            <a:off x="1524000" y="2773751"/>
+            <a:ext cx="0" cy="198049"/>
+          </a:xfrm>
+          <a:prstGeom prst="line">
+            <a:avLst/>
+          </a:prstGeom>
+          <a:ln w="38100">
+            <a:solidFill>
+              <a:srgbClr val="00B050"/>
+            </a:solidFill>
+          </a:ln>
+        </p:spPr>
+        <p:style>
+          <a:lnRef idx="1">
+            <a:schemeClr val="accent1"/>
+          </a:lnRef>
+          <a:fillRef idx="0">
+            <a:schemeClr val="accent1"/>
+          </a:fillRef>
+          <a:effectRef idx="0">
+            <a:schemeClr val="accent1"/>
+          </a:effectRef>
+          <a:fontRef idx="minor">
+            <a:schemeClr val="tx1"/>
+          </a:fontRef>
+        </p:style>
+      </p:cxnSp>
+      <p:cxnSp>
+        <p:nvCxnSpPr>
+          <p:cNvPr id="79" name="Straight Connector 78"/>
+          <p:cNvCxnSpPr/>
+          <p:nvPr/>
+        </p:nvCxnSpPr>
+        <p:spPr>
+          <a:xfrm flipH="1">
+            <a:off x="1118930" y="3886200"/>
+            <a:ext cx="1471870" cy="4505"/>
+          </a:xfrm>
+          <a:prstGeom prst="line">
+            <a:avLst/>
+          </a:prstGeom>
+          <a:ln w="38100">
+            <a:solidFill>
+              <a:srgbClr val="00B0F0"/>
+            </a:solidFill>
+          </a:ln>
+        </p:spPr>
+        <p:style>
+          <a:lnRef idx="1">
+            <a:schemeClr val="accent1"/>
+          </a:lnRef>
+          <a:fillRef idx="0">
+            <a:schemeClr val="accent1"/>
+          </a:fillRef>
+          <a:effectRef idx="0">
+            <a:schemeClr val="accent1"/>
+          </a:effectRef>
+          <a:fontRef idx="minor">
+            <a:schemeClr val="tx1"/>
+          </a:fontRef>
+        </p:style>
+      </p:cxnSp>
+      <p:cxnSp>
+        <p:nvCxnSpPr>
+          <p:cNvPr id="84" name="Straight Connector 83"/>
+          <p:cNvCxnSpPr/>
+          <p:nvPr/>
+        </p:nvCxnSpPr>
+        <p:spPr>
+          <a:xfrm flipV="1">
+            <a:off x="2572436" y="2773751"/>
+            <a:ext cx="0" cy="296264"/>
+          </a:xfrm>
+          <a:prstGeom prst="line">
+            <a:avLst/>
+          </a:prstGeom>
+          <a:ln w="38100">
+            <a:solidFill>
+              <a:srgbClr val="00B0F0"/>
+            </a:solidFill>
+          </a:ln>
+        </p:spPr>
+        <p:style>
+          <a:lnRef idx="1">
+            <a:schemeClr val="accent1"/>
+          </a:lnRef>
+          <a:fillRef idx="0">
+            <a:schemeClr val="accent1"/>
+          </a:fillRef>
+          <a:effectRef idx="0">
+            <a:schemeClr val="accent1"/>
+          </a:effectRef>
+          <a:fontRef idx="minor">
+            <a:schemeClr val="tx1"/>
+          </a:fontRef>
+        </p:style>
+      </p:cxnSp>
+      <p:cxnSp>
+        <p:nvCxnSpPr>
+          <p:cNvPr id="87" name="Straight Connector 86"/>
+          <p:cNvCxnSpPr/>
+          <p:nvPr/>
+        </p:nvCxnSpPr>
+        <p:spPr>
+          <a:xfrm flipV="1">
+            <a:off x="2572436" y="3271928"/>
+            <a:ext cx="0" cy="618777"/>
+          </a:xfrm>
+          <a:prstGeom prst="line">
+            <a:avLst/>
+          </a:prstGeom>
+          <a:ln w="38100">
+            <a:solidFill>
+              <a:srgbClr val="00B0F0"/>
+            </a:solidFill>
+          </a:ln>
+        </p:spPr>
+        <p:style>
+          <a:lnRef idx="1">
+            <a:schemeClr val="accent1"/>
+          </a:lnRef>
+          <a:fillRef idx="0">
+            <a:schemeClr val="accent1"/>
+          </a:fillRef>
+          <a:effectRef idx="0">
+            <a:schemeClr val="accent1"/>
+          </a:effectRef>
+          <a:fontRef idx="minor">
+            <a:schemeClr val="tx1"/>
+          </a:fontRef>
+        </p:style>
+      </p:cxnSp>
+      <p:cxnSp>
+        <p:nvCxnSpPr>
+          <p:cNvPr id="93" name="Straight Connector 92"/>
+          <p:cNvCxnSpPr/>
+          <p:nvPr/>
+        </p:nvCxnSpPr>
+        <p:spPr>
+          <a:xfrm>
+            <a:off x="3555929" y="1545110"/>
+            <a:ext cx="0" cy="1545495"/>
+          </a:xfrm>
+          <a:prstGeom prst="line">
+            <a:avLst/>
+          </a:prstGeom>
+          <a:ln w="38100">
+            <a:solidFill>
+              <a:srgbClr val="FFC000"/>
+            </a:solidFill>
+          </a:ln>
+        </p:spPr>
+        <p:style>
+          <a:lnRef idx="1">
+            <a:schemeClr val="accent1"/>
+          </a:lnRef>
+          <a:fillRef idx="0">
+            <a:schemeClr val="accent1"/>
+          </a:fillRef>
+          <a:effectRef idx="0">
+            <a:schemeClr val="accent1"/>
+          </a:effectRef>
+          <a:fontRef idx="minor">
+            <a:schemeClr val="tx1"/>
+          </a:fontRef>
+        </p:style>
+      </p:cxnSp>
+      <p:cxnSp>
+        <p:nvCxnSpPr>
+          <p:cNvPr id="94" name="Straight Connector 93"/>
+          <p:cNvCxnSpPr/>
+          <p:nvPr/>
+        </p:nvCxnSpPr>
+        <p:spPr>
+          <a:xfrm flipH="1">
+            <a:off x="3538537" y="1545110"/>
+            <a:ext cx="1719263" cy="0"/>
+          </a:xfrm>
+          <a:prstGeom prst="line">
+            <a:avLst/>
+          </a:prstGeom>
+          <a:ln w="38100">
+            <a:solidFill>
+              <a:srgbClr val="FFC000"/>
+            </a:solidFill>
+          </a:ln>
+        </p:spPr>
+        <p:style>
+          <a:lnRef idx="1">
+            <a:schemeClr val="accent1"/>
+          </a:lnRef>
+          <a:fillRef idx="0">
+            <a:schemeClr val="accent1"/>
+          </a:fillRef>
+          <a:effectRef idx="0">
+            <a:schemeClr val="accent1"/>
+          </a:effectRef>
+          <a:fontRef idx="minor">
+            <a:schemeClr val="tx1"/>
+          </a:fontRef>
+        </p:style>
+      </p:cxnSp>
+      <p:grpSp>
+        <p:nvGrpSpPr>
+          <p:cNvPr id="99" name="Group 98"/>
+          <p:cNvGrpSpPr/>
+          <p:nvPr/>
+        </p:nvGrpSpPr>
+        <p:grpSpPr>
+          <a:xfrm>
+            <a:off x="3657600" y="3615321"/>
+            <a:ext cx="914400" cy="1260470"/>
+            <a:chOff x="4191000" y="4114800"/>
+            <a:chExt cx="914400" cy="1260470"/>
+          </a:xfrm>
+        </p:grpSpPr>
+        <p:sp>
+          <p:nvSpPr>
+            <p:cNvPr id="100" name="Diamond 99"/>
+            <p:cNvSpPr/>
+            <p:nvPr/>
+          </p:nvSpPr>
+          <p:spPr>
+            <a:xfrm>
+              <a:off x="4191000" y="4267200"/>
+              <a:ext cx="914400" cy="959919"/>
+            </a:xfrm>
+            <a:prstGeom prst="diamond">
+              <a:avLst/>
+            </a:prstGeom>
+            <a:solidFill>
+              <a:schemeClr val="bg1"/>
+            </a:solidFill>
+            <a:ln>
+              <a:solidFill>
+                <a:schemeClr val="tx1"/>
+              </a:solidFill>
+            </a:ln>
+          </p:spPr>
+          <p:style>
+            <a:lnRef idx="2">
+              <a:schemeClr val="accent1">
+                <a:shade val="50000"/>
+              </a:schemeClr>
+            </a:lnRef>
+            <a:fillRef idx="1">
+              <a:schemeClr val="accent1"/>
+            </a:fillRef>
+            <a:effectRef idx="0">
+              <a:schemeClr val="accent1"/>
+            </a:effectRef>
+            <a:fontRef idx="minor">
+              <a:schemeClr val="lt1"/>
+            </a:fontRef>
+          </p:style>
+          <p:txBody>
+            <a:bodyPr rtlCol="0" anchor="ctr"/>
+            <a:lstStyle/>
+            <a:p>
+              <a:pPr algn="ctr"/>
+              <a:endParaRPr lang="en-US"/>
+            </a:p>
+          </p:txBody>
+        </p:sp>
+        <p:cxnSp>
+          <p:nvCxnSpPr>
+            <p:cNvPr id="101" name="Straight Connector 100"/>
+            <p:cNvCxnSpPr/>
+            <p:nvPr/>
+          </p:nvCxnSpPr>
+          <p:spPr>
+            <a:xfrm flipV="1">
+              <a:off x="4648200" y="4114800"/>
+              <a:ext cx="0" cy="152400"/>
+            </a:xfrm>
+            <a:prstGeom prst="line">
+              <a:avLst/>
+            </a:prstGeom>
+            <a:ln w="38100">
+              <a:solidFill>
+                <a:srgbClr val="FFC000"/>
+              </a:solidFill>
+            </a:ln>
+          </p:spPr>
+          <p:style>
+            <a:lnRef idx="1">
+              <a:schemeClr val="accent1"/>
+            </a:lnRef>
+            <a:fillRef idx="0">
+              <a:schemeClr val="accent1"/>
+            </a:fillRef>
+            <a:effectRef idx="0">
+              <a:schemeClr val="accent1"/>
+            </a:effectRef>
+            <a:fontRef idx="minor">
+              <a:schemeClr val="tx1"/>
+            </a:fontRef>
+          </p:style>
+        </p:cxnSp>
+        <p:cxnSp>
+          <p:nvCxnSpPr>
+            <p:cNvPr id="102" name="Straight Connector 101"/>
+            <p:cNvCxnSpPr/>
+            <p:nvPr/>
+          </p:nvCxnSpPr>
+          <p:spPr>
+            <a:xfrm flipV="1">
+              <a:off x="4648200" y="5222870"/>
+              <a:ext cx="0" cy="152400"/>
+            </a:xfrm>
+            <a:prstGeom prst="line">
+              <a:avLst/>
+            </a:prstGeom>
+            <a:ln w="38100">
+              <a:solidFill>
+                <a:srgbClr val="7030A0"/>
+              </a:solidFill>
+            </a:ln>
+          </p:spPr>
+          <p:style>
+            <a:lnRef idx="1">
+              <a:schemeClr val="accent1"/>
+            </a:lnRef>
+            <a:fillRef idx="0">
+              <a:schemeClr val="accent1"/>
+            </a:fillRef>
+            <a:effectRef idx="0">
+              <a:schemeClr val="accent1"/>
+            </a:effectRef>
+            <a:fontRef idx="minor">
+              <a:schemeClr val="tx1"/>
+            </a:fontRef>
+          </p:style>
+        </p:cxnSp>
+      </p:grpSp>
+      <p:sp>
+        <p:nvSpPr>
+          <p:cNvPr id="107" name="TextBox 106"/>
+          <p:cNvSpPr txBox="1"/>
+          <p:nvPr/>
+        </p:nvSpPr>
+        <p:spPr>
+          <a:xfrm>
+            <a:off x="507179" y="1156728"/>
+            <a:ext cx="771943" cy="369332"/>
+          </a:xfrm>
+          <a:prstGeom prst="rect">
+            <a:avLst/>
+          </a:prstGeom>
+          <a:noFill/>
+        </p:spPr>
+        <p:txBody>
+          <a:bodyPr wrap="none" rtlCol="0">
+            <a:spAutoFit/>
+          </a:bodyPr>
+          <a:lstStyle/>
+          <a:p>
+            <a:r>
+              <a:rPr lang="en-US" dirty="0" smtClean="0"/>
+              <a:t>¾ NPT</a:t>
+            </a:r>
+          </a:p>
+        </p:txBody>
+      </p:sp>
+      <p:cxnSp>
+        <p:nvCxnSpPr>
+          <p:cNvPr id="108" name="Straight Connector 107"/>
+          <p:cNvCxnSpPr/>
+          <p:nvPr/>
+        </p:nvCxnSpPr>
+        <p:spPr>
+          <a:xfrm flipV="1">
+            <a:off x="284473" y="1175778"/>
+            <a:ext cx="0" cy="331232"/>
+          </a:xfrm>
+          <a:prstGeom prst="line">
+            <a:avLst/>
+          </a:prstGeom>
+          <a:ln w="38100">
+            <a:solidFill>
+              <a:srgbClr val="FFC000"/>
+            </a:solidFill>
+          </a:ln>
+        </p:spPr>
+        <p:style>
+          <a:lnRef idx="1">
+            <a:schemeClr val="accent1"/>
+          </a:lnRef>
+          <a:fillRef idx="0">
+            <a:schemeClr val="accent1"/>
+          </a:fillRef>
+          <a:effectRef idx="0">
+            <a:schemeClr val="accent1"/>
+          </a:effectRef>
+          <a:fontRef idx="minor">
+            <a:schemeClr val="tx1"/>
+          </a:fontRef>
+        </p:style>
+      </p:cxnSp>
+      <p:sp>
+        <p:nvSpPr>
+          <p:cNvPr id="111" name="TextBox 110"/>
+          <p:cNvSpPr txBox="1"/>
+          <p:nvPr/>
+        </p:nvSpPr>
+        <p:spPr>
+          <a:xfrm>
+            <a:off x="507179" y="787396"/>
+            <a:ext cx="994759" cy="369332"/>
+          </a:xfrm>
+          <a:prstGeom prst="rect">
+            <a:avLst/>
+          </a:prstGeom>
+          <a:noFill/>
+        </p:spPr>
+        <p:txBody>
+          <a:bodyPr wrap="none" rtlCol="0">
+            <a:spAutoFit/>
+          </a:bodyPr>
+          <a:lstStyle/>
+          <a:p>
+            <a:r>
+              <a:rPr lang="en-US" dirty="0" smtClean="0"/>
+              <a:t>1 ½  NPT</a:t>
+            </a:r>
+          </a:p>
+        </p:txBody>
+      </p:sp>
+      <p:cxnSp>
+        <p:nvCxnSpPr>
+          <p:cNvPr id="112" name="Straight Connector 111"/>
+          <p:cNvCxnSpPr/>
+          <p:nvPr/>
+        </p:nvCxnSpPr>
+        <p:spPr>
+          <a:xfrm flipV="1">
+            <a:off x="284473" y="806446"/>
+            <a:ext cx="0" cy="331232"/>
+          </a:xfrm>
+          <a:prstGeom prst="line">
+            <a:avLst/>
+          </a:prstGeom>
+          <a:ln w="38100">
+            <a:solidFill>
+              <a:srgbClr val="7030A0"/>
+            </a:solidFill>
+          </a:ln>
+        </p:spPr>
+        <p:style>
+          <a:lnRef idx="1">
+            <a:schemeClr val="accent1"/>
+          </a:lnRef>
+          <a:fillRef idx="0">
+            <a:schemeClr val="accent1"/>
+          </a:fillRef>
+          <a:effectRef idx="0">
+            <a:schemeClr val="accent1"/>
+          </a:effectRef>
+          <a:fontRef idx="minor">
+            <a:schemeClr val="tx1"/>
+          </a:fontRef>
+        </p:style>
+      </p:cxnSp>
+      <p:cxnSp>
+        <p:nvCxnSpPr>
+          <p:cNvPr id="113" name="Straight Connector 112"/>
+          <p:cNvCxnSpPr/>
+          <p:nvPr/>
+        </p:nvCxnSpPr>
+        <p:spPr>
+          <a:xfrm flipH="1">
+            <a:off x="3538537" y="3298432"/>
+            <a:ext cx="576263" cy="0"/>
+          </a:xfrm>
+          <a:prstGeom prst="line">
+            <a:avLst/>
+          </a:prstGeom>
+          <a:ln w="38100">
+            <a:solidFill>
+              <a:srgbClr val="FFC000"/>
+            </a:solidFill>
+          </a:ln>
+        </p:spPr>
+        <p:style>
+          <a:lnRef idx="1">
+            <a:schemeClr val="accent1"/>
+          </a:lnRef>
+          <a:fillRef idx="0">
+            <a:schemeClr val="accent1"/>
+          </a:fillRef>
+          <a:effectRef idx="0">
+            <a:schemeClr val="accent1"/>
+          </a:effectRef>
+          <a:fontRef idx="minor">
+            <a:schemeClr val="tx1"/>
+          </a:fontRef>
+        </p:style>
+      </p:cxnSp>
+      <p:cxnSp>
+        <p:nvCxnSpPr>
+          <p:cNvPr id="115" name="Straight Connector 114"/>
+          <p:cNvCxnSpPr/>
+          <p:nvPr/>
+        </p:nvCxnSpPr>
+        <p:spPr>
+          <a:xfrm flipH="1" flipV="1">
+            <a:off x="4114800" y="3280453"/>
+            <a:ext cx="1" cy="380817"/>
+          </a:xfrm>
+          <a:prstGeom prst="line">
+            <a:avLst/>
+          </a:prstGeom>
+          <a:ln w="38100">
+            <a:solidFill>
+              <a:srgbClr val="FFC000"/>
+            </a:solidFill>
+          </a:ln>
+        </p:spPr>
+        <p:style>
+          <a:lnRef idx="1">
+            <a:schemeClr val="accent1"/>
+          </a:lnRef>
+          <a:fillRef idx="0">
+            <a:schemeClr val="accent1"/>
+          </a:fillRef>
+          <a:effectRef idx="0">
+            <a:schemeClr val="accent1"/>
+          </a:effectRef>
+          <a:fontRef idx="minor">
+            <a:schemeClr val="tx1"/>
+          </a:fontRef>
+        </p:style>
+      </p:cxnSp>
+      <p:sp>
+        <p:nvSpPr>
+          <p:cNvPr id="116" name="TextBox 115"/>
+          <p:cNvSpPr txBox="1"/>
+          <p:nvPr/>
+        </p:nvSpPr>
+        <p:spPr>
+          <a:xfrm>
+            <a:off x="1778665" y="1169980"/>
+            <a:ext cx="697627" cy="369332"/>
+          </a:xfrm>
+          <a:prstGeom prst="rect">
+            <a:avLst/>
+          </a:prstGeom>
+          <a:noFill/>
+        </p:spPr>
+        <p:txBody>
+          <a:bodyPr wrap="none" rtlCol="0">
+            <a:spAutoFit/>
+          </a:bodyPr>
+          <a:lstStyle/>
+          <a:p>
+            <a:r>
+              <a:rPr lang="en-US" dirty="0" smtClean="0"/>
+              <a:t>¾-16 </a:t>
+            </a:r>
+          </a:p>
+        </p:txBody>
+      </p:sp>
+      <p:cxnSp>
+        <p:nvCxnSpPr>
+          <p:cNvPr id="118" name="Straight Connector 117"/>
+          <p:cNvCxnSpPr/>
+          <p:nvPr/>
+        </p:nvCxnSpPr>
+        <p:spPr>
+          <a:xfrm flipV="1">
+            <a:off x="1555959" y="1189030"/>
+            <a:ext cx="0" cy="331232"/>
+          </a:xfrm>
+          <a:prstGeom prst="line">
+            <a:avLst/>
+          </a:prstGeom>
+          <a:ln w="38100">
+            <a:solidFill>
+              <a:srgbClr val="FF0000"/>
+            </a:solidFill>
+          </a:ln>
+        </p:spPr>
+        <p:style>
+          <a:lnRef idx="1">
+            <a:schemeClr val="accent1"/>
+          </a:lnRef>
+          <a:fillRef idx="0">
+            <a:schemeClr val="accent1"/>
+          </a:fillRef>
+          <a:effectRef idx="0">
+            <a:schemeClr val="accent1"/>
+          </a:effectRef>
+          <a:fontRef idx="minor">
+            <a:schemeClr val="tx1"/>
+          </a:fontRef>
+        </p:style>
+      </p:cxnSp>
+      <p:cxnSp>
+        <p:nvCxnSpPr>
+          <p:cNvPr id="121" name="Straight Connector 120"/>
+          <p:cNvCxnSpPr/>
+          <p:nvPr/>
+        </p:nvCxnSpPr>
+        <p:spPr>
+          <a:xfrm flipV="1">
+            <a:off x="5257800" y="3336532"/>
+            <a:ext cx="0" cy="1539259"/>
+          </a:xfrm>
+          <a:prstGeom prst="line">
+            <a:avLst/>
+          </a:prstGeom>
+          <a:ln w="38100">
+            <a:solidFill>
+              <a:srgbClr val="FF0000"/>
+            </a:solidFill>
+          </a:ln>
+        </p:spPr>
+        <p:style>
+          <a:lnRef idx="1">
+            <a:schemeClr val="accent1"/>
+          </a:lnRef>
+          <a:fillRef idx="0">
+            <a:schemeClr val="accent1"/>
+          </a:fillRef>
+          <a:effectRef idx="0">
+            <a:schemeClr val="accent1"/>
+          </a:effectRef>
+          <a:fontRef idx="minor">
+            <a:schemeClr val="tx1"/>
+          </a:fontRef>
+        </p:style>
+      </p:cxnSp>
+      <p:cxnSp>
+        <p:nvCxnSpPr>
+          <p:cNvPr id="122" name="Straight Connector 121"/>
+          <p:cNvCxnSpPr/>
+          <p:nvPr/>
+        </p:nvCxnSpPr>
+        <p:spPr>
+          <a:xfrm>
+            <a:off x="4095751" y="4869048"/>
+            <a:ext cx="1162049" cy="0"/>
+          </a:xfrm>
+          <a:prstGeom prst="line">
+            <a:avLst/>
+          </a:prstGeom>
+          <a:ln w="38100">
+            <a:solidFill>
+              <a:srgbClr val="7030A0"/>
+            </a:solidFill>
+          </a:ln>
+        </p:spPr>
+        <p:style>
+          <a:lnRef idx="1">
+            <a:schemeClr val="accent1"/>
+          </a:lnRef>
+          <a:fillRef idx="0">
+            <a:schemeClr val="accent1"/>
+          </a:fillRef>
+          <a:effectRef idx="0">
+            <a:schemeClr val="accent1"/>
+          </a:effectRef>
+          <a:fontRef idx="minor">
+            <a:schemeClr val="tx1"/>
+          </a:fontRef>
+        </p:style>
+      </p:cxnSp>
+      <p:grpSp>
+        <p:nvGrpSpPr>
+          <p:cNvPr id="124" name="Group 123"/>
+          <p:cNvGrpSpPr/>
+          <p:nvPr/>
+        </p:nvGrpSpPr>
+        <p:grpSpPr>
+          <a:xfrm>
+            <a:off x="3816944" y="1539312"/>
+            <a:ext cx="1010047" cy="1066800"/>
+            <a:chOff x="5162153" y="2971800"/>
+            <a:chExt cx="1010047" cy="1066800"/>
+          </a:xfrm>
+        </p:grpSpPr>
+        <p:sp>
+          <p:nvSpPr>
+            <p:cNvPr id="125" name="Rectangle 124"/>
+            <p:cNvSpPr/>
+            <p:nvPr/>
+          </p:nvSpPr>
+          <p:spPr>
+            <a:xfrm>
+              <a:off x="5447506" y="3447018"/>
+              <a:ext cx="419894" cy="439182"/>
+            </a:xfrm>
+            <a:prstGeom prst="rect">
+              <a:avLst/>
+            </a:prstGeom>
+            <a:solidFill>
+              <a:schemeClr val="bg1"/>
+            </a:solidFill>
+            <a:ln>
+              <a:solidFill>
+                <a:schemeClr val="tx1"/>
+              </a:solidFill>
+            </a:ln>
+          </p:spPr>
+          <p:style>
+            <a:lnRef idx="2">
+              <a:schemeClr val="accent1">
+                <a:shade val="50000"/>
+              </a:schemeClr>
+            </a:lnRef>
+            <a:fillRef idx="1">
+              <a:schemeClr val="accent1"/>
+            </a:fillRef>
+            <a:effectRef idx="0">
+              <a:schemeClr val="accent1"/>
+            </a:effectRef>
+            <a:fontRef idx="minor">
+              <a:schemeClr val="lt1"/>
+            </a:fontRef>
+          </p:style>
+          <p:txBody>
+            <a:bodyPr rtlCol="0" anchor="ctr"/>
+            <a:lstStyle/>
+            <a:p>
+              <a:pPr algn="ctr"/>
+              <a:endParaRPr lang="en-US"/>
+            </a:p>
+          </p:txBody>
+        </p:sp>
+        <p:cxnSp>
+          <p:nvCxnSpPr>
+            <p:cNvPr id="127" name="Straight Arrow Connector 126"/>
+            <p:cNvCxnSpPr/>
+            <p:nvPr/>
+          </p:nvCxnSpPr>
+          <p:spPr>
+            <a:xfrm>
+              <a:off x="5562600" y="3447018"/>
+              <a:ext cx="0" cy="439182"/>
+            </a:xfrm>
+            <a:prstGeom prst="straightConnector1">
+              <a:avLst/>
+            </a:prstGeom>
+            <a:ln w="28575">
+              <a:solidFill>
+                <a:schemeClr val="tx1"/>
+              </a:solidFill>
+              <a:headEnd type="none"/>
+              <a:tailEnd type="triangle"/>
+            </a:ln>
+          </p:spPr>
+          <p:style>
+            <a:lnRef idx="1">
+              <a:schemeClr val="accent1"/>
+            </a:lnRef>
+            <a:fillRef idx="0">
+              <a:schemeClr val="accent1"/>
+            </a:fillRef>
+            <a:effectRef idx="0">
+              <a:schemeClr val="accent1"/>
+            </a:effectRef>
+            <a:fontRef idx="minor">
+              <a:schemeClr val="tx1"/>
+            </a:fontRef>
+          </p:style>
+        </p:cxnSp>
+        <p:cxnSp>
+          <p:nvCxnSpPr>
+            <p:cNvPr id="128" name="Straight Arrow Connector 127"/>
+            <p:cNvCxnSpPr>
+              <a:endCxn id="125" idx="1"/>
+            </p:cNvCxnSpPr>
+            <p:nvPr/>
+          </p:nvCxnSpPr>
+          <p:spPr>
+            <a:xfrm>
+              <a:off x="5162153" y="3666609"/>
+              <a:ext cx="285353" cy="0"/>
+            </a:xfrm>
+            <a:prstGeom prst="straightConnector1">
+              <a:avLst/>
+            </a:prstGeom>
+            <a:ln w="19050">
+              <a:solidFill>
+                <a:schemeClr val="tx1"/>
+              </a:solidFill>
+              <a:prstDash val="dash"/>
+              <a:headEnd type="none"/>
+              <a:tailEnd type="none"/>
+            </a:ln>
+          </p:spPr>
+          <p:style>
+            <a:lnRef idx="1">
+              <a:schemeClr val="accent1"/>
+            </a:lnRef>
+            <a:fillRef idx="0">
+              <a:schemeClr val="accent1"/>
+            </a:fillRef>
+            <a:effectRef idx="0">
+              <a:schemeClr val="accent1"/>
+            </a:effectRef>
+            <a:fontRef idx="minor">
+              <a:schemeClr val="tx1"/>
+            </a:fontRef>
+          </p:style>
+        </p:cxnSp>
+        <p:cxnSp>
+          <p:nvCxnSpPr>
+            <p:cNvPr id="130" name="Straight Arrow Connector 129"/>
+            <p:cNvCxnSpPr/>
+            <p:nvPr/>
+          </p:nvCxnSpPr>
+          <p:spPr>
+            <a:xfrm flipV="1">
+              <a:off x="5162153" y="3200400"/>
+              <a:ext cx="0" cy="466210"/>
+            </a:xfrm>
+            <a:prstGeom prst="straightConnector1">
+              <a:avLst/>
+            </a:prstGeom>
+            <a:ln w="19050">
+              <a:solidFill>
+                <a:schemeClr val="tx1"/>
+              </a:solidFill>
+              <a:prstDash val="dash"/>
+              <a:headEnd type="none"/>
+              <a:tailEnd type="none"/>
+            </a:ln>
+          </p:spPr>
+          <p:style>
+            <a:lnRef idx="1">
+              <a:schemeClr val="accent1"/>
+            </a:lnRef>
+            <a:fillRef idx="0">
+              <a:schemeClr val="accent1"/>
+            </a:fillRef>
+            <a:effectRef idx="0">
+              <a:schemeClr val="accent1"/>
+            </a:effectRef>
+            <a:fontRef idx="minor">
+              <a:schemeClr val="tx1"/>
+            </a:fontRef>
+          </p:style>
+        </p:cxnSp>
+        <p:cxnSp>
+          <p:nvCxnSpPr>
+            <p:cNvPr id="131" name="Straight Arrow Connector 130"/>
+            <p:cNvCxnSpPr/>
+            <p:nvPr/>
+          </p:nvCxnSpPr>
+          <p:spPr>
+            <a:xfrm>
+              <a:off x="5162153" y="3200400"/>
+              <a:ext cx="495300" cy="0"/>
+            </a:xfrm>
+            <a:prstGeom prst="straightConnector1">
+              <a:avLst/>
+            </a:prstGeom>
+            <a:ln w="19050">
+              <a:solidFill>
+                <a:schemeClr val="tx1"/>
+              </a:solidFill>
+              <a:prstDash val="dash"/>
+              <a:headEnd type="none"/>
+              <a:tailEnd type="oval"/>
+            </a:ln>
+          </p:spPr>
+          <p:style>
+            <a:lnRef idx="1">
+              <a:schemeClr val="accent1"/>
+            </a:lnRef>
+            <a:fillRef idx="0">
+              <a:schemeClr val="accent1"/>
+            </a:fillRef>
+            <a:effectRef idx="0">
+              <a:schemeClr val="accent1"/>
+            </a:effectRef>
+            <a:fontRef idx="minor">
+              <a:schemeClr val="tx1"/>
+            </a:fontRef>
+          </p:style>
+        </p:cxnSp>
+        <p:cxnSp>
+          <p:nvCxnSpPr>
+            <p:cNvPr id="132" name="Straight Arrow Connector 131"/>
+            <p:cNvCxnSpPr>
+              <a:stCxn id="125" idx="0"/>
+            </p:cNvCxnSpPr>
+            <p:nvPr/>
+          </p:nvCxnSpPr>
+          <p:spPr>
+            <a:xfrm flipV="1">
+              <a:off x="5657453" y="2971800"/>
+              <a:ext cx="0" cy="475218"/>
+            </a:xfrm>
+            <a:prstGeom prst="straightConnector1">
+              <a:avLst/>
+            </a:prstGeom>
+            <a:ln w="19050">
+              <a:solidFill>
+                <a:schemeClr val="tx1"/>
+              </a:solidFill>
+              <a:prstDash val="solid"/>
+              <a:headEnd type="none"/>
+              <a:tailEnd type="none"/>
+            </a:ln>
+          </p:spPr>
+          <p:style>
+            <a:lnRef idx="1">
+              <a:schemeClr val="accent1"/>
+            </a:lnRef>
+            <a:fillRef idx="0">
+              <a:schemeClr val="accent1"/>
+            </a:fillRef>
+            <a:effectRef idx="0">
+              <a:schemeClr val="accent1"/>
+            </a:effectRef>
+            <a:fontRef idx="minor">
+              <a:schemeClr val="tx1"/>
+            </a:fontRef>
+          </p:style>
+        </p:cxnSp>
+        <p:cxnSp>
+          <p:nvCxnSpPr>
+            <p:cNvPr id="135" name="Straight Arrow Connector 134"/>
+            <p:cNvCxnSpPr>
+              <a:endCxn id="125" idx="2"/>
+            </p:cNvCxnSpPr>
+            <p:nvPr/>
+          </p:nvCxnSpPr>
+          <p:spPr>
+            <a:xfrm flipV="1">
+              <a:off x="5657453" y="3886200"/>
+              <a:ext cx="0" cy="152400"/>
+            </a:xfrm>
+            <a:prstGeom prst="straightConnector1">
+              <a:avLst/>
+            </a:prstGeom>
+            <a:ln w="19050">
+              <a:solidFill>
+                <a:schemeClr val="tx1"/>
+              </a:solidFill>
+              <a:prstDash val="solid"/>
+              <a:headEnd type="none"/>
+              <a:tailEnd type="none"/>
+            </a:ln>
+          </p:spPr>
+          <p:style>
+            <a:lnRef idx="1">
+              <a:schemeClr val="accent1"/>
+            </a:lnRef>
+            <a:fillRef idx="0">
+              <a:schemeClr val="accent1"/>
+            </a:fillRef>
+            <a:effectRef idx="0">
+              <a:schemeClr val="accent1"/>
+            </a:effectRef>
+            <a:fontRef idx="minor">
+              <a:schemeClr val="tx1"/>
+            </a:fontRef>
+          </p:style>
+        </p:cxnSp>
+        <p:cxnSp>
+          <p:nvCxnSpPr>
+            <p:cNvPr id="136" name="Straight Arrow Connector 135"/>
+            <p:cNvCxnSpPr/>
+            <p:nvPr/>
+          </p:nvCxnSpPr>
+          <p:spPr>
+            <a:xfrm flipH="1">
+              <a:off x="5533827" y="4038600"/>
+              <a:ext cx="247252" cy="0"/>
+            </a:xfrm>
+            <a:prstGeom prst="straightConnector1">
+              <a:avLst/>
+            </a:prstGeom>
+            <a:ln w="25400" cap="rnd">
+              <a:solidFill>
+                <a:schemeClr val="tx1"/>
+              </a:solidFill>
+              <a:prstDash val="solid"/>
+              <a:headEnd type="none" w="sm" len="sm"/>
+              <a:tailEnd type="none" w="sm" len="sm"/>
+            </a:ln>
+          </p:spPr>
+          <p:style>
+            <a:lnRef idx="1">
+              <a:schemeClr val="accent1"/>
+            </a:lnRef>
+            <a:fillRef idx="0">
+              <a:schemeClr val="accent1"/>
+            </a:fillRef>
+            <a:effectRef idx="0">
+              <a:schemeClr val="accent1"/>
+            </a:effectRef>
+            <a:fontRef idx="minor">
+              <a:schemeClr val="tx1"/>
+            </a:fontRef>
+          </p:style>
+        </p:cxnSp>
+        <p:cxnSp>
+          <p:nvCxnSpPr>
+            <p:cNvPr id="137" name="Straight Arrow Connector 136"/>
+            <p:cNvCxnSpPr/>
+            <p:nvPr/>
+          </p:nvCxnSpPr>
+          <p:spPr>
+            <a:xfrm flipV="1">
+              <a:off x="5781079" y="3962400"/>
+              <a:ext cx="0" cy="76200"/>
+            </a:xfrm>
+            <a:prstGeom prst="straightConnector1">
+              <a:avLst/>
+            </a:prstGeom>
+            <a:ln w="25400">
+              <a:solidFill>
+                <a:schemeClr val="tx1"/>
+              </a:solidFill>
+              <a:prstDash val="solid"/>
+              <a:headEnd type="none"/>
+              <a:tailEnd type="none"/>
+            </a:ln>
+          </p:spPr>
+          <p:style>
+            <a:lnRef idx="1">
+              <a:schemeClr val="accent1"/>
+            </a:lnRef>
+            <a:fillRef idx="0">
+              <a:schemeClr val="accent1"/>
+            </a:fillRef>
+            <a:effectRef idx="0">
+              <a:schemeClr val="accent1"/>
+            </a:effectRef>
+            <a:fontRef idx="minor">
+              <a:schemeClr val="tx1"/>
+            </a:fontRef>
+          </p:style>
+        </p:cxnSp>
+        <p:cxnSp>
+          <p:nvCxnSpPr>
+            <p:cNvPr id="138" name="Straight Arrow Connector 137"/>
+            <p:cNvCxnSpPr/>
+            <p:nvPr/>
+          </p:nvCxnSpPr>
+          <p:spPr>
+            <a:xfrm flipV="1">
+              <a:off x="5533827" y="3955256"/>
+              <a:ext cx="0" cy="76200"/>
+            </a:xfrm>
+            <a:prstGeom prst="straightConnector1">
+              <a:avLst/>
+            </a:prstGeom>
+            <a:ln w="25400">
+              <a:solidFill>
+                <a:schemeClr val="tx1"/>
+              </a:solidFill>
+              <a:prstDash val="solid"/>
+              <a:headEnd type="none"/>
+              <a:tailEnd type="none"/>
+            </a:ln>
+          </p:spPr>
+          <p:style>
+            <a:lnRef idx="1">
+              <a:schemeClr val="accent1"/>
+            </a:lnRef>
+            <a:fillRef idx="0">
+              <a:schemeClr val="accent1"/>
+            </a:fillRef>
+            <a:effectRef idx="0">
+              <a:schemeClr val="accent1"/>
+            </a:effectRef>
+            <a:fontRef idx="minor">
+              <a:schemeClr val="tx1"/>
+            </a:fontRef>
+          </p:style>
+        </p:cxnSp>
+        <p:cxnSp>
+          <p:nvCxnSpPr>
+            <p:cNvPr id="139" name="Straight Arrow Connector 138"/>
+            <p:cNvCxnSpPr>
+              <a:stCxn id="125" idx="3"/>
+            </p:cNvCxnSpPr>
+            <p:nvPr/>
+          </p:nvCxnSpPr>
+          <p:spPr>
+            <a:xfrm flipV="1">
+              <a:off x="5867400" y="3581400"/>
+              <a:ext cx="76200" cy="85209"/>
+            </a:xfrm>
+            <a:prstGeom prst="straightConnector1">
+              <a:avLst/>
+            </a:prstGeom>
+            <a:ln w="19050">
+              <a:solidFill>
+                <a:schemeClr val="tx1"/>
+              </a:solidFill>
+              <a:prstDash val="solid"/>
+              <a:headEnd type="none"/>
+              <a:tailEnd type="none"/>
+            </a:ln>
+          </p:spPr>
+          <p:style>
+            <a:lnRef idx="1">
+              <a:schemeClr val="accent1"/>
+            </a:lnRef>
+            <a:fillRef idx="0">
+              <a:schemeClr val="accent1"/>
+            </a:fillRef>
+            <a:effectRef idx="0">
+              <a:schemeClr val="accent1"/>
+            </a:effectRef>
+            <a:fontRef idx="minor">
+              <a:schemeClr val="tx1"/>
+            </a:fontRef>
+          </p:style>
+        </p:cxnSp>
+        <p:cxnSp>
+          <p:nvCxnSpPr>
+            <p:cNvPr id="140" name="Straight Arrow Connector 139"/>
+            <p:cNvCxnSpPr/>
+            <p:nvPr/>
+          </p:nvCxnSpPr>
+          <p:spPr>
+            <a:xfrm>
+              <a:off x="5943600" y="3581400"/>
+              <a:ext cx="76200" cy="152400"/>
+            </a:xfrm>
+            <a:prstGeom prst="straightConnector1">
+              <a:avLst/>
+            </a:prstGeom>
+            <a:ln w="19050">
+              <a:solidFill>
+                <a:schemeClr val="tx1"/>
+              </a:solidFill>
+              <a:prstDash val="solid"/>
+              <a:headEnd type="none"/>
+              <a:tailEnd type="none"/>
+            </a:ln>
+          </p:spPr>
+          <p:style>
+            <a:lnRef idx="1">
+              <a:schemeClr val="accent1"/>
+            </a:lnRef>
+            <a:fillRef idx="0">
+              <a:schemeClr val="accent1"/>
+            </a:fillRef>
+            <a:effectRef idx="0">
+              <a:schemeClr val="accent1"/>
+            </a:effectRef>
+            <a:fontRef idx="minor">
+              <a:schemeClr val="tx1"/>
+            </a:fontRef>
+          </p:style>
+        </p:cxnSp>
+        <p:cxnSp>
+          <p:nvCxnSpPr>
+            <p:cNvPr id="141" name="Straight Arrow Connector 140"/>
+            <p:cNvCxnSpPr/>
+            <p:nvPr/>
+          </p:nvCxnSpPr>
+          <p:spPr>
+            <a:xfrm flipV="1">
+              <a:off x="6019800" y="3581400"/>
+              <a:ext cx="76200" cy="152400"/>
+            </a:xfrm>
+            <a:prstGeom prst="straightConnector1">
+              <a:avLst/>
+            </a:prstGeom>
+            <a:ln w="19050">
+              <a:solidFill>
+                <a:schemeClr val="tx1"/>
+              </a:solidFill>
+              <a:prstDash val="solid"/>
+              <a:headEnd type="none"/>
+              <a:tailEnd type="none"/>
+            </a:ln>
+          </p:spPr>
+          <p:style>
+            <a:lnRef idx="1">
+              <a:schemeClr val="accent1"/>
+            </a:lnRef>
+            <a:fillRef idx="0">
+              <a:schemeClr val="accent1"/>
+            </a:fillRef>
+            <a:effectRef idx="0">
+              <a:schemeClr val="accent1"/>
+            </a:effectRef>
+            <a:fontRef idx="minor">
+              <a:schemeClr val="tx1"/>
+            </a:fontRef>
+          </p:style>
+        </p:cxnSp>
+        <p:cxnSp>
+          <p:nvCxnSpPr>
+            <p:cNvPr id="142" name="Straight Arrow Connector 141"/>
+            <p:cNvCxnSpPr/>
+            <p:nvPr/>
+          </p:nvCxnSpPr>
+          <p:spPr>
+            <a:xfrm flipH="1" flipV="1">
+              <a:off x="6096000" y="3581400"/>
+              <a:ext cx="76200" cy="152400"/>
+            </a:xfrm>
+            <a:prstGeom prst="straightConnector1">
+              <a:avLst/>
+            </a:prstGeom>
+            <a:ln w="19050">
+              <a:solidFill>
+                <a:schemeClr val="tx1"/>
+              </a:solidFill>
+              <a:prstDash val="solid"/>
+              <a:headEnd type="none"/>
+              <a:tailEnd type="none"/>
+            </a:ln>
+          </p:spPr>
+          <p:style>
+            <a:lnRef idx="1">
+              <a:schemeClr val="accent1"/>
+            </a:lnRef>
+            <a:fillRef idx="0">
+              <a:schemeClr val="accent1"/>
+            </a:fillRef>
+            <a:effectRef idx="0">
+              <a:schemeClr val="accent1"/>
+            </a:effectRef>
+            <a:fontRef idx="minor">
+              <a:schemeClr val="tx1"/>
+            </a:fontRef>
+          </p:style>
+        </p:cxnSp>
+      </p:grpSp>
+      <p:cxnSp>
+        <p:nvCxnSpPr>
+          <p:cNvPr id="143" name="Straight Connector 142"/>
+          <p:cNvCxnSpPr/>
+          <p:nvPr/>
+        </p:nvCxnSpPr>
+        <p:spPr>
+          <a:xfrm>
+            <a:off x="5257800" y="1539312"/>
+            <a:ext cx="1" cy="858726"/>
+          </a:xfrm>
+          <a:prstGeom prst="line">
+            <a:avLst/>
+          </a:prstGeom>
+          <a:ln w="38100">
+            <a:solidFill>
+              <a:srgbClr val="FF0000"/>
+            </a:solidFill>
+          </a:ln>
+        </p:spPr>
+        <p:style>
+          <a:lnRef idx="1">
+            <a:schemeClr val="accent1"/>
+          </a:lnRef>
+          <a:fillRef idx="0">
+            <a:schemeClr val="accent1"/>
+          </a:fillRef>
+          <a:effectRef idx="0">
+            <a:schemeClr val="accent1"/>
+          </a:effectRef>
+          <a:fontRef idx="minor">
+            <a:schemeClr val="tx1"/>
+          </a:fontRef>
+        </p:style>
+      </p:cxnSp>
+      <p:sp>
+        <p:nvSpPr>
+          <p:cNvPr id="96" name="TextBox 95"/>
+          <p:cNvSpPr txBox="1"/>
+          <p:nvPr/>
+        </p:nvSpPr>
+        <p:spPr>
+          <a:xfrm>
+            <a:off x="3594595" y="1132357"/>
+            <a:ext cx="3707409" cy="369332"/>
+          </a:xfrm>
+          <a:prstGeom prst="rect">
+            <a:avLst/>
+          </a:prstGeom>
+          <a:noFill/>
+        </p:spPr>
+        <p:txBody>
+          <a:bodyPr wrap="square" rtlCol="0">
+            <a:spAutoFit/>
+          </a:bodyPr>
+          <a:lstStyle/>
+          <a:p>
+            <a:r>
+              <a:rPr lang="en-US" dirty="0" smtClean="0"/>
+              <a:t>Valve has built in pressure relief</a:t>
+            </a:r>
+            <a:endParaRPr lang="en-US" dirty="0"/>
+          </a:p>
+        </p:txBody>
+      </p:sp>
+    </p:spTree>
+    <p:extLst>
+      <p:ext uri="{BB962C8B-B14F-4D97-AF65-F5344CB8AC3E}">
+        <p14:creationId xmlns:p14="http://schemas.microsoft.com/office/powerpoint/2010/main" val="660474339"/>
       </p:ext>
     </p:extLst>
   </p:cSld>

</xml_diff>

<commit_message>
Figured out the fittings
</commit_message>
<xml_diff>
--- a/Design/Subsystems/Hydraulic.pptx
+++ b/Design/Subsystems/Hydraulic.pptx
@@ -7,6 +7,7 @@
   <p:sldIdLst>
     <p:sldId id="257" r:id="rId2"/>
     <p:sldId id="258" r:id="rId3"/>
+    <p:sldId id="259" r:id="rId4"/>
   </p:sldIdLst>
   <p:sldSz cx="9144000" cy="6858000" type="screen4x3"/>
   <p:notesSz cx="6858000" cy="9144000"/>
@@ -8172,6 +8173,2187 @@
 </p:sld>
 </file>
 
+<file path=ppt/slides/slide3.xml><?xml version="1.0" encoding="utf-8"?>
+<p:sld xmlns:a="http://schemas.openxmlformats.org/drawingml/2006/main" xmlns:r="http://schemas.openxmlformats.org/officeDocument/2006/relationships" xmlns:p="http://schemas.openxmlformats.org/presentationml/2006/main">
+  <p:cSld>
+    <p:spTree>
+      <p:nvGrpSpPr>
+        <p:cNvPr id="1" name=""/>
+        <p:cNvGrpSpPr/>
+        <p:nvPr/>
+      </p:nvGrpSpPr>
+      <p:grpSpPr>
+        <a:xfrm>
+          <a:off x="0" y="0"/>
+          <a:ext cx="0" cy="0"/>
+          <a:chOff x="0" y="0"/>
+          <a:chExt cx="0" cy="0"/>
+        </a:xfrm>
+      </p:grpSpPr>
+      <p:sp>
+        <p:nvSpPr>
+          <p:cNvPr id="2" name="Title 1"/>
+          <p:cNvSpPr>
+            <a:spLocks noGrp="1"/>
+          </p:cNvSpPr>
+          <p:nvPr>
+            <p:ph type="title"/>
+          </p:nvPr>
+        </p:nvSpPr>
+        <p:spPr>
+          <a:xfrm>
+            <a:off x="381000" y="83582"/>
+            <a:ext cx="8229600" cy="1143000"/>
+          </a:xfrm>
+        </p:spPr>
+        <p:txBody>
+          <a:bodyPr>
+            <a:normAutofit/>
+          </a:bodyPr>
+          <a:lstStyle/>
+          <a:p>
+            <a:r>
+              <a:rPr lang="en-US" dirty="0" smtClean="0"/>
+              <a:t>Fittings List</a:t>
+            </a:r>
+            <a:endParaRPr lang="en-US" dirty="0"/>
+          </a:p>
+        </p:txBody>
+      </p:sp>
+      <p:sp>
+        <p:nvSpPr>
+          <p:cNvPr id="13" name="TextBox 12"/>
+          <p:cNvSpPr txBox="1"/>
+          <p:nvPr/>
+        </p:nvSpPr>
+        <p:spPr>
+          <a:xfrm>
+            <a:off x="507179" y="1526060"/>
+            <a:ext cx="771943" cy="369332"/>
+          </a:xfrm>
+          <a:prstGeom prst="rect">
+            <a:avLst/>
+          </a:prstGeom>
+          <a:noFill/>
+        </p:spPr>
+        <p:txBody>
+          <a:bodyPr wrap="none" rtlCol="0">
+            <a:spAutoFit/>
+          </a:bodyPr>
+          <a:lstStyle/>
+          <a:p>
+            <a:r>
+              <a:rPr lang="en-US" dirty="0" smtClean="0"/>
+              <a:t>½ NPT</a:t>
+            </a:r>
+          </a:p>
+        </p:txBody>
+      </p:sp>
+      <p:grpSp>
+        <p:nvGrpSpPr>
+          <p:cNvPr id="15" name="Group 14"/>
+          <p:cNvGrpSpPr/>
+          <p:nvPr/>
+        </p:nvGrpSpPr>
+        <p:grpSpPr>
+          <a:xfrm>
+            <a:off x="6284026" y="3545073"/>
+            <a:ext cx="685800" cy="990600"/>
+            <a:chOff x="1600200" y="1981200"/>
+            <a:chExt cx="685800" cy="990600"/>
+          </a:xfrm>
+        </p:grpSpPr>
+        <p:sp>
+          <p:nvSpPr>
+            <p:cNvPr id="4" name="Oval 3"/>
+            <p:cNvSpPr/>
+            <p:nvPr/>
+          </p:nvSpPr>
+          <p:spPr>
+            <a:xfrm>
+              <a:off x="1600200" y="2133600"/>
+              <a:ext cx="685800" cy="685800"/>
+            </a:xfrm>
+            <a:prstGeom prst="ellipse">
+              <a:avLst/>
+            </a:prstGeom>
+            <a:solidFill>
+              <a:schemeClr val="bg1"/>
+            </a:solidFill>
+            <a:ln>
+              <a:solidFill>
+                <a:schemeClr val="tx1"/>
+              </a:solidFill>
+            </a:ln>
+          </p:spPr>
+          <p:style>
+            <a:lnRef idx="2">
+              <a:schemeClr val="accent1">
+                <a:shade val="50000"/>
+              </a:schemeClr>
+            </a:lnRef>
+            <a:fillRef idx="1">
+              <a:schemeClr val="accent1"/>
+            </a:fillRef>
+            <a:effectRef idx="0">
+              <a:schemeClr val="accent1"/>
+            </a:effectRef>
+            <a:fontRef idx="minor">
+              <a:schemeClr val="lt1"/>
+            </a:fontRef>
+          </p:style>
+          <p:txBody>
+            <a:bodyPr rtlCol="0" anchor="ctr"/>
+            <a:lstStyle/>
+            <a:p>
+              <a:pPr algn="ctr"/>
+              <a:endParaRPr lang="en-US"/>
+            </a:p>
+          </p:txBody>
+        </p:sp>
+        <p:cxnSp>
+          <p:nvCxnSpPr>
+            <p:cNvPr id="6" name="Straight Connector 5"/>
+            <p:cNvCxnSpPr>
+              <a:stCxn id="4" idx="0"/>
+            </p:cNvCxnSpPr>
+            <p:nvPr/>
+          </p:nvCxnSpPr>
+          <p:spPr>
+            <a:xfrm flipV="1">
+              <a:off x="1943100" y="1981200"/>
+              <a:ext cx="0" cy="152400"/>
+            </a:xfrm>
+            <a:prstGeom prst="line">
+              <a:avLst/>
+            </a:prstGeom>
+            <a:ln w="38100">
+              <a:solidFill>
+                <a:srgbClr val="FF0000"/>
+              </a:solidFill>
+            </a:ln>
+          </p:spPr>
+          <p:style>
+            <a:lnRef idx="1">
+              <a:schemeClr val="accent1"/>
+            </a:lnRef>
+            <a:fillRef idx="0">
+              <a:schemeClr val="accent1"/>
+            </a:fillRef>
+            <a:effectRef idx="0">
+              <a:schemeClr val="accent1"/>
+            </a:effectRef>
+            <a:fontRef idx="minor">
+              <a:schemeClr val="tx1"/>
+            </a:fontRef>
+          </p:style>
+        </p:cxnSp>
+        <p:cxnSp>
+          <p:nvCxnSpPr>
+            <p:cNvPr id="9" name="Straight Connector 8"/>
+            <p:cNvCxnSpPr>
+              <a:endCxn id="4" idx="4"/>
+            </p:cNvCxnSpPr>
+            <p:nvPr/>
+          </p:nvCxnSpPr>
+          <p:spPr>
+            <a:xfrm flipV="1">
+              <a:off x="1943100" y="2819400"/>
+              <a:ext cx="0" cy="152400"/>
+            </a:xfrm>
+            <a:prstGeom prst="line">
+              <a:avLst/>
+            </a:prstGeom>
+            <a:ln w="38100">
+              <a:solidFill>
+                <a:srgbClr val="FF0000"/>
+              </a:solidFill>
+            </a:ln>
+          </p:spPr>
+          <p:style>
+            <a:lnRef idx="1">
+              <a:schemeClr val="accent1"/>
+            </a:lnRef>
+            <a:fillRef idx="0">
+              <a:schemeClr val="accent1"/>
+            </a:fillRef>
+            <a:effectRef idx="0">
+              <a:schemeClr val="accent1"/>
+            </a:effectRef>
+            <a:fontRef idx="minor">
+              <a:schemeClr val="tx1"/>
+            </a:fontRef>
+          </p:style>
+        </p:cxnSp>
+        <p:sp>
+          <p:nvSpPr>
+            <p:cNvPr id="14" name="Flowchart: Extract 13"/>
+            <p:cNvSpPr/>
+            <p:nvPr/>
+          </p:nvSpPr>
+          <p:spPr>
+            <a:xfrm>
+              <a:off x="1752600" y="2124558"/>
+              <a:ext cx="381000" cy="237641"/>
+            </a:xfrm>
+            <a:prstGeom prst="flowChartExtract">
+              <a:avLst/>
+            </a:prstGeom>
+            <a:solidFill>
+              <a:schemeClr val="tx1"/>
+            </a:solidFill>
+            <a:ln>
+              <a:solidFill>
+                <a:schemeClr val="tx1"/>
+              </a:solidFill>
+            </a:ln>
+          </p:spPr>
+          <p:style>
+            <a:lnRef idx="2">
+              <a:schemeClr val="accent1">
+                <a:shade val="50000"/>
+              </a:schemeClr>
+            </a:lnRef>
+            <a:fillRef idx="1">
+              <a:schemeClr val="accent1"/>
+            </a:fillRef>
+            <a:effectRef idx="0">
+              <a:schemeClr val="accent1"/>
+            </a:effectRef>
+            <a:fontRef idx="minor">
+              <a:schemeClr val="lt1"/>
+            </a:fontRef>
+          </p:style>
+          <p:txBody>
+            <a:bodyPr rtlCol="0" anchor="ctr"/>
+            <a:lstStyle/>
+            <a:p>
+              <a:pPr algn="ctr"/>
+              <a:endParaRPr lang="en-US"/>
+            </a:p>
+          </p:txBody>
+        </p:sp>
+      </p:grpSp>
+      <p:grpSp>
+        <p:nvGrpSpPr>
+          <p:cNvPr id="35" name="Group 34"/>
+          <p:cNvGrpSpPr/>
+          <p:nvPr/>
+        </p:nvGrpSpPr>
+        <p:grpSpPr>
+          <a:xfrm rot="5400000">
+            <a:off x="1455307" y="4296303"/>
+            <a:ext cx="1524000" cy="609600"/>
+            <a:chOff x="1524000" y="3733800"/>
+            <a:chExt cx="1524000" cy="609600"/>
+          </a:xfrm>
+        </p:grpSpPr>
+        <p:sp>
+          <p:nvSpPr>
+            <p:cNvPr id="25" name="Rectangle 24"/>
+            <p:cNvSpPr/>
+            <p:nvPr/>
+          </p:nvSpPr>
+          <p:spPr>
+            <a:xfrm>
+              <a:off x="1524000" y="3886200"/>
+              <a:ext cx="1295400" cy="457200"/>
+            </a:xfrm>
+            <a:prstGeom prst="rect">
+              <a:avLst/>
+            </a:prstGeom>
+            <a:solidFill>
+              <a:schemeClr val="bg1"/>
+            </a:solidFill>
+            <a:ln>
+              <a:solidFill>
+                <a:schemeClr val="tx1"/>
+              </a:solidFill>
+            </a:ln>
+          </p:spPr>
+          <p:style>
+            <a:lnRef idx="2">
+              <a:schemeClr val="accent1">
+                <a:shade val="50000"/>
+              </a:schemeClr>
+            </a:lnRef>
+            <a:fillRef idx="1">
+              <a:schemeClr val="accent1"/>
+            </a:fillRef>
+            <a:effectRef idx="0">
+              <a:schemeClr val="accent1"/>
+            </a:effectRef>
+            <a:fontRef idx="minor">
+              <a:schemeClr val="lt1"/>
+            </a:fontRef>
+          </p:style>
+          <p:txBody>
+            <a:bodyPr rtlCol="0" anchor="ctr"/>
+            <a:lstStyle/>
+            <a:p>
+              <a:pPr algn="ctr"/>
+              <a:endParaRPr lang="en-US"/>
+            </a:p>
+          </p:txBody>
+        </p:sp>
+        <p:cxnSp>
+          <p:nvCxnSpPr>
+            <p:cNvPr id="26" name="Straight Connector 25"/>
+            <p:cNvCxnSpPr/>
+            <p:nvPr/>
+          </p:nvCxnSpPr>
+          <p:spPr>
+            <a:xfrm flipV="1">
+              <a:off x="2743200" y="3733800"/>
+              <a:ext cx="0" cy="152400"/>
+            </a:xfrm>
+            <a:prstGeom prst="line">
+              <a:avLst/>
+            </a:prstGeom>
+            <a:ln w="38100">
+              <a:solidFill>
+                <a:srgbClr val="00B0F0"/>
+              </a:solidFill>
+            </a:ln>
+          </p:spPr>
+          <p:style>
+            <a:lnRef idx="1">
+              <a:schemeClr val="accent1"/>
+            </a:lnRef>
+            <a:fillRef idx="0">
+              <a:schemeClr val="accent1"/>
+            </a:fillRef>
+            <a:effectRef idx="0">
+              <a:schemeClr val="accent1"/>
+            </a:effectRef>
+            <a:fontRef idx="minor">
+              <a:schemeClr val="tx1"/>
+            </a:fontRef>
+          </p:style>
+        </p:cxnSp>
+        <p:cxnSp>
+          <p:nvCxnSpPr>
+            <p:cNvPr id="27" name="Straight Connector 26"/>
+            <p:cNvCxnSpPr/>
+            <p:nvPr/>
+          </p:nvCxnSpPr>
+          <p:spPr>
+            <a:xfrm flipV="1">
+              <a:off x="1634425" y="3733800"/>
+              <a:ext cx="0" cy="152400"/>
+            </a:xfrm>
+            <a:prstGeom prst="line">
+              <a:avLst/>
+            </a:prstGeom>
+            <a:ln w="38100">
+              <a:solidFill>
+                <a:srgbClr val="00B0F0"/>
+              </a:solidFill>
+            </a:ln>
+          </p:spPr>
+          <p:style>
+            <a:lnRef idx="1">
+              <a:schemeClr val="accent1"/>
+            </a:lnRef>
+            <a:fillRef idx="0">
+              <a:schemeClr val="accent1"/>
+            </a:fillRef>
+            <a:effectRef idx="0">
+              <a:schemeClr val="accent1"/>
+            </a:effectRef>
+            <a:fontRef idx="minor">
+              <a:schemeClr val="tx1"/>
+            </a:fontRef>
+          </p:style>
+        </p:cxnSp>
+        <p:cxnSp>
+          <p:nvCxnSpPr>
+            <p:cNvPr id="28" name="Straight Connector 27"/>
+            <p:cNvCxnSpPr/>
+            <p:nvPr/>
+          </p:nvCxnSpPr>
+          <p:spPr>
+            <a:xfrm>
+              <a:off x="1946831" y="4114800"/>
+              <a:ext cx="1101169" cy="0"/>
+            </a:xfrm>
+            <a:prstGeom prst="line">
+              <a:avLst/>
+            </a:prstGeom>
+            <a:ln w="38100">
+              <a:solidFill>
+                <a:schemeClr val="tx1"/>
+              </a:solidFill>
+            </a:ln>
+          </p:spPr>
+          <p:style>
+            <a:lnRef idx="1">
+              <a:schemeClr val="accent1"/>
+            </a:lnRef>
+            <a:fillRef idx="0">
+              <a:schemeClr val="accent1"/>
+            </a:fillRef>
+            <a:effectRef idx="0">
+              <a:schemeClr val="accent1"/>
+            </a:effectRef>
+            <a:fontRef idx="minor">
+              <a:schemeClr val="tx1"/>
+            </a:fontRef>
+          </p:style>
+        </p:cxnSp>
+        <p:cxnSp>
+          <p:nvCxnSpPr>
+            <p:cNvPr id="30" name="Straight Connector 29"/>
+            <p:cNvCxnSpPr/>
+            <p:nvPr/>
+          </p:nvCxnSpPr>
+          <p:spPr>
+            <a:xfrm flipV="1">
+              <a:off x="1943100" y="3962400"/>
+              <a:ext cx="0" cy="304800"/>
+            </a:xfrm>
+            <a:prstGeom prst="line">
+              <a:avLst/>
+            </a:prstGeom>
+            <a:ln w="38100">
+              <a:solidFill>
+                <a:schemeClr val="tx1"/>
+              </a:solidFill>
+            </a:ln>
+          </p:spPr>
+          <p:style>
+            <a:lnRef idx="1">
+              <a:schemeClr val="accent1"/>
+            </a:lnRef>
+            <a:fillRef idx="0">
+              <a:schemeClr val="accent1"/>
+            </a:fillRef>
+            <a:effectRef idx="0">
+              <a:schemeClr val="accent1"/>
+            </a:effectRef>
+            <a:fontRef idx="minor">
+              <a:schemeClr val="tx1"/>
+            </a:fontRef>
+          </p:style>
+        </p:cxnSp>
+      </p:grpSp>
+      <p:sp>
+        <p:nvSpPr>
+          <p:cNvPr id="36" name="TextBox 35"/>
+          <p:cNvSpPr txBox="1"/>
+          <p:nvPr/>
+        </p:nvSpPr>
+        <p:spPr>
+          <a:xfrm>
+            <a:off x="2488055" y="4115397"/>
+            <a:ext cx="1098378" cy="261610"/>
+          </a:xfrm>
+          <a:prstGeom prst="rect">
+            <a:avLst/>
+          </a:prstGeom>
+          <a:noFill/>
+        </p:spPr>
+        <p:txBody>
+          <a:bodyPr wrap="none" rtlCol="0">
+            <a:spAutoFit/>
+          </a:bodyPr>
+          <a:lstStyle/>
+          <a:p>
+            <a:r>
+              <a:rPr lang="en-US" sz="1050" dirty="0" smtClean="0"/>
+              <a:t>Pressure Sensor</a:t>
+            </a:r>
+          </a:p>
+        </p:txBody>
+      </p:sp>
+      <p:grpSp>
+        <p:nvGrpSpPr>
+          <p:cNvPr id="71" name="Group 70"/>
+          <p:cNvGrpSpPr/>
+          <p:nvPr/>
+        </p:nvGrpSpPr>
+        <p:grpSpPr>
+          <a:xfrm rot="5400000">
+            <a:off x="3509284" y="3629086"/>
+            <a:ext cx="1828800" cy="1002742"/>
+            <a:chOff x="5181600" y="3897868"/>
+            <a:chExt cx="1828800" cy="1002742"/>
+          </a:xfrm>
+        </p:grpSpPr>
+        <p:sp>
+          <p:nvSpPr>
+            <p:cNvPr id="70" name="Oval 69"/>
+            <p:cNvSpPr/>
+            <p:nvPr/>
+          </p:nvSpPr>
+          <p:spPr>
+            <a:xfrm>
+              <a:off x="5334000" y="4133849"/>
+              <a:ext cx="114300" cy="114300"/>
+            </a:xfrm>
+            <a:prstGeom prst="ellipse">
+              <a:avLst/>
+            </a:prstGeom>
+            <a:solidFill>
+              <a:schemeClr val="bg1"/>
+            </a:solidFill>
+            <a:ln>
+              <a:solidFill>
+                <a:schemeClr val="tx1"/>
+              </a:solidFill>
+            </a:ln>
+          </p:spPr>
+          <p:style>
+            <a:lnRef idx="2">
+              <a:schemeClr val="accent1">
+                <a:shade val="50000"/>
+              </a:schemeClr>
+            </a:lnRef>
+            <a:fillRef idx="1">
+              <a:schemeClr val="accent1"/>
+            </a:fillRef>
+            <a:effectRef idx="0">
+              <a:schemeClr val="accent1"/>
+            </a:effectRef>
+            <a:fontRef idx="minor">
+              <a:schemeClr val="lt1"/>
+            </a:fontRef>
+          </p:style>
+          <p:txBody>
+            <a:bodyPr rtlCol="0" anchor="ctr"/>
+            <a:lstStyle/>
+            <a:p>
+              <a:pPr algn="ctr"/>
+              <a:endParaRPr lang="en-US"/>
+            </a:p>
+          </p:txBody>
+        </p:sp>
+        <p:sp>
+          <p:nvSpPr>
+            <p:cNvPr id="37" name="Rectangle 36"/>
+            <p:cNvSpPr/>
+            <p:nvPr/>
+          </p:nvSpPr>
+          <p:spPr>
+            <a:xfrm>
+              <a:off x="5638800" y="4114800"/>
+              <a:ext cx="1371600" cy="533400"/>
+            </a:xfrm>
+            <a:prstGeom prst="rect">
+              <a:avLst/>
+            </a:prstGeom>
+            <a:solidFill>
+              <a:schemeClr val="bg1"/>
+            </a:solidFill>
+            <a:ln>
+              <a:solidFill>
+                <a:schemeClr val="tx1"/>
+              </a:solidFill>
+            </a:ln>
+          </p:spPr>
+          <p:style>
+            <a:lnRef idx="2">
+              <a:schemeClr val="accent1">
+                <a:shade val="50000"/>
+              </a:schemeClr>
+            </a:lnRef>
+            <a:fillRef idx="1">
+              <a:schemeClr val="accent1"/>
+            </a:fillRef>
+            <a:effectRef idx="0">
+              <a:schemeClr val="accent1"/>
+            </a:effectRef>
+            <a:fontRef idx="minor">
+              <a:schemeClr val="lt1"/>
+            </a:fontRef>
+          </p:style>
+          <p:txBody>
+            <a:bodyPr rtlCol="0" anchor="ctr"/>
+            <a:lstStyle/>
+            <a:p>
+              <a:pPr algn="ctr"/>
+              <a:endParaRPr lang="en-US"/>
+            </a:p>
+          </p:txBody>
+        </p:sp>
+        <p:cxnSp>
+          <p:nvCxnSpPr>
+            <p:cNvPr id="38" name="Straight Connector 37"/>
+            <p:cNvCxnSpPr/>
+            <p:nvPr/>
+          </p:nvCxnSpPr>
+          <p:spPr>
+            <a:xfrm flipV="1">
+              <a:off x="6096000" y="4114801"/>
+              <a:ext cx="0" cy="533399"/>
+            </a:xfrm>
+            <a:prstGeom prst="line">
+              <a:avLst/>
+            </a:prstGeom>
+            <a:ln w="38100">
+              <a:solidFill>
+                <a:schemeClr val="tx1"/>
+              </a:solidFill>
+            </a:ln>
+          </p:spPr>
+          <p:style>
+            <a:lnRef idx="1">
+              <a:schemeClr val="accent1"/>
+            </a:lnRef>
+            <a:fillRef idx="0">
+              <a:schemeClr val="accent1"/>
+            </a:fillRef>
+            <a:effectRef idx="0">
+              <a:schemeClr val="accent1"/>
+            </a:effectRef>
+            <a:fontRef idx="minor">
+              <a:schemeClr val="tx1"/>
+            </a:fontRef>
+          </p:style>
+        </p:cxnSp>
+        <p:cxnSp>
+          <p:nvCxnSpPr>
+            <p:cNvPr id="41" name="Straight Connector 40"/>
+            <p:cNvCxnSpPr/>
+            <p:nvPr/>
+          </p:nvCxnSpPr>
+          <p:spPr>
+            <a:xfrm flipV="1">
+              <a:off x="6553200" y="4114800"/>
+              <a:ext cx="0" cy="533399"/>
+            </a:xfrm>
+            <a:prstGeom prst="line">
+              <a:avLst/>
+            </a:prstGeom>
+            <a:ln w="38100">
+              <a:solidFill>
+                <a:schemeClr val="tx1"/>
+              </a:solidFill>
+            </a:ln>
+          </p:spPr>
+          <p:style>
+            <a:lnRef idx="1">
+              <a:schemeClr val="accent1"/>
+            </a:lnRef>
+            <a:fillRef idx="0">
+              <a:schemeClr val="accent1"/>
+            </a:fillRef>
+            <a:effectRef idx="0">
+              <a:schemeClr val="accent1"/>
+            </a:effectRef>
+            <a:fontRef idx="minor">
+              <a:schemeClr val="tx1"/>
+            </a:fontRef>
+          </p:style>
+        </p:cxnSp>
+        <p:cxnSp>
+          <p:nvCxnSpPr>
+            <p:cNvPr id="43" name="Straight Connector 42"/>
+            <p:cNvCxnSpPr/>
+            <p:nvPr/>
+          </p:nvCxnSpPr>
+          <p:spPr>
+            <a:xfrm flipV="1">
+              <a:off x="6203156" y="3897868"/>
+              <a:ext cx="0" cy="331232"/>
+            </a:xfrm>
+            <a:prstGeom prst="line">
+              <a:avLst/>
+            </a:prstGeom>
+            <a:ln w="38100">
+              <a:solidFill>
+                <a:srgbClr val="FFC000"/>
+              </a:solidFill>
+            </a:ln>
+          </p:spPr>
+          <p:style>
+            <a:lnRef idx="1">
+              <a:schemeClr val="accent1"/>
+            </a:lnRef>
+            <a:fillRef idx="0">
+              <a:schemeClr val="accent1"/>
+            </a:fillRef>
+            <a:effectRef idx="0">
+              <a:schemeClr val="accent1"/>
+            </a:effectRef>
+            <a:fontRef idx="minor">
+              <a:schemeClr val="tx1"/>
+            </a:fontRef>
+          </p:style>
+        </p:cxnSp>
+        <p:cxnSp>
+          <p:nvCxnSpPr>
+            <p:cNvPr id="45" name="Straight Arrow Connector 44"/>
+            <p:cNvCxnSpPr/>
+            <p:nvPr/>
+          </p:nvCxnSpPr>
+          <p:spPr>
+            <a:xfrm flipV="1">
+              <a:off x="5786437" y="4114802"/>
+              <a:ext cx="0" cy="533399"/>
+            </a:xfrm>
+            <a:prstGeom prst="straightConnector1">
+              <a:avLst/>
+            </a:prstGeom>
+            <a:ln w="28575">
+              <a:solidFill>
+                <a:schemeClr val="tx1"/>
+              </a:solidFill>
+              <a:headEnd type="none"/>
+              <a:tailEnd type="triangle"/>
+            </a:ln>
+          </p:spPr>
+          <p:style>
+            <a:lnRef idx="1">
+              <a:schemeClr val="accent1"/>
+            </a:lnRef>
+            <a:fillRef idx="0">
+              <a:schemeClr val="accent1"/>
+            </a:fillRef>
+            <a:effectRef idx="0">
+              <a:schemeClr val="accent1"/>
+            </a:effectRef>
+            <a:fontRef idx="minor">
+              <a:schemeClr val="tx1"/>
+            </a:fontRef>
+          </p:style>
+        </p:cxnSp>
+        <p:cxnSp>
+          <p:nvCxnSpPr>
+            <p:cNvPr id="46" name="Straight Arrow Connector 45"/>
+            <p:cNvCxnSpPr/>
+            <p:nvPr/>
+          </p:nvCxnSpPr>
+          <p:spPr>
+            <a:xfrm flipV="1">
+              <a:off x="5943600" y="4114801"/>
+              <a:ext cx="0" cy="533399"/>
+            </a:xfrm>
+            <a:prstGeom prst="straightConnector1">
+              <a:avLst/>
+            </a:prstGeom>
+            <a:ln w="28575">
+              <a:solidFill>
+                <a:schemeClr val="tx1"/>
+              </a:solidFill>
+              <a:headEnd type="none"/>
+              <a:tailEnd type="triangle"/>
+            </a:ln>
+          </p:spPr>
+          <p:style>
+            <a:lnRef idx="1">
+              <a:schemeClr val="accent1"/>
+            </a:lnRef>
+            <a:fillRef idx="0">
+              <a:schemeClr val="accent1"/>
+            </a:fillRef>
+            <a:effectRef idx="0">
+              <a:schemeClr val="accent1"/>
+            </a:effectRef>
+            <a:fontRef idx="minor">
+              <a:schemeClr val="tx1"/>
+            </a:fontRef>
+          </p:style>
+        </p:cxnSp>
+        <p:cxnSp>
+          <p:nvCxnSpPr>
+            <p:cNvPr id="47" name="Straight Arrow Connector 46"/>
+            <p:cNvCxnSpPr/>
+            <p:nvPr/>
+          </p:nvCxnSpPr>
+          <p:spPr>
+            <a:xfrm flipV="1">
+              <a:off x="6705600" y="4114800"/>
+              <a:ext cx="152400" cy="533399"/>
+            </a:xfrm>
+            <a:prstGeom prst="straightConnector1">
+              <a:avLst/>
+            </a:prstGeom>
+            <a:ln w="28575">
+              <a:solidFill>
+                <a:schemeClr val="tx1"/>
+              </a:solidFill>
+              <a:headEnd type="none"/>
+              <a:tailEnd type="triangle"/>
+            </a:ln>
+          </p:spPr>
+          <p:style>
+            <a:lnRef idx="1">
+              <a:schemeClr val="accent1"/>
+            </a:lnRef>
+            <a:fillRef idx="0">
+              <a:schemeClr val="accent1"/>
+            </a:fillRef>
+            <a:effectRef idx="0">
+              <a:schemeClr val="accent1"/>
+            </a:effectRef>
+            <a:fontRef idx="minor">
+              <a:schemeClr val="tx1"/>
+            </a:fontRef>
+          </p:style>
+        </p:cxnSp>
+        <p:cxnSp>
+          <p:nvCxnSpPr>
+            <p:cNvPr id="48" name="Straight Arrow Connector 47"/>
+            <p:cNvCxnSpPr/>
+            <p:nvPr/>
+          </p:nvCxnSpPr>
+          <p:spPr>
+            <a:xfrm flipH="1" flipV="1">
+              <a:off x="6705600" y="4114799"/>
+              <a:ext cx="152400" cy="533402"/>
+            </a:xfrm>
+            <a:prstGeom prst="straightConnector1">
+              <a:avLst/>
+            </a:prstGeom>
+            <a:ln w="28575">
+              <a:solidFill>
+                <a:schemeClr val="tx1"/>
+              </a:solidFill>
+              <a:headEnd type="none"/>
+              <a:tailEnd type="triangle"/>
+            </a:ln>
+          </p:spPr>
+          <p:style>
+            <a:lnRef idx="1">
+              <a:schemeClr val="accent1"/>
+            </a:lnRef>
+            <a:fillRef idx="0">
+              <a:schemeClr val="accent1"/>
+            </a:fillRef>
+            <a:effectRef idx="0">
+              <a:schemeClr val="accent1"/>
+            </a:effectRef>
+            <a:fontRef idx="minor">
+              <a:schemeClr val="tx1"/>
+            </a:fontRef>
+          </p:style>
+        </p:cxnSp>
+        <p:cxnSp>
+          <p:nvCxnSpPr>
+            <p:cNvPr id="52" name="Straight Connector 51"/>
+            <p:cNvCxnSpPr/>
+            <p:nvPr/>
+          </p:nvCxnSpPr>
+          <p:spPr>
+            <a:xfrm flipV="1">
+              <a:off x="6431573" y="3897868"/>
+              <a:ext cx="0" cy="331232"/>
+            </a:xfrm>
+            <a:prstGeom prst="line">
+              <a:avLst/>
+            </a:prstGeom>
+            <a:ln w="38100">
+              <a:solidFill>
+                <a:srgbClr val="FFC000"/>
+              </a:solidFill>
+            </a:ln>
+          </p:spPr>
+          <p:style>
+            <a:lnRef idx="1">
+              <a:schemeClr val="accent1"/>
+            </a:lnRef>
+            <a:fillRef idx="0">
+              <a:schemeClr val="accent1"/>
+            </a:fillRef>
+            <a:effectRef idx="0">
+              <a:schemeClr val="accent1"/>
+            </a:effectRef>
+            <a:fontRef idx="minor">
+              <a:schemeClr val="tx1"/>
+            </a:fontRef>
+          </p:style>
+        </p:cxnSp>
+        <p:cxnSp>
+          <p:nvCxnSpPr>
+            <p:cNvPr id="53" name="Straight Connector 52"/>
+            <p:cNvCxnSpPr/>
+            <p:nvPr/>
+          </p:nvCxnSpPr>
+          <p:spPr>
+            <a:xfrm flipV="1">
+              <a:off x="6426810" y="4569378"/>
+              <a:ext cx="0" cy="331232"/>
+            </a:xfrm>
+            <a:prstGeom prst="line">
+              <a:avLst/>
+            </a:prstGeom>
+            <a:ln w="38100">
+              <a:solidFill>
+                <a:srgbClr val="00B0F0"/>
+              </a:solidFill>
+            </a:ln>
+          </p:spPr>
+          <p:style>
+            <a:lnRef idx="1">
+              <a:schemeClr val="accent1"/>
+            </a:lnRef>
+            <a:fillRef idx="0">
+              <a:schemeClr val="accent1"/>
+            </a:fillRef>
+            <a:effectRef idx="0">
+              <a:schemeClr val="accent1"/>
+            </a:effectRef>
+            <a:fontRef idx="minor">
+              <a:schemeClr val="tx1"/>
+            </a:fontRef>
+          </p:style>
+        </p:cxnSp>
+        <p:cxnSp>
+          <p:nvCxnSpPr>
+            <p:cNvPr id="54" name="Straight Connector 53"/>
+            <p:cNvCxnSpPr/>
+            <p:nvPr/>
+          </p:nvCxnSpPr>
+          <p:spPr>
+            <a:xfrm flipV="1">
+              <a:off x="6203156" y="4569378"/>
+              <a:ext cx="0" cy="331232"/>
+            </a:xfrm>
+            <a:prstGeom prst="line">
+              <a:avLst/>
+            </a:prstGeom>
+            <a:ln w="38100">
+              <a:solidFill>
+                <a:srgbClr val="00B0F0"/>
+              </a:solidFill>
+            </a:ln>
+          </p:spPr>
+          <p:style>
+            <a:lnRef idx="1">
+              <a:schemeClr val="accent1"/>
+            </a:lnRef>
+            <a:fillRef idx="0">
+              <a:schemeClr val="accent1"/>
+            </a:fillRef>
+            <a:effectRef idx="0">
+              <a:schemeClr val="accent1"/>
+            </a:effectRef>
+            <a:fontRef idx="minor">
+              <a:schemeClr val="tx1"/>
+            </a:fontRef>
+          </p:style>
+        </p:cxnSp>
+        <p:cxnSp>
+          <p:nvCxnSpPr>
+            <p:cNvPr id="55" name="Straight Connector 54"/>
+            <p:cNvCxnSpPr/>
+            <p:nvPr/>
+          </p:nvCxnSpPr>
+          <p:spPr>
+            <a:xfrm flipH="1">
+              <a:off x="6393473" y="4229100"/>
+              <a:ext cx="76200" cy="0"/>
+            </a:xfrm>
+            <a:prstGeom prst="line">
+              <a:avLst/>
+            </a:prstGeom>
+            <a:ln w="38100">
+              <a:solidFill>
+                <a:schemeClr val="tx1"/>
+              </a:solidFill>
+            </a:ln>
+          </p:spPr>
+          <p:style>
+            <a:lnRef idx="1">
+              <a:schemeClr val="accent1"/>
+            </a:lnRef>
+            <a:fillRef idx="0">
+              <a:schemeClr val="accent1"/>
+            </a:fillRef>
+            <a:effectRef idx="0">
+              <a:schemeClr val="accent1"/>
+            </a:effectRef>
+            <a:fontRef idx="minor">
+              <a:schemeClr val="tx1"/>
+            </a:fontRef>
+          </p:style>
+        </p:cxnSp>
+        <p:cxnSp>
+          <p:nvCxnSpPr>
+            <p:cNvPr id="57" name="Straight Connector 56"/>
+            <p:cNvCxnSpPr/>
+            <p:nvPr/>
+          </p:nvCxnSpPr>
+          <p:spPr>
+            <a:xfrm flipH="1">
+              <a:off x="6165056" y="4231481"/>
+              <a:ext cx="76200" cy="0"/>
+            </a:xfrm>
+            <a:prstGeom prst="line">
+              <a:avLst/>
+            </a:prstGeom>
+            <a:ln w="38100">
+              <a:solidFill>
+                <a:schemeClr val="tx1"/>
+              </a:solidFill>
+            </a:ln>
+          </p:spPr>
+          <p:style>
+            <a:lnRef idx="1">
+              <a:schemeClr val="accent1"/>
+            </a:lnRef>
+            <a:fillRef idx="0">
+              <a:schemeClr val="accent1"/>
+            </a:fillRef>
+            <a:effectRef idx="0">
+              <a:schemeClr val="accent1"/>
+            </a:effectRef>
+            <a:fontRef idx="minor">
+              <a:schemeClr val="tx1"/>
+            </a:fontRef>
+          </p:style>
+        </p:cxnSp>
+        <p:cxnSp>
+          <p:nvCxnSpPr>
+            <p:cNvPr id="58" name="Straight Connector 57"/>
+            <p:cNvCxnSpPr/>
+            <p:nvPr/>
+          </p:nvCxnSpPr>
+          <p:spPr>
+            <a:xfrm flipH="1">
+              <a:off x="6388710" y="4569378"/>
+              <a:ext cx="76200" cy="0"/>
+            </a:xfrm>
+            <a:prstGeom prst="line">
+              <a:avLst/>
+            </a:prstGeom>
+            <a:ln w="38100">
+              <a:solidFill>
+                <a:schemeClr val="tx1"/>
+              </a:solidFill>
+            </a:ln>
+          </p:spPr>
+          <p:style>
+            <a:lnRef idx="1">
+              <a:schemeClr val="accent1"/>
+            </a:lnRef>
+            <a:fillRef idx="0">
+              <a:schemeClr val="accent1"/>
+            </a:fillRef>
+            <a:effectRef idx="0">
+              <a:schemeClr val="accent1"/>
+            </a:effectRef>
+            <a:fontRef idx="minor">
+              <a:schemeClr val="tx1"/>
+            </a:fontRef>
+          </p:style>
+        </p:cxnSp>
+        <p:cxnSp>
+          <p:nvCxnSpPr>
+            <p:cNvPr id="59" name="Straight Connector 58"/>
+            <p:cNvCxnSpPr/>
+            <p:nvPr/>
+          </p:nvCxnSpPr>
+          <p:spPr>
+            <a:xfrm flipH="1">
+              <a:off x="6165056" y="4569378"/>
+              <a:ext cx="76200" cy="0"/>
+            </a:xfrm>
+            <a:prstGeom prst="line">
+              <a:avLst/>
+            </a:prstGeom>
+            <a:ln w="38100">
+              <a:solidFill>
+                <a:schemeClr val="tx1"/>
+              </a:solidFill>
+            </a:ln>
+          </p:spPr>
+          <p:style>
+            <a:lnRef idx="1">
+              <a:schemeClr val="accent1"/>
+            </a:lnRef>
+            <a:fillRef idx="0">
+              <a:schemeClr val="accent1"/>
+            </a:fillRef>
+            <a:effectRef idx="0">
+              <a:schemeClr val="accent1"/>
+            </a:effectRef>
+            <a:fontRef idx="minor">
+              <a:schemeClr val="tx1"/>
+            </a:fontRef>
+          </p:style>
+        </p:cxnSp>
+        <p:cxnSp>
+          <p:nvCxnSpPr>
+            <p:cNvPr id="60" name="Straight Connector 59"/>
+            <p:cNvCxnSpPr/>
+            <p:nvPr/>
+          </p:nvCxnSpPr>
+          <p:spPr>
+            <a:xfrm flipH="1">
+              <a:off x="5334000" y="4340778"/>
+              <a:ext cx="304800" cy="0"/>
+            </a:xfrm>
+            <a:prstGeom prst="line">
+              <a:avLst/>
+            </a:prstGeom>
+            <a:ln w="25400">
+              <a:solidFill>
+                <a:schemeClr val="tx1"/>
+              </a:solidFill>
+            </a:ln>
+          </p:spPr>
+          <p:style>
+            <a:lnRef idx="1">
+              <a:schemeClr val="accent1"/>
+            </a:lnRef>
+            <a:fillRef idx="0">
+              <a:schemeClr val="accent1"/>
+            </a:fillRef>
+            <a:effectRef idx="0">
+              <a:schemeClr val="accent1"/>
+            </a:effectRef>
+            <a:fontRef idx="minor">
+              <a:schemeClr val="tx1"/>
+            </a:fontRef>
+          </p:style>
+        </p:cxnSp>
+        <p:cxnSp>
+          <p:nvCxnSpPr>
+            <p:cNvPr id="63" name="Straight Connector 62"/>
+            <p:cNvCxnSpPr/>
+            <p:nvPr/>
+          </p:nvCxnSpPr>
+          <p:spPr>
+            <a:xfrm flipH="1">
+              <a:off x="5257800" y="4493178"/>
+              <a:ext cx="376783" cy="0"/>
+            </a:xfrm>
+            <a:prstGeom prst="line">
+              <a:avLst/>
+            </a:prstGeom>
+            <a:ln w="25400">
+              <a:solidFill>
+                <a:schemeClr val="tx1"/>
+              </a:solidFill>
+            </a:ln>
+          </p:spPr>
+          <p:style>
+            <a:lnRef idx="1">
+              <a:schemeClr val="accent1"/>
+            </a:lnRef>
+            <a:fillRef idx="0">
+              <a:schemeClr val="accent1"/>
+            </a:fillRef>
+            <a:effectRef idx="0">
+              <a:schemeClr val="accent1"/>
+            </a:effectRef>
+            <a:fontRef idx="minor">
+              <a:schemeClr val="tx1"/>
+            </a:fontRef>
+          </p:style>
+        </p:cxnSp>
+        <p:cxnSp>
+          <p:nvCxnSpPr>
+            <p:cNvPr id="65" name="Straight Connector 64"/>
+            <p:cNvCxnSpPr/>
+            <p:nvPr/>
+          </p:nvCxnSpPr>
+          <p:spPr>
+            <a:xfrm flipH="1">
+              <a:off x="5181600" y="4229100"/>
+              <a:ext cx="195810" cy="419099"/>
+            </a:xfrm>
+            <a:prstGeom prst="line">
+              <a:avLst/>
+            </a:prstGeom>
+            <a:ln w="25400">
+              <a:solidFill>
+                <a:schemeClr val="tx1"/>
+              </a:solidFill>
+            </a:ln>
+          </p:spPr>
+          <p:style>
+            <a:lnRef idx="1">
+              <a:schemeClr val="accent1"/>
+            </a:lnRef>
+            <a:fillRef idx="0">
+              <a:schemeClr val="accent1"/>
+            </a:fillRef>
+            <a:effectRef idx="0">
+              <a:schemeClr val="accent1"/>
+            </a:effectRef>
+            <a:fontRef idx="minor">
+              <a:schemeClr val="tx1"/>
+            </a:fontRef>
+          </p:style>
+        </p:cxnSp>
+      </p:grpSp>
+      <p:cxnSp>
+        <p:nvCxnSpPr>
+          <p:cNvPr id="67" name="Straight Connector 66"/>
+          <p:cNvCxnSpPr/>
+          <p:nvPr/>
+        </p:nvCxnSpPr>
+        <p:spPr>
+          <a:xfrm flipV="1">
+            <a:off x="284473" y="1545110"/>
+            <a:ext cx="0" cy="331232"/>
+          </a:xfrm>
+          <a:prstGeom prst="line">
+            <a:avLst/>
+          </a:prstGeom>
+          <a:ln w="38100">
+            <a:solidFill>
+              <a:srgbClr val="00B0F0"/>
+            </a:solidFill>
+          </a:ln>
+        </p:spPr>
+        <p:style>
+          <a:lnRef idx="1">
+            <a:schemeClr val="accent1"/>
+          </a:lnRef>
+          <a:fillRef idx="0">
+            <a:schemeClr val="accent1"/>
+          </a:fillRef>
+          <a:effectRef idx="0">
+            <a:schemeClr val="accent1"/>
+          </a:effectRef>
+          <a:fontRef idx="minor">
+            <a:schemeClr val="tx1"/>
+          </a:fontRef>
+        </p:style>
+      </p:cxnSp>
+      <p:cxnSp>
+        <p:nvCxnSpPr>
+          <p:cNvPr id="68" name="Straight Connector 67"/>
+          <p:cNvCxnSpPr/>
+          <p:nvPr/>
+        </p:nvCxnSpPr>
+        <p:spPr>
+          <a:xfrm flipH="1">
+            <a:off x="2488055" y="3949528"/>
+            <a:ext cx="1471871" cy="0"/>
+          </a:xfrm>
+          <a:prstGeom prst="line">
+            <a:avLst/>
+          </a:prstGeom>
+          <a:ln w="38100">
+            <a:solidFill>
+              <a:srgbClr val="00B0F0"/>
+            </a:solidFill>
+          </a:ln>
+        </p:spPr>
+        <p:style>
+          <a:lnRef idx="1">
+            <a:schemeClr val="accent1"/>
+          </a:lnRef>
+          <a:fillRef idx="0">
+            <a:schemeClr val="accent1"/>
+          </a:fillRef>
+          <a:effectRef idx="0">
+            <a:schemeClr val="accent1"/>
+          </a:effectRef>
+          <a:fontRef idx="minor">
+            <a:schemeClr val="tx1"/>
+          </a:fontRef>
+        </p:style>
+      </p:cxnSp>
+      <p:sp>
+        <p:nvSpPr>
+          <p:cNvPr id="75" name="TextBox 74"/>
+          <p:cNvSpPr txBox="1"/>
+          <p:nvPr/>
+        </p:nvSpPr>
+        <p:spPr>
+          <a:xfrm>
+            <a:off x="507179" y="1895392"/>
+            <a:ext cx="763927" cy="369332"/>
+          </a:xfrm>
+          <a:prstGeom prst="rect">
+            <a:avLst/>
+          </a:prstGeom>
+          <a:noFill/>
+        </p:spPr>
+        <p:txBody>
+          <a:bodyPr wrap="none" rtlCol="0">
+            <a:spAutoFit/>
+          </a:bodyPr>
+          <a:lstStyle/>
+          <a:p>
+            <a:r>
+              <a:rPr lang="en-US" dirty="0" smtClean="0"/>
+              <a:t>¼ NPT</a:t>
+            </a:r>
+          </a:p>
+        </p:txBody>
+      </p:sp>
+      <p:cxnSp>
+        <p:nvCxnSpPr>
+          <p:cNvPr id="76" name="Straight Connector 75"/>
+          <p:cNvCxnSpPr/>
+          <p:nvPr/>
+        </p:nvCxnSpPr>
+        <p:spPr>
+          <a:xfrm flipV="1">
+            <a:off x="284473" y="1914442"/>
+            <a:ext cx="0" cy="331232"/>
+          </a:xfrm>
+          <a:prstGeom prst="line">
+            <a:avLst/>
+          </a:prstGeom>
+          <a:ln w="38100">
+            <a:solidFill>
+              <a:srgbClr val="00B050"/>
+            </a:solidFill>
+          </a:ln>
+        </p:spPr>
+        <p:style>
+          <a:lnRef idx="1">
+            <a:schemeClr val="accent1"/>
+          </a:lnRef>
+          <a:fillRef idx="0">
+            <a:schemeClr val="accent1"/>
+          </a:fillRef>
+          <a:effectRef idx="0">
+            <a:schemeClr val="accent1"/>
+          </a:effectRef>
+          <a:fontRef idx="minor">
+            <a:schemeClr val="tx1"/>
+          </a:fontRef>
+        </p:style>
+      </p:cxnSp>
+      <p:cxnSp>
+        <p:nvCxnSpPr>
+          <p:cNvPr id="78" name="Straight Connector 77"/>
+          <p:cNvCxnSpPr/>
+          <p:nvPr/>
+        </p:nvCxnSpPr>
+        <p:spPr>
+          <a:xfrm flipV="1">
+            <a:off x="3037244" y="3941349"/>
+            <a:ext cx="0" cy="198049"/>
+          </a:xfrm>
+          <a:prstGeom prst="line">
+            <a:avLst/>
+          </a:prstGeom>
+          <a:ln w="38100">
+            <a:solidFill>
+              <a:srgbClr val="00B050"/>
+            </a:solidFill>
+          </a:ln>
+        </p:spPr>
+        <p:style>
+          <a:lnRef idx="1">
+            <a:schemeClr val="accent1"/>
+          </a:lnRef>
+          <a:fillRef idx="0">
+            <a:schemeClr val="accent1"/>
+          </a:fillRef>
+          <a:effectRef idx="0">
+            <a:schemeClr val="accent1"/>
+          </a:effectRef>
+          <a:fontRef idx="minor">
+            <a:schemeClr val="tx1"/>
+          </a:fontRef>
+        </p:style>
+      </p:cxnSp>
+      <p:cxnSp>
+        <p:nvCxnSpPr>
+          <p:cNvPr id="79" name="Straight Connector 78"/>
+          <p:cNvCxnSpPr/>
+          <p:nvPr/>
+        </p:nvCxnSpPr>
+        <p:spPr>
+          <a:xfrm flipH="1">
+            <a:off x="2488056" y="5053798"/>
+            <a:ext cx="1471870" cy="4505"/>
+          </a:xfrm>
+          <a:prstGeom prst="line">
+            <a:avLst/>
+          </a:prstGeom>
+          <a:ln w="38100">
+            <a:solidFill>
+              <a:srgbClr val="00B0F0"/>
+            </a:solidFill>
+          </a:ln>
+        </p:spPr>
+        <p:style>
+          <a:lnRef idx="1">
+            <a:schemeClr val="accent1"/>
+          </a:lnRef>
+          <a:fillRef idx="0">
+            <a:schemeClr val="accent1"/>
+          </a:fillRef>
+          <a:effectRef idx="0">
+            <a:schemeClr val="accent1"/>
+          </a:effectRef>
+          <a:fontRef idx="minor">
+            <a:schemeClr val="tx1"/>
+          </a:fontRef>
+        </p:style>
+      </p:cxnSp>
+      <p:cxnSp>
+        <p:nvCxnSpPr>
+          <p:cNvPr id="84" name="Straight Connector 83"/>
+          <p:cNvCxnSpPr/>
+          <p:nvPr/>
+        </p:nvCxnSpPr>
+        <p:spPr>
+          <a:xfrm flipV="1">
+            <a:off x="3941562" y="3941349"/>
+            <a:ext cx="0" cy="296264"/>
+          </a:xfrm>
+          <a:prstGeom prst="line">
+            <a:avLst/>
+          </a:prstGeom>
+          <a:ln w="38100">
+            <a:solidFill>
+              <a:srgbClr val="00B0F0"/>
+            </a:solidFill>
+          </a:ln>
+        </p:spPr>
+        <p:style>
+          <a:lnRef idx="1">
+            <a:schemeClr val="accent1"/>
+          </a:lnRef>
+          <a:fillRef idx="0">
+            <a:schemeClr val="accent1"/>
+          </a:fillRef>
+          <a:effectRef idx="0">
+            <a:schemeClr val="accent1"/>
+          </a:effectRef>
+          <a:fontRef idx="minor">
+            <a:schemeClr val="tx1"/>
+          </a:fontRef>
+        </p:style>
+      </p:cxnSp>
+      <p:cxnSp>
+        <p:nvCxnSpPr>
+          <p:cNvPr id="87" name="Straight Connector 86"/>
+          <p:cNvCxnSpPr/>
+          <p:nvPr/>
+        </p:nvCxnSpPr>
+        <p:spPr>
+          <a:xfrm flipV="1">
+            <a:off x="3941562" y="4439526"/>
+            <a:ext cx="0" cy="618777"/>
+          </a:xfrm>
+          <a:prstGeom prst="line">
+            <a:avLst/>
+          </a:prstGeom>
+          <a:ln w="38100">
+            <a:solidFill>
+              <a:srgbClr val="00B0F0"/>
+            </a:solidFill>
+          </a:ln>
+        </p:spPr>
+        <p:style>
+          <a:lnRef idx="1">
+            <a:schemeClr val="accent1"/>
+          </a:lnRef>
+          <a:fillRef idx="0">
+            <a:schemeClr val="accent1"/>
+          </a:fillRef>
+          <a:effectRef idx="0">
+            <a:schemeClr val="accent1"/>
+          </a:effectRef>
+          <a:fontRef idx="minor">
+            <a:schemeClr val="tx1"/>
+          </a:fontRef>
+        </p:style>
+      </p:cxnSp>
+      <p:cxnSp>
+        <p:nvCxnSpPr>
+          <p:cNvPr id="93" name="Straight Connector 92"/>
+          <p:cNvCxnSpPr/>
+          <p:nvPr/>
+        </p:nvCxnSpPr>
+        <p:spPr>
+          <a:xfrm>
+            <a:off x="4925055" y="2712708"/>
+            <a:ext cx="0" cy="1545495"/>
+          </a:xfrm>
+          <a:prstGeom prst="line">
+            <a:avLst/>
+          </a:prstGeom>
+          <a:ln w="38100">
+            <a:solidFill>
+              <a:srgbClr val="FFC000"/>
+            </a:solidFill>
+          </a:ln>
+        </p:spPr>
+        <p:style>
+          <a:lnRef idx="1">
+            <a:schemeClr val="accent1"/>
+          </a:lnRef>
+          <a:fillRef idx="0">
+            <a:schemeClr val="accent1"/>
+          </a:fillRef>
+          <a:effectRef idx="0">
+            <a:schemeClr val="accent1"/>
+          </a:effectRef>
+          <a:fontRef idx="minor">
+            <a:schemeClr val="tx1"/>
+          </a:fontRef>
+        </p:style>
+      </p:cxnSp>
+      <p:cxnSp>
+        <p:nvCxnSpPr>
+          <p:cNvPr id="94" name="Straight Connector 93"/>
+          <p:cNvCxnSpPr/>
+          <p:nvPr/>
+        </p:nvCxnSpPr>
+        <p:spPr>
+          <a:xfrm flipH="1">
+            <a:off x="4907663" y="2712708"/>
+            <a:ext cx="1719263" cy="0"/>
+          </a:xfrm>
+          <a:prstGeom prst="line">
+            <a:avLst/>
+          </a:prstGeom>
+          <a:ln w="38100">
+            <a:solidFill>
+              <a:srgbClr val="FFC000"/>
+            </a:solidFill>
+          </a:ln>
+        </p:spPr>
+        <p:style>
+          <a:lnRef idx="1">
+            <a:schemeClr val="accent1"/>
+          </a:lnRef>
+          <a:fillRef idx="0">
+            <a:schemeClr val="accent1"/>
+          </a:fillRef>
+          <a:effectRef idx="0">
+            <a:schemeClr val="accent1"/>
+          </a:effectRef>
+          <a:fontRef idx="minor">
+            <a:schemeClr val="tx1"/>
+          </a:fontRef>
+        </p:style>
+      </p:cxnSp>
+      <p:grpSp>
+        <p:nvGrpSpPr>
+          <p:cNvPr id="99" name="Group 98"/>
+          <p:cNvGrpSpPr/>
+          <p:nvPr/>
+        </p:nvGrpSpPr>
+        <p:grpSpPr>
+          <a:xfrm>
+            <a:off x="5026726" y="4782919"/>
+            <a:ext cx="914400" cy="1260470"/>
+            <a:chOff x="4191000" y="4114800"/>
+            <a:chExt cx="914400" cy="1260470"/>
+          </a:xfrm>
+        </p:grpSpPr>
+        <p:sp>
+          <p:nvSpPr>
+            <p:cNvPr id="100" name="Diamond 99"/>
+            <p:cNvSpPr/>
+            <p:nvPr/>
+          </p:nvSpPr>
+          <p:spPr>
+            <a:xfrm>
+              <a:off x="4191000" y="4267200"/>
+              <a:ext cx="914400" cy="959919"/>
+            </a:xfrm>
+            <a:prstGeom prst="diamond">
+              <a:avLst/>
+            </a:prstGeom>
+            <a:solidFill>
+              <a:schemeClr val="bg1"/>
+            </a:solidFill>
+            <a:ln>
+              <a:solidFill>
+                <a:schemeClr val="tx1"/>
+              </a:solidFill>
+            </a:ln>
+          </p:spPr>
+          <p:style>
+            <a:lnRef idx="2">
+              <a:schemeClr val="accent1">
+                <a:shade val="50000"/>
+              </a:schemeClr>
+            </a:lnRef>
+            <a:fillRef idx="1">
+              <a:schemeClr val="accent1"/>
+            </a:fillRef>
+            <a:effectRef idx="0">
+              <a:schemeClr val="accent1"/>
+            </a:effectRef>
+            <a:fontRef idx="minor">
+              <a:schemeClr val="lt1"/>
+            </a:fontRef>
+          </p:style>
+          <p:txBody>
+            <a:bodyPr rtlCol="0" anchor="ctr"/>
+            <a:lstStyle/>
+            <a:p>
+              <a:pPr algn="ctr"/>
+              <a:endParaRPr lang="en-US"/>
+            </a:p>
+          </p:txBody>
+        </p:sp>
+        <p:cxnSp>
+          <p:nvCxnSpPr>
+            <p:cNvPr id="101" name="Straight Connector 100"/>
+            <p:cNvCxnSpPr/>
+            <p:nvPr/>
+          </p:nvCxnSpPr>
+          <p:spPr>
+            <a:xfrm flipV="1">
+              <a:off x="4648200" y="4114800"/>
+              <a:ext cx="0" cy="152400"/>
+            </a:xfrm>
+            <a:prstGeom prst="line">
+              <a:avLst/>
+            </a:prstGeom>
+            <a:ln w="38100">
+              <a:solidFill>
+                <a:srgbClr val="FFC000"/>
+              </a:solidFill>
+            </a:ln>
+          </p:spPr>
+          <p:style>
+            <a:lnRef idx="1">
+              <a:schemeClr val="accent1"/>
+            </a:lnRef>
+            <a:fillRef idx="0">
+              <a:schemeClr val="accent1"/>
+            </a:fillRef>
+            <a:effectRef idx="0">
+              <a:schemeClr val="accent1"/>
+            </a:effectRef>
+            <a:fontRef idx="minor">
+              <a:schemeClr val="tx1"/>
+            </a:fontRef>
+          </p:style>
+        </p:cxnSp>
+        <p:cxnSp>
+          <p:nvCxnSpPr>
+            <p:cNvPr id="102" name="Straight Connector 101"/>
+            <p:cNvCxnSpPr/>
+            <p:nvPr/>
+          </p:nvCxnSpPr>
+          <p:spPr>
+            <a:xfrm flipV="1">
+              <a:off x="4648200" y="5222870"/>
+              <a:ext cx="0" cy="152400"/>
+            </a:xfrm>
+            <a:prstGeom prst="line">
+              <a:avLst/>
+            </a:prstGeom>
+            <a:ln w="38100">
+              <a:solidFill>
+                <a:srgbClr val="7030A0"/>
+              </a:solidFill>
+            </a:ln>
+          </p:spPr>
+          <p:style>
+            <a:lnRef idx="1">
+              <a:schemeClr val="accent1"/>
+            </a:lnRef>
+            <a:fillRef idx="0">
+              <a:schemeClr val="accent1"/>
+            </a:fillRef>
+            <a:effectRef idx="0">
+              <a:schemeClr val="accent1"/>
+            </a:effectRef>
+            <a:fontRef idx="minor">
+              <a:schemeClr val="tx1"/>
+            </a:fontRef>
+          </p:style>
+        </p:cxnSp>
+      </p:grpSp>
+      <p:sp>
+        <p:nvSpPr>
+          <p:cNvPr id="107" name="TextBox 106"/>
+          <p:cNvSpPr txBox="1"/>
+          <p:nvPr/>
+        </p:nvSpPr>
+        <p:spPr>
+          <a:xfrm>
+            <a:off x="507179" y="1156728"/>
+            <a:ext cx="771943" cy="369332"/>
+          </a:xfrm>
+          <a:prstGeom prst="rect">
+            <a:avLst/>
+          </a:prstGeom>
+          <a:noFill/>
+        </p:spPr>
+        <p:txBody>
+          <a:bodyPr wrap="none" rtlCol="0">
+            <a:spAutoFit/>
+          </a:bodyPr>
+          <a:lstStyle/>
+          <a:p>
+            <a:r>
+              <a:rPr lang="en-US" dirty="0" smtClean="0"/>
+              <a:t>¾ NPT</a:t>
+            </a:r>
+          </a:p>
+        </p:txBody>
+      </p:sp>
+      <p:cxnSp>
+        <p:nvCxnSpPr>
+          <p:cNvPr id="108" name="Straight Connector 107"/>
+          <p:cNvCxnSpPr/>
+          <p:nvPr/>
+        </p:nvCxnSpPr>
+        <p:spPr>
+          <a:xfrm flipV="1">
+            <a:off x="284473" y="1175778"/>
+            <a:ext cx="0" cy="331232"/>
+          </a:xfrm>
+          <a:prstGeom prst="line">
+            <a:avLst/>
+          </a:prstGeom>
+          <a:ln w="38100">
+            <a:solidFill>
+              <a:srgbClr val="FFC000"/>
+            </a:solidFill>
+          </a:ln>
+        </p:spPr>
+        <p:style>
+          <a:lnRef idx="1">
+            <a:schemeClr val="accent1"/>
+          </a:lnRef>
+          <a:fillRef idx="0">
+            <a:schemeClr val="accent1"/>
+          </a:fillRef>
+          <a:effectRef idx="0">
+            <a:schemeClr val="accent1"/>
+          </a:effectRef>
+          <a:fontRef idx="minor">
+            <a:schemeClr val="tx1"/>
+          </a:fontRef>
+        </p:style>
+      </p:cxnSp>
+      <p:sp>
+        <p:nvSpPr>
+          <p:cNvPr id="111" name="TextBox 110"/>
+          <p:cNvSpPr txBox="1"/>
+          <p:nvPr/>
+        </p:nvSpPr>
+        <p:spPr>
+          <a:xfrm>
+            <a:off x="507179" y="787396"/>
+            <a:ext cx="994759" cy="369332"/>
+          </a:xfrm>
+          <a:prstGeom prst="rect">
+            <a:avLst/>
+          </a:prstGeom>
+          <a:noFill/>
+        </p:spPr>
+        <p:txBody>
+          <a:bodyPr wrap="none" rtlCol="0">
+            <a:spAutoFit/>
+          </a:bodyPr>
+          <a:lstStyle/>
+          <a:p>
+            <a:r>
+              <a:rPr lang="en-US" dirty="0" smtClean="0"/>
+              <a:t>1 ½  NPT</a:t>
+            </a:r>
+          </a:p>
+        </p:txBody>
+      </p:sp>
+      <p:cxnSp>
+        <p:nvCxnSpPr>
+          <p:cNvPr id="112" name="Straight Connector 111"/>
+          <p:cNvCxnSpPr/>
+          <p:nvPr/>
+        </p:nvCxnSpPr>
+        <p:spPr>
+          <a:xfrm flipV="1">
+            <a:off x="284473" y="806446"/>
+            <a:ext cx="0" cy="331232"/>
+          </a:xfrm>
+          <a:prstGeom prst="line">
+            <a:avLst/>
+          </a:prstGeom>
+          <a:ln w="38100">
+            <a:solidFill>
+              <a:srgbClr val="7030A0"/>
+            </a:solidFill>
+          </a:ln>
+        </p:spPr>
+        <p:style>
+          <a:lnRef idx="1">
+            <a:schemeClr val="accent1"/>
+          </a:lnRef>
+          <a:fillRef idx="0">
+            <a:schemeClr val="accent1"/>
+          </a:fillRef>
+          <a:effectRef idx="0">
+            <a:schemeClr val="accent1"/>
+          </a:effectRef>
+          <a:fontRef idx="minor">
+            <a:schemeClr val="tx1"/>
+          </a:fontRef>
+        </p:style>
+      </p:cxnSp>
+      <p:cxnSp>
+        <p:nvCxnSpPr>
+          <p:cNvPr id="113" name="Straight Connector 112"/>
+          <p:cNvCxnSpPr/>
+          <p:nvPr/>
+        </p:nvCxnSpPr>
+        <p:spPr>
+          <a:xfrm flipH="1">
+            <a:off x="4907663" y="4466030"/>
+            <a:ext cx="576263" cy="0"/>
+          </a:xfrm>
+          <a:prstGeom prst="line">
+            <a:avLst/>
+          </a:prstGeom>
+          <a:ln w="38100">
+            <a:solidFill>
+              <a:srgbClr val="FFC000"/>
+            </a:solidFill>
+          </a:ln>
+        </p:spPr>
+        <p:style>
+          <a:lnRef idx="1">
+            <a:schemeClr val="accent1"/>
+          </a:lnRef>
+          <a:fillRef idx="0">
+            <a:schemeClr val="accent1"/>
+          </a:fillRef>
+          <a:effectRef idx="0">
+            <a:schemeClr val="accent1"/>
+          </a:effectRef>
+          <a:fontRef idx="minor">
+            <a:schemeClr val="tx1"/>
+          </a:fontRef>
+        </p:style>
+      </p:cxnSp>
+      <p:cxnSp>
+        <p:nvCxnSpPr>
+          <p:cNvPr id="115" name="Straight Connector 114"/>
+          <p:cNvCxnSpPr/>
+          <p:nvPr/>
+        </p:nvCxnSpPr>
+        <p:spPr>
+          <a:xfrm flipH="1" flipV="1">
+            <a:off x="5483926" y="4448051"/>
+            <a:ext cx="1" cy="380817"/>
+          </a:xfrm>
+          <a:prstGeom prst="line">
+            <a:avLst/>
+          </a:prstGeom>
+          <a:ln w="38100">
+            <a:solidFill>
+              <a:srgbClr val="FFC000"/>
+            </a:solidFill>
+          </a:ln>
+        </p:spPr>
+        <p:style>
+          <a:lnRef idx="1">
+            <a:schemeClr val="accent1"/>
+          </a:lnRef>
+          <a:fillRef idx="0">
+            <a:schemeClr val="accent1"/>
+          </a:fillRef>
+          <a:effectRef idx="0">
+            <a:schemeClr val="accent1"/>
+          </a:effectRef>
+          <a:fontRef idx="minor">
+            <a:schemeClr val="tx1"/>
+          </a:fontRef>
+        </p:style>
+      </p:cxnSp>
+      <p:sp>
+        <p:nvSpPr>
+          <p:cNvPr id="116" name="TextBox 115"/>
+          <p:cNvSpPr txBox="1"/>
+          <p:nvPr/>
+        </p:nvSpPr>
+        <p:spPr>
+          <a:xfrm>
+            <a:off x="1778665" y="1169980"/>
+            <a:ext cx="697627" cy="369332"/>
+          </a:xfrm>
+          <a:prstGeom prst="rect">
+            <a:avLst/>
+          </a:prstGeom>
+          <a:noFill/>
+        </p:spPr>
+        <p:txBody>
+          <a:bodyPr wrap="none" rtlCol="0">
+            <a:spAutoFit/>
+          </a:bodyPr>
+          <a:lstStyle/>
+          <a:p>
+            <a:r>
+              <a:rPr lang="en-US" dirty="0" smtClean="0"/>
+              <a:t>¾-16 </a:t>
+            </a:r>
+          </a:p>
+        </p:txBody>
+      </p:sp>
+      <p:cxnSp>
+        <p:nvCxnSpPr>
+          <p:cNvPr id="118" name="Straight Connector 117"/>
+          <p:cNvCxnSpPr/>
+          <p:nvPr/>
+        </p:nvCxnSpPr>
+        <p:spPr>
+          <a:xfrm flipV="1">
+            <a:off x="1555959" y="1189030"/>
+            <a:ext cx="0" cy="331232"/>
+          </a:xfrm>
+          <a:prstGeom prst="line">
+            <a:avLst/>
+          </a:prstGeom>
+          <a:ln w="38100">
+            <a:solidFill>
+              <a:srgbClr val="FF0000"/>
+            </a:solidFill>
+          </a:ln>
+        </p:spPr>
+        <p:style>
+          <a:lnRef idx="1">
+            <a:schemeClr val="accent1"/>
+          </a:lnRef>
+          <a:fillRef idx="0">
+            <a:schemeClr val="accent1"/>
+          </a:fillRef>
+          <a:effectRef idx="0">
+            <a:schemeClr val="accent1"/>
+          </a:effectRef>
+          <a:fontRef idx="minor">
+            <a:schemeClr val="tx1"/>
+          </a:fontRef>
+        </p:style>
+      </p:cxnSp>
+      <p:cxnSp>
+        <p:nvCxnSpPr>
+          <p:cNvPr id="121" name="Straight Connector 120"/>
+          <p:cNvCxnSpPr/>
+          <p:nvPr/>
+        </p:nvCxnSpPr>
+        <p:spPr>
+          <a:xfrm flipV="1">
+            <a:off x="6626926" y="4504130"/>
+            <a:ext cx="0" cy="1539259"/>
+          </a:xfrm>
+          <a:prstGeom prst="line">
+            <a:avLst/>
+          </a:prstGeom>
+          <a:ln w="38100">
+            <a:solidFill>
+              <a:srgbClr val="FF0000"/>
+            </a:solidFill>
+          </a:ln>
+        </p:spPr>
+        <p:style>
+          <a:lnRef idx="1">
+            <a:schemeClr val="accent1"/>
+          </a:lnRef>
+          <a:fillRef idx="0">
+            <a:schemeClr val="accent1"/>
+          </a:fillRef>
+          <a:effectRef idx="0">
+            <a:schemeClr val="accent1"/>
+          </a:effectRef>
+          <a:fontRef idx="minor">
+            <a:schemeClr val="tx1"/>
+          </a:fontRef>
+        </p:style>
+      </p:cxnSp>
+      <p:cxnSp>
+        <p:nvCxnSpPr>
+          <p:cNvPr id="122" name="Straight Connector 121"/>
+          <p:cNvCxnSpPr/>
+          <p:nvPr/>
+        </p:nvCxnSpPr>
+        <p:spPr>
+          <a:xfrm>
+            <a:off x="5464877" y="6036646"/>
+            <a:ext cx="1162049" cy="0"/>
+          </a:xfrm>
+          <a:prstGeom prst="line">
+            <a:avLst/>
+          </a:prstGeom>
+          <a:ln w="38100">
+            <a:solidFill>
+              <a:srgbClr val="7030A0"/>
+            </a:solidFill>
+          </a:ln>
+        </p:spPr>
+        <p:style>
+          <a:lnRef idx="1">
+            <a:schemeClr val="accent1"/>
+          </a:lnRef>
+          <a:fillRef idx="0">
+            <a:schemeClr val="accent1"/>
+          </a:fillRef>
+          <a:effectRef idx="0">
+            <a:schemeClr val="accent1"/>
+          </a:effectRef>
+          <a:fontRef idx="minor">
+            <a:schemeClr val="tx1"/>
+          </a:fontRef>
+        </p:style>
+      </p:cxnSp>
+      <p:cxnSp>
+        <p:nvCxnSpPr>
+          <p:cNvPr id="143" name="Straight Connector 142"/>
+          <p:cNvCxnSpPr/>
+          <p:nvPr/>
+        </p:nvCxnSpPr>
+        <p:spPr>
+          <a:xfrm>
+            <a:off x="6626926" y="2706910"/>
+            <a:ext cx="1" cy="858726"/>
+          </a:xfrm>
+          <a:prstGeom prst="line">
+            <a:avLst/>
+          </a:prstGeom>
+          <a:ln w="38100">
+            <a:solidFill>
+              <a:srgbClr val="FF0000"/>
+            </a:solidFill>
+          </a:ln>
+        </p:spPr>
+        <p:style>
+          <a:lnRef idx="1">
+            <a:schemeClr val="accent1"/>
+          </a:lnRef>
+          <a:fillRef idx="0">
+            <a:schemeClr val="accent1"/>
+          </a:fillRef>
+          <a:effectRef idx="0">
+            <a:schemeClr val="accent1"/>
+          </a:effectRef>
+          <a:fontRef idx="minor">
+            <a:schemeClr val="tx1"/>
+          </a:fontRef>
+        </p:style>
+      </p:cxnSp>
+      <p:sp>
+        <p:nvSpPr>
+          <p:cNvPr id="96" name="TextBox 95"/>
+          <p:cNvSpPr txBox="1"/>
+          <p:nvPr/>
+        </p:nvSpPr>
+        <p:spPr>
+          <a:xfrm>
+            <a:off x="4963721" y="2299955"/>
+            <a:ext cx="3707409" cy="369332"/>
+          </a:xfrm>
+          <a:prstGeom prst="rect">
+            <a:avLst/>
+          </a:prstGeom>
+          <a:noFill/>
+        </p:spPr>
+        <p:txBody>
+          <a:bodyPr wrap="square" rtlCol="0">
+            <a:spAutoFit/>
+          </a:bodyPr>
+          <a:lstStyle/>
+          <a:p>
+            <a:r>
+              <a:rPr lang="en-US" dirty="0" smtClean="0"/>
+              <a:t>Valve has built in pressure relief</a:t>
+            </a:r>
+            <a:endParaRPr lang="en-US" dirty="0"/>
+          </a:p>
+        </p:txBody>
+      </p:sp>
+      <p:sp>
+        <p:nvSpPr>
+          <p:cNvPr id="7" name="Right Arrow 6"/>
+          <p:cNvSpPr/>
+          <p:nvPr/>
+        </p:nvSpPr>
+        <p:spPr>
+          <a:xfrm rot="3100292">
+            <a:off x="1824123" y="3393483"/>
+            <a:ext cx="980619" cy="303180"/>
+          </a:xfrm>
+          <a:prstGeom prst="rightArrow">
+            <a:avLst/>
+          </a:prstGeom>
+        </p:spPr>
+        <p:style>
+          <a:lnRef idx="2">
+            <a:schemeClr val="accent1">
+              <a:shade val="50000"/>
+            </a:schemeClr>
+          </a:lnRef>
+          <a:fillRef idx="1">
+            <a:schemeClr val="accent1"/>
+          </a:fillRef>
+          <a:effectRef idx="0">
+            <a:schemeClr val="accent1"/>
+          </a:effectRef>
+          <a:fontRef idx="minor">
+            <a:schemeClr val="lt1"/>
+          </a:fontRef>
+        </p:style>
+        <p:txBody>
+          <a:bodyPr rtlCol="0" anchor="ctr"/>
+          <a:lstStyle/>
+          <a:p>
+            <a:pPr algn="ctr"/>
+            <a:r>
+              <a:rPr lang="en-US" sz="800" dirty="0" smtClean="0"/>
+              <a:t>Male to Male</a:t>
+            </a:r>
+            <a:endParaRPr lang="en-US" sz="800" dirty="0"/>
+          </a:p>
+        </p:txBody>
+      </p:sp>
+      <p:sp>
+        <p:nvSpPr>
+          <p:cNvPr id="80" name="Right Arrow 79"/>
+          <p:cNvSpPr/>
+          <p:nvPr/>
+        </p:nvSpPr>
+        <p:spPr>
+          <a:xfrm rot="3100292">
+            <a:off x="2226190" y="3393482"/>
+            <a:ext cx="980619" cy="303180"/>
+          </a:xfrm>
+          <a:prstGeom prst="rightArrow">
+            <a:avLst/>
+          </a:prstGeom>
+        </p:spPr>
+        <p:style>
+          <a:lnRef idx="2">
+            <a:schemeClr val="accent1">
+              <a:shade val="50000"/>
+            </a:schemeClr>
+          </a:lnRef>
+          <a:fillRef idx="1">
+            <a:schemeClr val="accent1"/>
+          </a:fillRef>
+          <a:effectRef idx="0">
+            <a:schemeClr val="accent1"/>
+          </a:effectRef>
+          <a:fontRef idx="minor">
+            <a:schemeClr val="lt1"/>
+          </a:fontRef>
+        </p:style>
+        <p:txBody>
+          <a:bodyPr rtlCol="0" anchor="ctr"/>
+          <a:lstStyle/>
+          <a:p>
+            <a:pPr algn="ctr"/>
+            <a:r>
+              <a:rPr lang="en-US" sz="800" dirty="0" smtClean="0"/>
+              <a:t>½ - ½ - ¼ T</a:t>
+            </a:r>
+          </a:p>
+        </p:txBody>
+      </p:sp>
+    </p:spTree>
+    <p:extLst>
+      <p:ext uri="{BB962C8B-B14F-4D97-AF65-F5344CB8AC3E}">
+        <p14:creationId xmlns:p14="http://schemas.microsoft.com/office/powerpoint/2010/main" val="261763476"/>
+      </p:ext>
+    </p:extLst>
+  </p:cSld>
+  <p:clrMapOvr>
+    <a:masterClrMapping/>
+  </p:clrMapOvr>
+</p:sld>
+</file>
+
 <file path=ppt/theme/theme1.xml><?xml version="1.0" encoding="utf-8"?>
 <a:theme xmlns:a="http://schemas.openxmlformats.org/drawingml/2006/main" name="Office Theme">
   <a:themeElements>

</xml_diff>

<commit_message>
Added a filter to the Hydraulic.pptx Design added a steel BOM.txt converted the frame reports to PDF. Deleted the extra Solidworks folder. (Some files are still read only and I can't delete them.)
</commit_message>
<xml_diff>
--- a/Design/Subsystems/Hydraulic.pptx
+++ b/Design/Subsystems/Hydraulic.pptx
@@ -291,7 +291,7 @@
             <a:fld id="{1D8BD707-D9CF-40AE-B4C6-C98DA3205C09}" type="datetimeFigureOut">
               <a:rPr lang="en-US" smtClean="0"/>
               <a:pPr/>
-              <a:t>1/22/2014</a:t>
+              <a:t>1/28/2014</a:t>
             </a:fld>
             <a:endParaRPr lang="en-US"/>
           </a:p>
@@ -458,7 +458,7 @@
             <a:fld id="{1D8BD707-D9CF-40AE-B4C6-C98DA3205C09}" type="datetimeFigureOut">
               <a:rPr lang="en-US" smtClean="0"/>
               <a:pPr/>
-              <a:t>1/22/2014</a:t>
+              <a:t>1/28/2014</a:t>
             </a:fld>
             <a:endParaRPr lang="en-US"/>
           </a:p>
@@ -635,7 +635,7 @@
             <a:fld id="{1D8BD707-D9CF-40AE-B4C6-C98DA3205C09}" type="datetimeFigureOut">
               <a:rPr lang="en-US" smtClean="0"/>
               <a:pPr/>
-              <a:t>1/22/2014</a:t>
+              <a:t>1/28/2014</a:t>
             </a:fld>
             <a:endParaRPr lang="en-US"/>
           </a:p>
@@ -802,7 +802,7 @@
             <a:fld id="{1D8BD707-D9CF-40AE-B4C6-C98DA3205C09}" type="datetimeFigureOut">
               <a:rPr lang="en-US" smtClean="0"/>
               <a:pPr/>
-              <a:t>1/22/2014</a:t>
+              <a:t>1/28/2014</a:t>
             </a:fld>
             <a:endParaRPr lang="en-US"/>
           </a:p>
@@ -1045,7 +1045,7 @@
             <a:fld id="{1D8BD707-D9CF-40AE-B4C6-C98DA3205C09}" type="datetimeFigureOut">
               <a:rPr lang="en-US" smtClean="0"/>
               <a:pPr/>
-              <a:t>1/22/2014</a:t>
+              <a:t>1/28/2014</a:t>
             </a:fld>
             <a:endParaRPr lang="en-US"/>
           </a:p>
@@ -1330,7 +1330,7 @@
             <a:fld id="{1D8BD707-D9CF-40AE-B4C6-C98DA3205C09}" type="datetimeFigureOut">
               <a:rPr lang="en-US" smtClean="0"/>
               <a:pPr/>
-              <a:t>1/22/2014</a:t>
+              <a:t>1/28/2014</a:t>
             </a:fld>
             <a:endParaRPr lang="en-US"/>
           </a:p>
@@ -1749,7 +1749,7 @@
             <a:fld id="{1D8BD707-D9CF-40AE-B4C6-C98DA3205C09}" type="datetimeFigureOut">
               <a:rPr lang="en-US" smtClean="0"/>
               <a:pPr/>
-              <a:t>1/22/2014</a:t>
+              <a:t>1/28/2014</a:t>
             </a:fld>
             <a:endParaRPr lang="en-US"/>
           </a:p>
@@ -1864,7 +1864,7 @@
             <a:fld id="{1D8BD707-D9CF-40AE-B4C6-C98DA3205C09}" type="datetimeFigureOut">
               <a:rPr lang="en-US" smtClean="0"/>
               <a:pPr/>
-              <a:t>1/22/2014</a:t>
+              <a:t>1/28/2014</a:t>
             </a:fld>
             <a:endParaRPr lang="en-US"/>
           </a:p>
@@ -1956,7 +1956,7 @@
             <a:fld id="{1D8BD707-D9CF-40AE-B4C6-C98DA3205C09}" type="datetimeFigureOut">
               <a:rPr lang="en-US" smtClean="0"/>
               <a:pPr/>
-              <a:t>1/22/2014</a:t>
+              <a:t>1/28/2014</a:t>
             </a:fld>
             <a:endParaRPr lang="en-US"/>
           </a:p>
@@ -2230,7 +2230,7 @@
             <a:fld id="{1D8BD707-D9CF-40AE-B4C6-C98DA3205C09}" type="datetimeFigureOut">
               <a:rPr lang="en-US" smtClean="0"/>
               <a:pPr/>
-              <a:t>1/22/2014</a:t>
+              <a:t>1/28/2014</a:t>
             </a:fld>
             <a:endParaRPr lang="en-US"/>
           </a:p>
@@ -2480,7 +2480,7 @@
             <a:fld id="{1D8BD707-D9CF-40AE-B4C6-C98DA3205C09}" type="datetimeFigureOut">
               <a:rPr lang="en-US" smtClean="0"/>
               <a:pPr/>
-              <a:t>1/22/2014</a:t>
+              <a:t>1/28/2014</a:t>
             </a:fld>
             <a:endParaRPr lang="en-US"/>
           </a:p>
@@ -2690,7 +2690,7 @@
             <a:fld id="{1D8BD707-D9CF-40AE-B4C6-C98DA3205C09}" type="datetimeFigureOut">
               <a:rPr lang="en-US" smtClean="0"/>
               <a:pPr/>
-              <a:t>1/22/2014</a:t>
+              <a:t>1/28/2014</a:t>
             </a:fld>
             <a:endParaRPr lang="en-US"/>
           </a:p>
@@ -5478,7 +5478,7 @@
         <p:spPr>
           <a:xfrm>
             <a:off x="5235418" y="4578686"/>
-            <a:ext cx="989630" cy="369332"/>
+            <a:ext cx="1065484" cy="369332"/>
           </a:xfrm>
           <a:prstGeom prst="rect">
             <a:avLst/>
@@ -5492,13 +5492,217 @@
           <a:lstStyle/>
           <a:p>
             <a:r>
-              <a:rPr lang="en-US" dirty="0" err="1" smtClean="0"/>
-              <a:t>Resivour</a:t>
+              <a:rPr lang="en-US" dirty="0" smtClean="0"/>
+              <a:t>Reservoir</a:t>
             </a:r>
             <a:endParaRPr lang="en-US" dirty="0" smtClean="0"/>
           </a:p>
         </p:txBody>
       </p:sp>
+      <p:grpSp>
+        <p:nvGrpSpPr>
+          <p:cNvPr id="75" name="Group 74"/>
+          <p:cNvGrpSpPr/>
+          <p:nvPr/>
+        </p:nvGrpSpPr>
+        <p:grpSpPr>
+          <a:xfrm rot="16200000">
+            <a:off x="7086600" y="4180206"/>
+            <a:ext cx="914400" cy="1260470"/>
+            <a:chOff x="4191000" y="4114800"/>
+            <a:chExt cx="914400" cy="1260470"/>
+          </a:xfrm>
+        </p:grpSpPr>
+        <p:sp>
+          <p:nvSpPr>
+            <p:cNvPr id="76" name="Diamond 75"/>
+            <p:cNvSpPr/>
+            <p:nvPr/>
+          </p:nvSpPr>
+          <p:spPr>
+            <a:xfrm>
+              <a:off x="4191000" y="4267200"/>
+              <a:ext cx="914400" cy="959919"/>
+            </a:xfrm>
+            <a:prstGeom prst="diamond">
+              <a:avLst/>
+            </a:prstGeom>
+            <a:solidFill>
+              <a:schemeClr val="bg1"/>
+            </a:solidFill>
+            <a:ln>
+              <a:solidFill>
+                <a:schemeClr val="tx1"/>
+              </a:solidFill>
+            </a:ln>
+          </p:spPr>
+          <p:style>
+            <a:lnRef idx="2">
+              <a:schemeClr val="accent1">
+                <a:shade val="50000"/>
+              </a:schemeClr>
+            </a:lnRef>
+            <a:fillRef idx="1">
+              <a:schemeClr val="accent1"/>
+            </a:fillRef>
+            <a:effectRef idx="0">
+              <a:schemeClr val="accent1"/>
+            </a:effectRef>
+            <a:fontRef idx="minor">
+              <a:schemeClr val="lt1"/>
+            </a:fontRef>
+          </p:style>
+          <p:txBody>
+            <a:bodyPr rtlCol="0" anchor="ctr"/>
+            <a:lstStyle/>
+            <a:p>
+              <a:pPr algn="ctr"/>
+              <a:endParaRPr lang="en-US"/>
+            </a:p>
+          </p:txBody>
+        </p:sp>
+        <p:cxnSp>
+          <p:nvCxnSpPr>
+            <p:cNvPr id="78" name="Straight Connector 77"/>
+            <p:cNvCxnSpPr/>
+            <p:nvPr/>
+          </p:nvCxnSpPr>
+          <p:spPr>
+            <a:xfrm flipV="1">
+              <a:off x="4648200" y="4114800"/>
+              <a:ext cx="0" cy="152400"/>
+            </a:xfrm>
+            <a:prstGeom prst="line">
+              <a:avLst/>
+            </a:prstGeom>
+            <a:ln w="38100">
+              <a:solidFill>
+                <a:schemeClr val="tx1"/>
+              </a:solidFill>
+            </a:ln>
+          </p:spPr>
+          <p:style>
+            <a:lnRef idx="1">
+              <a:schemeClr val="accent1"/>
+            </a:lnRef>
+            <a:fillRef idx="0">
+              <a:schemeClr val="accent1"/>
+            </a:fillRef>
+            <a:effectRef idx="0">
+              <a:schemeClr val="accent1"/>
+            </a:effectRef>
+            <a:fontRef idx="minor">
+              <a:schemeClr val="tx1"/>
+            </a:fontRef>
+          </p:style>
+        </p:cxnSp>
+        <p:cxnSp>
+          <p:nvCxnSpPr>
+            <p:cNvPr id="79" name="Straight Connector 78"/>
+            <p:cNvCxnSpPr/>
+            <p:nvPr/>
+          </p:nvCxnSpPr>
+          <p:spPr>
+            <a:xfrm flipV="1">
+              <a:off x="4648200" y="5222870"/>
+              <a:ext cx="0" cy="152400"/>
+            </a:xfrm>
+            <a:prstGeom prst="line">
+              <a:avLst/>
+            </a:prstGeom>
+            <a:ln w="38100">
+              <a:solidFill>
+                <a:schemeClr val="tx1"/>
+              </a:solidFill>
+            </a:ln>
+          </p:spPr>
+          <p:style>
+            <a:lnRef idx="1">
+              <a:schemeClr val="accent1"/>
+            </a:lnRef>
+            <a:fillRef idx="0">
+              <a:schemeClr val="accent1"/>
+            </a:fillRef>
+            <a:effectRef idx="0">
+              <a:schemeClr val="accent1"/>
+            </a:effectRef>
+            <a:fontRef idx="minor">
+              <a:schemeClr val="tx1"/>
+            </a:fontRef>
+          </p:style>
+        </p:cxnSp>
+      </p:grpSp>
+      <p:sp>
+        <p:nvSpPr>
+          <p:cNvPr id="81" name="TextBox 80"/>
+          <p:cNvSpPr txBox="1"/>
+          <p:nvPr/>
+        </p:nvSpPr>
+        <p:spPr>
+          <a:xfrm>
+            <a:off x="7764698" y="4267200"/>
+            <a:ext cx="666273" cy="369332"/>
+          </a:xfrm>
+          <a:prstGeom prst="rect">
+            <a:avLst/>
+          </a:prstGeom>
+          <a:noFill/>
+        </p:spPr>
+        <p:txBody>
+          <a:bodyPr wrap="none" rtlCol="0">
+            <a:spAutoFit/>
+          </a:bodyPr>
+          <a:lstStyle/>
+          <a:p>
+            <a:r>
+              <a:rPr lang="en-US" dirty="0" smtClean="0"/>
+              <a:t>Filter</a:t>
+            </a:r>
+            <a:endParaRPr lang="en-US" dirty="0" smtClean="0"/>
+          </a:p>
+        </p:txBody>
+      </p:sp>
+      <p:cxnSp>
+        <p:nvCxnSpPr>
+          <p:cNvPr id="82" name="Straight Arrow Connector 81"/>
+          <p:cNvCxnSpPr>
+            <a:stCxn id="76" idx="1"/>
+            <a:endCxn id="76" idx="3"/>
+          </p:cNvCxnSpPr>
+          <p:nvPr/>
+        </p:nvCxnSpPr>
+        <p:spPr>
+          <a:xfrm flipV="1">
+            <a:off x="7545926" y="4353241"/>
+            <a:ext cx="0" cy="914400"/>
+          </a:xfrm>
+          <a:prstGeom prst="straightConnector1">
+            <a:avLst/>
+          </a:prstGeom>
+          <a:ln w="19050">
+            <a:solidFill>
+              <a:schemeClr val="tx1"/>
+            </a:solidFill>
+            <a:prstDash val="dash"/>
+            <a:headEnd type="none"/>
+            <a:tailEnd type="none"/>
+          </a:ln>
+        </p:spPr>
+        <p:style>
+          <a:lnRef idx="1">
+            <a:schemeClr val="accent1"/>
+          </a:lnRef>
+          <a:fillRef idx="0">
+            <a:schemeClr val="accent1"/>
+          </a:fillRef>
+          <a:effectRef idx="0">
+            <a:schemeClr val="accent1"/>
+          </a:effectRef>
+          <a:fontRef idx="minor">
+            <a:schemeClr val="tx1"/>
+          </a:fontRef>
+        </p:style>
+      </p:cxnSp>
     </p:spTree>
     <p:extLst>
       <p:ext uri="{BB962C8B-B14F-4D97-AF65-F5344CB8AC3E}">
@@ -7335,8 +7539,8 @@
         </p:nvCxnSpPr>
         <p:spPr>
           <a:xfrm flipH="1">
-            <a:off x="3538537" y="3298432"/>
-            <a:ext cx="576263" cy="0"/>
+            <a:off x="3959620" y="3298432"/>
+            <a:ext cx="155181" cy="0"/>
           </a:xfrm>
           <a:prstGeom prst="line">
             <a:avLst/>
@@ -8160,6 +8364,180 @@
           </a:p>
         </p:txBody>
       </p:sp>
+      <p:grpSp>
+        <p:nvGrpSpPr>
+          <p:cNvPr id="77" name="Group 76"/>
+          <p:cNvGrpSpPr/>
+          <p:nvPr/>
+        </p:nvGrpSpPr>
+        <p:grpSpPr>
+          <a:xfrm rot="16200000">
+            <a:off x="3522037" y="2984377"/>
+            <a:ext cx="468050" cy="628110"/>
+            <a:chOff x="4191000" y="4114800"/>
+            <a:chExt cx="914400" cy="1260470"/>
+          </a:xfrm>
+        </p:grpSpPr>
+        <p:sp>
+          <p:nvSpPr>
+            <p:cNvPr id="80" name="Diamond 79"/>
+            <p:cNvSpPr/>
+            <p:nvPr/>
+          </p:nvSpPr>
+          <p:spPr>
+            <a:xfrm>
+              <a:off x="4191000" y="4267200"/>
+              <a:ext cx="914400" cy="959919"/>
+            </a:xfrm>
+            <a:prstGeom prst="diamond">
+              <a:avLst/>
+            </a:prstGeom>
+            <a:solidFill>
+              <a:schemeClr val="bg1"/>
+            </a:solidFill>
+            <a:ln>
+              <a:solidFill>
+                <a:schemeClr val="tx1"/>
+              </a:solidFill>
+            </a:ln>
+          </p:spPr>
+          <p:style>
+            <a:lnRef idx="2">
+              <a:schemeClr val="accent1">
+                <a:shade val="50000"/>
+              </a:schemeClr>
+            </a:lnRef>
+            <a:fillRef idx="1">
+              <a:schemeClr val="accent1"/>
+            </a:fillRef>
+            <a:effectRef idx="0">
+              <a:schemeClr val="accent1"/>
+            </a:effectRef>
+            <a:fontRef idx="minor">
+              <a:schemeClr val="lt1"/>
+            </a:fontRef>
+          </p:style>
+          <p:txBody>
+            <a:bodyPr rtlCol="0" anchor="ctr"/>
+            <a:lstStyle/>
+            <a:p>
+              <a:pPr algn="ctr"/>
+              <a:endParaRPr lang="en-US"/>
+            </a:p>
+          </p:txBody>
+        </p:sp>
+        <p:cxnSp>
+          <p:nvCxnSpPr>
+            <p:cNvPr id="81" name="Straight Connector 80"/>
+            <p:cNvCxnSpPr/>
+            <p:nvPr/>
+          </p:nvCxnSpPr>
+          <p:spPr>
+            <a:xfrm flipV="1">
+              <a:off x="4648200" y="4114800"/>
+              <a:ext cx="0" cy="152400"/>
+            </a:xfrm>
+            <a:prstGeom prst="line">
+              <a:avLst/>
+            </a:prstGeom>
+            <a:ln w="38100">
+              <a:solidFill>
+                <a:srgbClr val="FFC000"/>
+              </a:solidFill>
+            </a:ln>
+          </p:spPr>
+          <p:style>
+            <a:lnRef idx="1">
+              <a:schemeClr val="accent1"/>
+            </a:lnRef>
+            <a:fillRef idx="0">
+              <a:schemeClr val="accent1"/>
+            </a:fillRef>
+            <a:effectRef idx="0">
+              <a:schemeClr val="accent1"/>
+            </a:effectRef>
+            <a:fontRef idx="minor">
+              <a:schemeClr val="tx1"/>
+            </a:fontRef>
+          </p:style>
+        </p:cxnSp>
+        <p:cxnSp>
+          <p:nvCxnSpPr>
+            <p:cNvPr id="82" name="Straight Connector 81"/>
+            <p:cNvCxnSpPr/>
+            <p:nvPr/>
+          </p:nvCxnSpPr>
+          <p:spPr>
+            <a:xfrm flipV="1">
+              <a:off x="4648200" y="5222870"/>
+              <a:ext cx="0" cy="152400"/>
+            </a:xfrm>
+            <a:prstGeom prst="line">
+              <a:avLst/>
+            </a:prstGeom>
+            <a:ln w="38100">
+              <a:solidFill>
+                <a:srgbClr val="FFC000"/>
+              </a:solidFill>
+            </a:ln>
+          </p:spPr>
+          <p:style>
+            <a:lnRef idx="1">
+              <a:schemeClr val="accent1"/>
+            </a:lnRef>
+            <a:fillRef idx="0">
+              <a:schemeClr val="accent1"/>
+            </a:fillRef>
+            <a:effectRef idx="0">
+              <a:schemeClr val="accent1"/>
+            </a:effectRef>
+            <a:fontRef idx="minor">
+              <a:schemeClr val="tx1"/>
+            </a:fontRef>
+          </p:style>
+        </p:cxnSp>
+      </p:grpSp>
+      <p:cxnSp>
+        <p:nvCxnSpPr>
+          <p:cNvPr id="85" name="Straight Arrow Connector 84"/>
+          <p:cNvCxnSpPr>
+            <a:stCxn id="80" idx="1"/>
+            <a:endCxn id="80" idx="3"/>
+          </p:cNvCxnSpPr>
+          <p:nvPr/>
+        </p:nvCxnSpPr>
+        <p:spPr>
+          <a:xfrm flipV="1">
+            <a:off x="3757122" y="3064407"/>
+            <a:ext cx="0" cy="468050"/>
+          </a:xfrm>
+          <a:prstGeom prst="straightConnector1">
+            <a:avLst/>
+          </a:prstGeom>
+          <a:ln w="19050">
+            <a:solidFill>
+              <a:schemeClr val="tx1"/>
+            </a:solidFill>
+            <a:prstDash val="dash"/>
+            <a:headEnd type="none"/>
+            <a:tailEnd type="none"/>
+          </a:ln>
+        </p:spPr>
+        <p:style>
+          <a:lnRef idx="1">
+            <a:schemeClr val="accent1"/>
+          </a:lnRef>
+          <a:fillRef idx="0">
+            <a:schemeClr val="accent1"/>
+          </a:fillRef>
+          <a:effectRef idx="0">
+            <a:schemeClr val="accent1"/>
+          </a:effectRef>
+          <a:fontRef idx="minor">
+            <a:schemeClr val="tx1"/>
+          </a:fontRef>
+        </p:style>
+      </p:cxnSp>
     </p:spTree>
     <p:extLst>
       <p:ext uri="{BB962C8B-B14F-4D97-AF65-F5344CB8AC3E}">
@@ -8170,6 +8548,13 @@
   <p:clrMapOvr>
     <a:masterClrMapping/>
   </p:clrMapOvr>
+  <p:timing>
+    <p:tnLst>
+      <p:par>
+        <p:cTn id="1" dur="indefinite" restart="never" nodeType="tmRoot"/>
+      </p:par>
+    </p:tnLst>
+  </p:timing>
 </p:sld>
 </file>
 

</xml_diff>

<commit_message>
Updated BOM to have shipping Updated hydraulics to include filter
</commit_message>
<xml_diff>
--- a/Design/Subsystems/Hydraulic.pptx
+++ b/Design/Subsystems/Hydraulic.pptx
@@ -5495,143 +5495,9 @@
               <a:rPr lang="en-US" dirty="0" smtClean="0"/>
               <a:t>Reservoir</a:t>
             </a:r>
-            <a:endParaRPr lang="en-US" dirty="0" smtClean="0"/>
           </a:p>
         </p:txBody>
       </p:sp>
-      <p:grpSp>
-        <p:nvGrpSpPr>
-          <p:cNvPr id="75" name="Group 74"/>
-          <p:cNvGrpSpPr/>
-          <p:nvPr/>
-        </p:nvGrpSpPr>
-        <p:grpSpPr>
-          <a:xfrm rot="16200000">
-            <a:off x="7086600" y="4180206"/>
-            <a:ext cx="914400" cy="1260470"/>
-            <a:chOff x="4191000" y="4114800"/>
-            <a:chExt cx="914400" cy="1260470"/>
-          </a:xfrm>
-        </p:grpSpPr>
-        <p:sp>
-          <p:nvSpPr>
-            <p:cNvPr id="76" name="Diamond 75"/>
-            <p:cNvSpPr/>
-            <p:nvPr/>
-          </p:nvSpPr>
-          <p:spPr>
-            <a:xfrm>
-              <a:off x="4191000" y="4267200"/>
-              <a:ext cx="914400" cy="959919"/>
-            </a:xfrm>
-            <a:prstGeom prst="diamond">
-              <a:avLst/>
-            </a:prstGeom>
-            <a:solidFill>
-              <a:schemeClr val="bg1"/>
-            </a:solidFill>
-            <a:ln>
-              <a:solidFill>
-                <a:schemeClr val="tx1"/>
-              </a:solidFill>
-            </a:ln>
-          </p:spPr>
-          <p:style>
-            <a:lnRef idx="2">
-              <a:schemeClr val="accent1">
-                <a:shade val="50000"/>
-              </a:schemeClr>
-            </a:lnRef>
-            <a:fillRef idx="1">
-              <a:schemeClr val="accent1"/>
-            </a:fillRef>
-            <a:effectRef idx="0">
-              <a:schemeClr val="accent1"/>
-            </a:effectRef>
-            <a:fontRef idx="minor">
-              <a:schemeClr val="lt1"/>
-            </a:fontRef>
-          </p:style>
-          <p:txBody>
-            <a:bodyPr rtlCol="0" anchor="ctr"/>
-            <a:lstStyle/>
-            <a:p>
-              <a:pPr algn="ctr"/>
-              <a:endParaRPr lang="en-US"/>
-            </a:p>
-          </p:txBody>
-        </p:sp>
-        <p:cxnSp>
-          <p:nvCxnSpPr>
-            <p:cNvPr id="78" name="Straight Connector 77"/>
-            <p:cNvCxnSpPr/>
-            <p:nvPr/>
-          </p:nvCxnSpPr>
-          <p:spPr>
-            <a:xfrm flipV="1">
-              <a:off x="4648200" y="4114800"/>
-              <a:ext cx="0" cy="152400"/>
-            </a:xfrm>
-            <a:prstGeom prst="line">
-              <a:avLst/>
-            </a:prstGeom>
-            <a:ln w="38100">
-              <a:solidFill>
-                <a:schemeClr val="tx1"/>
-              </a:solidFill>
-            </a:ln>
-          </p:spPr>
-          <p:style>
-            <a:lnRef idx="1">
-              <a:schemeClr val="accent1"/>
-            </a:lnRef>
-            <a:fillRef idx="0">
-              <a:schemeClr val="accent1"/>
-            </a:fillRef>
-            <a:effectRef idx="0">
-              <a:schemeClr val="accent1"/>
-            </a:effectRef>
-            <a:fontRef idx="minor">
-              <a:schemeClr val="tx1"/>
-            </a:fontRef>
-          </p:style>
-        </p:cxnSp>
-        <p:cxnSp>
-          <p:nvCxnSpPr>
-            <p:cNvPr id="79" name="Straight Connector 78"/>
-            <p:cNvCxnSpPr/>
-            <p:nvPr/>
-          </p:nvCxnSpPr>
-          <p:spPr>
-            <a:xfrm flipV="1">
-              <a:off x="4648200" y="5222870"/>
-              <a:ext cx="0" cy="152400"/>
-            </a:xfrm>
-            <a:prstGeom prst="line">
-              <a:avLst/>
-            </a:prstGeom>
-            <a:ln w="38100">
-              <a:solidFill>
-                <a:schemeClr val="tx1"/>
-              </a:solidFill>
-            </a:ln>
-          </p:spPr>
-          <p:style>
-            <a:lnRef idx="1">
-              <a:schemeClr val="accent1"/>
-            </a:lnRef>
-            <a:fillRef idx="0">
-              <a:schemeClr val="accent1"/>
-            </a:fillRef>
-            <a:effectRef idx="0">
-              <a:schemeClr val="accent1"/>
-            </a:effectRef>
-            <a:fontRef idx="minor">
-              <a:schemeClr val="tx1"/>
-            </a:fontRef>
-          </p:style>
-        </p:cxnSp>
-      </p:grpSp>
       <p:sp>
         <p:nvSpPr>
           <p:cNvPr id="81" name="TextBox 80"/>
@@ -5658,51 +5524,198 @@
               <a:rPr lang="en-US" dirty="0" smtClean="0"/>
               <a:t>Filter</a:t>
             </a:r>
-            <a:endParaRPr lang="en-US" dirty="0" smtClean="0"/>
           </a:p>
         </p:txBody>
       </p:sp>
-      <p:cxnSp>
-        <p:nvCxnSpPr>
-          <p:cNvPr id="82" name="Straight Arrow Connector 81"/>
-          <p:cNvCxnSpPr>
-            <a:stCxn id="76" idx="1"/>
-            <a:endCxn id="76" idx="3"/>
-          </p:cNvCxnSpPr>
+      <p:grpSp>
+        <p:nvGrpSpPr>
+          <p:cNvPr id="3" name="Group 2"/>
+          <p:cNvGrpSpPr/>
           <p:nvPr/>
-        </p:nvCxnSpPr>
-        <p:spPr>
-          <a:xfrm flipV="1">
-            <a:off x="7545926" y="4353241"/>
-            <a:ext cx="0" cy="914400"/>
+        </p:nvGrpSpPr>
+        <p:grpSpPr>
+          <a:xfrm>
+            <a:off x="6913565" y="4353241"/>
+            <a:ext cx="1260470" cy="914400"/>
+            <a:chOff x="6913565" y="4353241"/>
+            <a:chExt cx="1260470" cy="914400"/>
           </a:xfrm>
-          <a:prstGeom prst="straightConnector1">
-            <a:avLst/>
-          </a:prstGeom>
-          <a:ln w="19050">
-            <a:solidFill>
+        </p:grpSpPr>
+        <p:grpSp>
+          <p:nvGrpSpPr>
+            <p:cNvPr id="75" name="Group 74"/>
+            <p:cNvGrpSpPr/>
+            <p:nvPr/>
+          </p:nvGrpSpPr>
+          <p:grpSpPr>
+            <a:xfrm rot="16200000">
+              <a:off x="7086600" y="4180206"/>
+              <a:ext cx="914400" cy="1260470"/>
+              <a:chOff x="4191000" y="4114800"/>
+              <a:chExt cx="914400" cy="1260470"/>
+            </a:xfrm>
+          </p:grpSpPr>
+          <p:sp>
+            <p:nvSpPr>
+              <p:cNvPr id="76" name="Diamond 75"/>
+              <p:cNvSpPr/>
+              <p:nvPr/>
+            </p:nvSpPr>
+            <p:spPr>
+              <a:xfrm>
+                <a:off x="4191000" y="4267200"/>
+                <a:ext cx="914400" cy="959919"/>
+              </a:xfrm>
+              <a:prstGeom prst="diamond">
+                <a:avLst/>
+              </a:prstGeom>
+              <a:solidFill>
+                <a:schemeClr val="bg1"/>
+              </a:solidFill>
+              <a:ln>
+                <a:solidFill>
+                  <a:schemeClr val="tx1"/>
+                </a:solidFill>
+              </a:ln>
+            </p:spPr>
+            <p:style>
+              <a:lnRef idx="2">
+                <a:schemeClr val="accent1">
+                  <a:shade val="50000"/>
+                </a:schemeClr>
+              </a:lnRef>
+              <a:fillRef idx="1">
+                <a:schemeClr val="accent1"/>
+              </a:fillRef>
+              <a:effectRef idx="0">
+                <a:schemeClr val="accent1"/>
+              </a:effectRef>
+              <a:fontRef idx="minor">
+                <a:schemeClr val="lt1"/>
+              </a:fontRef>
+            </p:style>
+            <p:txBody>
+              <a:bodyPr rtlCol="0" anchor="ctr"/>
+              <a:lstStyle/>
+              <a:p>
+                <a:pPr algn="ctr"/>
+                <a:endParaRPr lang="en-US"/>
+              </a:p>
+            </p:txBody>
+          </p:sp>
+          <p:cxnSp>
+            <p:nvCxnSpPr>
+              <p:cNvPr id="78" name="Straight Connector 77"/>
+              <p:cNvCxnSpPr/>
+              <p:nvPr/>
+            </p:nvCxnSpPr>
+            <p:spPr>
+              <a:xfrm flipV="1">
+                <a:off x="4648200" y="4114800"/>
+                <a:ext cx="0" cy="152400"/>
+              </a:xfrm>
+              <a:prstGeom prst="line">
+                <a:avLst/>
+              </a:prstGeom>
+              <a:ln w="38100">
+                <a:solidFill>
+                  <a:schemeClr val="tx1"/>
+                </a:solidFill>
+              </a:ln>
+            </p:spPr>
+            <p:style>
+              <a:lnRef idx="1">
+                <a:schemeClr val="accent1"/>
+              </a:lnRef>
+              <a:fillRef idx="0">
+                <a:schemeClr val="accent1"/>
+              </a:fillRef>
+              <a:effectRef idx="0">
+                <a:schemeClr val="accent1"/>
+              </a:effectRef>
+              <a:fontRef idx="minor">
+                <a:schemeClr val="tx1"/>
+              </a:fontRef>
+            </p:style>
+          </p:cxnSp>
+          <p:cxnSp>
+            <p:nvCxnSpPr>
+              <p:cNvPr id="79" name="Straight Connector 78"/>
+              <p:cNvCxnSpPr/>
+              <p:nvPr/>
+            </p:nvCxnSpPr>
+            <p:spPr>
+              <a:xfrm flipV="1">
+                <a:off x="4648200" y="5222870"/>
+                <a:ext cx="0" cy="152400"/>
+              </a:xfrm>
+              <a:prstGeom prst="line">
+                <a:avLst/>
+              </a:prstGeom>
+              <a:ln w="38100">
+                <a:solidFill>
+                  <a:schemeClr val="tx1"/>
+                </a:solidFill>
+              </a:ln>
+            </p:spPr>
+            <p:style>
+              <a:lnRef idx="1">
+                <a:schemeClr val="accent1"/>
+              </a:lnRef>
+              <a:fillRef idx="0">
+                <a:schemeClr val="accent1"/>
+              </a:fillRef>
+              <a:effectRef idx="0">
+                <a:schemeClr val="accent1"/>
+              </a:effectRef>
+              <a:fontRef idx="minor">
+                <a:schemeClr val="tx1"/>
+              </a:fontRef>
+            </p:style>
+          </p:cxnSp>
+        </p:grpSp>
+        <p:cxnSp>
+          <p:nvCxnSpPr>
+            <p:cNvPr id="82" name="Straight Arrow Connector 81"/>
+            <p:cNvCxnSpPr>
+              <a:stCxn id="76" idx="1"/>
+              <a:endCxn id="76" idx="3"/>
+            </p:cNvCxnSpPr>
+            <p:nvPr/>
+          </p:nvCxnSpPr>
+          <p:spPr>
+            <a:xfrm flipV="1">
+              <a:off x="7545926" y="4353241"/>
+              <a:ext cx="0" cy="914400"/>
+            </a:xfrm>
+            <a:prstGeom prst="straightConnector1">
+              <a:avLst/>
+            </a:prstGeom>
+            <a:ln w="19050">
+              <a:solidFill>
+                <a:schemeClr val="tx1"/>
+              </a:solidFill>
+              <a:prstDash val="dash"/>
+              <a:headEnd type="none"/>
+              <a:tailEnd type="none"/>
+            </a:ln>
+          </p:spPr>
+          <p:style>
+            <a:lnRef idx="1">
+              <a:schemeClr val="accent1"/>
+            </a:lnRef>
+            <a:fillRef idx="0">
+              <a:schemeClr val="accent1"/>
+            </a:fillRef>
+            <a:effectRef idx="0">
+              <a:schemeClr val="accent1"/>
+            </a:effectRef>
+            <a:fontRef idx="minor">
               <a:schemeClr val="tx1"/>
-            </a:solidFill>
-            <a:prstDash val="dash"/>
-            <a:headEnd type="none"/>
-            <a:tailEnd type="none"/>
-          </a:ln>
-        </p:spPr>
-        <p:style>
-          <a:lnRef idx="1">
-            <a:schemeClr val="accent1"/>
-          </a:lnRef>
-          <a:fillRef idx="0">
-            <a:schemeClr val="accent1"/>
-          </a:fillRef>
-          <a:effectRef idx="0">
-            <a:schemeClr val="accent1"/>
-          </a:effectRef>
-          <a:fontRef idx="minor">
-            <a:schemeClr val="tx1"/>
-          </a:fontRef>
-        </p:style>
-      </p:cxnSp>
+            </a:fontRef>
+          </p:style>
+        </p:cxnSp>
+      </p:grpSp>
     </p:spTree>
     <p:extLst>
       <p:ext uri="{BB962C8B-B14F-4D97-AF65-F5344CB8AC3E}">
@@ -6220,10 +6233,10 @@
         </p:nvGrpSpPr>
         <p:grpSpPr>
           <a:xfrm rot="5400000">
-            <a:off x="2140158" y="2461488"/>
-            <a:ext cx="1828800" cy="1002742"/>
-            <a:chOff x="5181600" y="3897868"/>
-            <a:chExt cx="1828800" cy="1002742"/>
+            <a:off x="2419594" y="2182052"/>
+            <a:ext cx="1828800" cy="1561614"/>
+            <a:chOff x="5181600" y="3338996"/>
+            <a:chExt cx="1828800" cy="1561614"/>
           </a:xfrm>
         </p:grpSpPr>
         <p:sp>
@@ -6582,9 +6595,9 @@
             <p:nvPr/>
           </p:nvCxnSpPr>
           <p:spPr>
-            <a:xfrm flipV="1">
-              <a:off x="6431573" y="3897868"/>
-              <a:ext cx="0" cy="331232"/>
+            <a:xfrm rot="16200000">
+              <a:off x="5986521" y="3784048"/>
+              <a:ext cx="890104" cy="0"/>
             </a:xfrm>
             <a:prstGeom prst="line">
               <a:avLst/>
@@ -7533,41 +7546,6 @@
       </p:cxnSp>
       <p:cxnSp>
         <p:nvCxnSpPr>
-          <p:cNvPr id="113" name="Straight Connector 112"/>
-          <p:cNvCxnSpPr/>
-          <p:nvPr/>
-        </p:nvCxnSpPr>
-        <p:spPr>
-          <a:xfrm flipH="1">
-            <a:off x="3959620" y="3298432"/>
-            <a:ext cx="155181" cy="0"/>
-          </a:xfrm>
-          <a:prstGeom prst="line">
-            <a:avLst/>
-          </a:prstGeom>
-          <a:ln w="38100">
-            <a:solidFill>
-              <a:srgbClr val="FFC000"/>
-            </a:solidFill>
-          </a:ln>
-        </p:spPr>
-        <p:style>
-          <a:lnRef idx="1">
-            <a:schemeClr val="accent1"/>
-          </a:lnRef>
-          <a:fillRef idx="0">
-            <a:schemeClr val="accent1"/>
-          </a:fillRef>
-          <a:effectRef idx="0">
-            <a:schemeClr val="accent1"/>
-          </a:effectRef>
-          <a:fontRef idx="minor">
-            <a:schemeClr val="tx1"/>
-          </a:fontRef>
-        </p:style>
-      </p:cxnSp>
-      <p:cxnSp>
-        <p:nvCxnSpPr>
           <p:cNvPr id="115" name="Straight Connector 114"/>
           <p:cNvCxnSpPr/>
           <p:nvPr/>
@@ -8366,119 +8344,175 @@
       </p:sp>
       <p:grpSp>
         <p:nvGrpSpPr>
-          <p:cNvPr id="77" name="Group 76"/>
+          <p:cNvPr id="3" name="Group 2"/>
           <p:cNvGrpSpPr/>
           <p:nvPr/>
         </p:nvGrpSpPr>
         <p:grpSpPr>
-          <a:xfrm rot="16200000">
-            <a:off x="3522037" y="2984377"/>
-            <a:ext cx="468050" cy="628110"/>
-            <a:chOff x="4191000" y="4114800"/>
-            <a:chExt cx="914400" cy="1260470"/>
+          <a:xfrm rot="5400000">
+            <a:off x="4943745" y="3579922"/>
+            <a:ext cx="628110" cy="468050"/>
+            <a:chOff x="3442007" y="3064407"/>
+            <a:chExt cx="628110" cy="468050"/>
           </a:xfrm>
         </p:grpSpPr>
-        <p:sp>
-          <p:nvSpPr>
-            <p:cNvPr id="80" name="Diamond 79"/>
-            <p:cNvSpPr/>
-            <p:nvPr/>
-          </p:nvSpPr>
-          <p:spPr>
-            <a:xfrm>
-              <a:off x="4191000" y="4267200"/>
-              <a:ext cx="914400" cy="959919"/>
-            </a:xfrm>
-            <a:prstGeom prst="diamond">
-              <a:avLst/>
-            </a:prstGeom>
-            <a:solidFill>
-              <a:schemeClr val="bg1"/>
-            </a:solidFill>
-            <a:ln>
-              <a:solidFill>
-                <a:schemeClr val="tx1"/>
-              </a:solidFill>
-            </a:ln>
-          </p:spPr>
-          <p:style>
-            <a:lnRef idx="2">
-              <a:schemeClr val="accent1">
-                <a:shade val="50000"/>
-              </a:schemeClr>
-            </a:lnRef>
-            <a:fillRef idx="1">
-              <a:schemeClr val="accent1"/>
-            </a:fillRef>
-            <a:effectRef idx="0">
-              <a:schemeClr val="accent1"/>
-            </a:effectRef>
-            <a:fontRef idx="minor">
-              <a:schemeClr val="lt1"/>
-            </a:fontRef>
-          </p:style>
-          <p:txBody>
-            <a:bodyPr rtlCol="0" anchor="ctr"/>
-            <a:lstStyle/>
-            <a:p>
-              <a:pPr algn="ctr"/>
-              <a:endParaRPr lang="en-US"/>
-            </a:p>
-          </p:txBody>
-        </p:sp>
+        <p:grpSp>
+          <p:nvGrpSpPr>
+            <p:cNvPr id="77" name="Group 76"/>
+            <p:cNvGrpSpPr/>
+            <p:nvPr/>
+          </p:nvGrpSpPr>
+          <p:grpSpPr>
+            <a:xfrm rot="16200000">
+              <a:off x="3522037" y="2984377"/>
+              <a:ext cx="468050" cy="628110"/>
+              <a:chOff x="4191000" y="4114800"/>
+              <a:chExt cx="914400" cy="1260470"/>
+            </a:xfrm>
+          </p:grpSpPr>
+          <p:sp>
+            <p:nvSpPr>
+              <p:cNvPr id="80" name="Diamond 79"/>
+              <p:cNvSpPr/>
+              <p:nvPr/>
+            </p:nvSpPr>
+            <p:spPr>
+              <a:xfrm>
+                <a:off x="4191000" y="4267200"/>
+                <a:ext cx="914400" cy="959919"/>
+              </a:xfrm>
+              <a:prstGeom prst="diamond">
+                <a:avLst/>
+              </a:prstGeom>
+              <a:solidFill>
+                <a:schemeClr val="bg1"/>
+              </a:solidFill>
+              <a:ln>
+                <a:solidFill>
+                  <a:schemeClr val="tx1"/>
+                </a:solidFill>
+              </a:ln>
+            </p:spPr>
+            <p:style>
+              <a:lnRef idx="2">
+                <a:schemeClr val="accent1">
+                  <a:shade val="50000"/>
+                </a:schemeClr>
+              </a:lnRef>
+              <a:fillRef idx="1">
+                <a:schemeClr val="accent1"/>
+              </a:fillRef>
+              <a:effectRef idx="0">
+                <a:schemeClr val="accent1"/>
+              </a:effectRef>
+              <a:fontRef idx="minor">
+                <a:schemeClr val="lt1"/>
+              </a:fontRef>
+            </p:style>
+            <p:txBody>
+              <a:bodyPr rtlCol="0" anchor="ctr"/>
+              <a:lstStyle/>
+              <a:p>
+                <a:pPr algn="ctr"/>
+                <a:endParaRPr lang="en-US"/>
+              </a:p>
+            </p:txBody>
+          </p:sp>
+          <p:cxnSp>
+            <p:nvCxnSpPr>
+              <p:cNvPr id="81" name="Straight Connector 80"/>
+              <p:cNvCxnSpPr/>
+              <p:nvPr/>
+            </p:nvCxnSpPr>
+            <p:spPr>
+              <a:xfrm flipV="1">
+                <a:off x="4648200" y="4114800"/>
+                <a:ext cx="0" cy="152400"/>
+              </a:xfrm>
+              <a:prstGeom prst="line">
+                <a:avLst/>
+              </a:prstGeom>
+              <a:ln w="38100">
+                <a:solidFill>
+                  <a:srgbClr val="FF0000"/>
+                </a:solidFill>
+              </a:ln>
+            </p:spPr>
+            <p:style>
+              <a:lnRef idx="1">
+                <a:schemeClr val="accent1"/>
+              </a:lnRef>
+              <a:fillRef idx="0">
+                <a:schemeClr val="accent1"/>
+              </a:fillRef>
+              <a:effectRef idx="0">
+                <a:schemeClr val="accent1"/>
+              </a:effectRef>
+              <a:fontRef idx="minor">
+                <a:schemeClr val="tx1"/>
+              </a:fontRef>
+            </p:style>
+          </p:cxnSp>
+          <p:cxnSp>
+            <p:nvCxnSpPr>
+              <p:cNvPr id="82" name="Straight Connector 81"/>
+              <p:cNvCxnSpPr/>
+              <p:nvPr/>
+            </p:nvCxnSpPr>
+            <p:spPr>
+              <a:xfrm flipV="1">
+                <a:off x="4648200" y="5222870"/>
+                <a:ext cx="0" cy="152400"/>
+              </a:xfrm>
+              <a:prstGeom prst="line">
+                <a:avLst/>
+              </a:prstGeom>
+              <a:ln w="38100">
+                <a:solidFill>
+                  <a:srgbClr val="FF0000"/>
+                </a:solidFill>
+              </a:ln>
+            </p:spPr>
+            <p:style>
+              <a:lnRef idx="1">
+                <a:schemeClr val="accent1"/>
+              </a:lnRef>
+              <a:fillRef idx="0">
+                <a:schemeClr val="accent1"/>
+              </a:fillRef>
+              <a:effectRef idx="0">
+                <a:schemeClr val="accent1"/>
+              </a:effectRef>
+              <a:fontRef idx="minor">
+                <a:schemeClr val="tx1"/>
+              </a:fontRef>
+            </p:style>
+          </p:cxnSp>
+        </p:grpSp>
         <p:cxnSp>
           <p:nvCxnSpPr>
-            <p:cNvPr id="81" name="Straight Connector 80"/>
-            <p:cNvCxnSpPr/>
+            <p:cNvPr id="85" name="Straight Arrow Connector 84"/>
+            <p:cNvCxnSpPr>
+              <a:stCxn id="80" idx="1"/>
+              <a:endCxn id="80" idx="3"/>
+            </p:cNvCxnSpPr>
             <p:nvPr/>
           </p:nvCxnSpPr>
           <p:spPr>
             <a:xfrm flipV="1">
-              <a:off x="4648200" y="4114800"/>
-              <a:ext cx="0" cy="152400"/>
-            </a:xfrm>
-            <a:prstGeom prst="line">
-              <a:avLst/>
-            </a:prstGeom>
-            <a:ln w="38100">
-              <a:solidFill>
-                <a:srgbClr val="FFC000"/>
-              </a:solidFill>
-            </a:ln>
-          </p:spPr>
-          <p:style>
-            <a:lnRef idx="1">
-              <a:schemeClr val="accent1"/>
-            </a:lnRef>
-            <a:fillRef idx="0">
-              <a:schemeClr val="accent1"/>
-            </a:fillRef>
-            <a:effectRef idx="0">
-              <a:schemeClr val="accent1"/>
-            </a:effectRef>
-            <a:fontRef idx="minor">
-              <a:schemeClr val="tx1"/>
-            </a:fontRef>
-          </p:style>
-        </p:cxnSp>
-        <p:cxnSp>
-          <p:nvCxnSpPr>
-            <p:cNvPr id="82" name="Straight Connector 81"/>
-            <p:cNvCxnSpPr/>
-            <p:nvPr/>
-          </p:nvCxnSpPr>
-          <p:spPr>
-            <a:xfrm flipV="1">
-              <a:off x="4648200" y="5222870"/>
-              <a:ext cx="0" cy="152400"/>
-            </a:xfrm>
-            <a:prstGeom prst="line">
-              <a:avLst/>
-            </a:prstGeom>
-            <a:ln w="38100">
-              <a:solidFill>
-                <a:srgbClr val="FFC000"/>
-              </a:solidFill>
+              <a:off x="3757122" y="3064407"/>
+              <a:ext cx="0" cy="468050"/>
+            </a:xfrm>
+            <a:prstGeom prst="straightConnector1">
+              <a:avLst/>
+            </a:prstGeom>
+            <a:ln w="19050">
+              <a:solidFill>
+                <a:schemeClr val="tx1"/>
+              </a:solidFill>
+              <a:prstDash val="dash"/>
+              <a:headEnd type="none"/>
+              <a:tailEnd type="none"/>
             </a:ln>
           </p:spPr>
           <p:style>
@@ -8497,47 +8531,6 @@
           </p:style>
         </p:cxnSp>
       </p:grpSp>
-      <p:cxnSp>
-        <p:nvCxnSpPr>
-          <p:cNvPr id="85" name="Straight Arrow Connector 84"/>
-          <p:cNvCxnSpPr>
-            <a:stCxn id="80" idx="1"/>
-            <a:endCxn id="80" idx="3"/>
-          </p:cNvCxnSpPr>
-          <p:nvPr/>
-        </p:nvCxnSpPr>
-        <p:spPr>
-          <a:xfrm flipV="1">
-            <a:off x="3757122" y="3064407"/>
-            <a:ext cx="0" cy="468050"/>
-          </a:xfrm>
-          <a:prstGeom prst="straightConnector1">
-            <a:avLst/>
-          </a:prstGeom>
-          <a:ln w="19050">
-            <a:solidFill>
-              <a:schemeClr val="tx1"/>
-            </a:solidFill>
-            <a:prstDash val="dash"/>
-            <a:headEnd type="none"/>
-            <a:tailEnd type="none"/>
-          </a:ln>
-        </p:spPr>
-        <p:style>
-          <a:lnRef idx="1">
-            <a:schemeClr val="accent1"/>
-          </a:lnRef>
-          <a:fillRef idx="0">
-            <a:schemeClr val="accent1"/>
-          </a:fillRef>
-          <a:effectRef idx="0">
-            <a:schemeClr val="accent1"/>
-          </a:effectRef>
-          <a:fontRef idx="minor">
-            <a:schemeClr val="tx1"/>
-          </a:fontRef>
-        </p:style>
-      </p:cxnSp>
     </p:spTree>
     <p:extLst>
       <p:ext uri="{BB962C8B-B14F-4D97-AF65-F5344CB8AC3E}">
@@ -8575,6 +8568,41 @@
           <a:chExt cx="0" cy="0"/>
         </a:xfrm>
       </p:grpSpPr>
+      <p:cxnSp>
+        <p:nvCxnSpPr>
+          <p:cNvPr id="81" name="Straight Connector 80"/>
+          <p:cNvCxnSpPr/>
+          <p:nvPr/>
+        </p:nvCxnSpPr>
+        <p:spPr>
+          <a:xfrm flipV="1">
+            <a:off x="6629400" y="5216355"/>
+            <a:ext cx="0" cy="820291"/>
+          </a:xfrm>
+          <a:prstGeom prst="line">
+            <a:avLst/>
+          </a:prstGeom>
+          <a:ln w="38100">
+            <a:solidFill>
+              <a:srgbClr val="7030A0"/>
+            </a:solidFill>
+          </a:ln>
+        </p:spPr>
+        <p:style>
+          <a:lnRef idx="1">
+            <a:schemeClr val="accent1"/>
+          </a:lnRef>
+          <a:fillRef idx="0">
+            <a:schemeClr val="accent1"/>
+          </a:fillRef>
+          <a:effectRef idx="0">
+            <a:schemeClr val="accent1"/>
+          </a:effectRef>
+          <a:fontRef idx="minor">
+            <a:schemeClr val="tx1"/>
+          </a:fontRef>
+        </p:style>
+      </p:cxnSp>
       <p:sp>
         <p:nvSpPr>
           <p:cNvPr id="2" name="Title 1"/>
@@ -10511,9 +10539,9 @@
           <p:nvPr/>
         </p:nvCxnSpPr>
         <p:spPr>
-          <a:xfrm flipV="1">
-            <a:off x="6626926" y="4504130"/>
-            <a:ext cx="0" cy="1539259"/>
+          <a:xfrm flipH="1" flipV="1">
+            <a:off x="6626926" y="4504131"/>
+            <a:ext cx="1" cy="540726"/>
           </a:xfrm>
           <a:prstGeom prst="line">
             <a:avLst/>
@@ -10677,7 +10705,11 @@
             <a:pPr algn="ctr"/>
             <a:r>
               <a:rPr lang="en-US" sz="800" dirty="0" smtClean="0"/>
-              <a:t>Male to Male</a:t>
+              <a:t>Male to </a:t>
+            </a:r>
+            <a:r>
+              <a:rPr lang="en-US" sz="800" dirty="0" smtClean="0"/>
+              <a:t>Male</a:t>
             </a:r>
             <a:endParaRPr lang="en-US" sz="800" dirty="0"/>
           </a:p>
@@ -10723,6 +10755,283 @@
               <a:rPr lang="en-US" sz="800" dirty="0" smtClean="0"/>
               <a:t>½ - ½ - ¼ T</a:t>
             </a:r>
+          </a:p>
+        </p:txBody>
+      </p:sp>
+      <p:sp>
+        <p:nvSpPr>
+          <p:cNvPr id="64" name="Right Arrow 63"/>
+          <p:cNvSpPr/>
+          <p:nvPr/>
+        </p:nvSpPr>
+        <p:spPr>
+          <a:xfrm rot="18900000">
+            <a:off x="4201888" y="4707528"/>
+            <a:ext cx="980619" cy="303180"/>
+          </a:xfrm>
+          <a:prstGeom prst="rightArrow">
+            <a:avLst/>
+          </a:prstGeom>
+        </p:spPr>
+        <p:style>
+          <a:lnRef idx="2">
+            <a:schemeClr val="accent1">
+              <a:shade val="50000"/>
+            </a:schemeClr>
+          </a:lnRef>
+          <a:fillRef idx="1">
+            <a:schemeClr val="accent1"/>
+          </a:fillRef>
+          <a:effectRef idx="0">
+            <a:schemeClr val="accent1"/>
+          </a:effectRef>
+          <a:fontRef idx="minor">
+            <a:schemeClr val="lt1"/>
+          </a:fontRef>
+        </p:style>
+        <p:txBody>
+          <a:bodyPr rtlCol="0" anchor="ctr"/>
+          <a:lstStyle/>
+          <a:p>
+            <a:pPr algn="ctr"/>
+            <a:r>
+              <a:rPr lang="en-US" sz="800" dirty="0" smtClean="0"/>
+              <a:t>5” pipe</a:t>
+            </a:r>
+            <a:endParaRPr lang="en-US" sz="800" dirty="0"/>
+          </a:p>
+        </p:txBody>
+      </p:sp>
+      <p:grpSp>
+        <p:nvGrpSpPr>
+          <p:cNvPr id="66" name="Group 65"/>
+          <p:cNvGrpSpPr/>
+          <p:nvPr/>
+        </p:nvGrpSpPr>
+        <p:grpSpPr>
+          <a:xfrm rot="5400000">
+            <a:off x="6312872" y="4815024"/>
+            <a:ext cx="628110" cy="468050"/>
+            <a:chOff x="3442007" y="3064407"/>
+            <a:chExt cx="628110" cy="468050"/>
+          </a:xfrm>
+        </p:grpSpPr>
+        <p:grpSp>
+          <p:nvGrpSpPr>
+            <p:cNvPr id="69" name="Group 68"/>
+            <p:cNvGrpSpPr/>
+            <p:nvPr/>
+          </p:nvGrpSpPr>
+          <p:grpSpPr>
+            <a:xfrm rot="16200000">
+              <a:off x="3522037" y="2984377"/>
+              <a:ext cx="468050" cy="628110"/>
+              <a:chOff x="4191000" y="4114800"/>
+              <a:chExt cx="914400" cy="1260470"/>
+            </a:xfrm>
+          </p:grpSpPr>
+          <p:sp>
+            <p:nvSpPr>
+              <p:cNvPr id="73" name="Diamond 72"/>
+              <p:cNvSpPr/>
+              <p:nvPr/>
+            </p:nvSpPr>
+            <p:spPr>
+              <a:xfrm>
+                <a:off x="4191000" y="4267200"/>
+                <a:ext cx="914400" cy="959919"/>
+              </a:xfrm>
+              <a:prstGeom prst="diamond">
+                <a:avLst/>
+              </a:prstGeom>
+              <a:solidFill>
+                <a:schemeClr val="bg1"/>
+              </a:solidFill>
+              <a:ln>
+                <a:solidFill>
+                  <a:schemeClr val="tx1"/>
+                </a:solidFill>
+              </a:ln>
+            </p:spPr>
+            <p:style>
+              <a:lnRef idx="2">
+                <a:schemeClr val="accent1">
+                  <a:shade val="50000"/>
+                </a:schemeClr>
+              </a:lnRef>
+              <a:fillRef idx="1">
+                <a:schemeClr val="accent1"/>
+              </a:fillRef>
+              <a:effectRef idx="0">
+                <a:schemeClr val="accent1"/>
+              </a:effectRef>
+              <a:fontRef idx="minor">
+                <a:schemeClr val="lt1"/>
+              </a:fontRef>
+            </p:style>
+            <p:txBody>
+              <a:bodyPr rtlCol="0" anchor="ctr"/>
+              <a:lstStyle/>
+              <a:p>
+                <a:pPr algn="ctr"/>
+                <a:endParaRPr lang="en-US"/>
+              </a:p>
+            </p:txBody>
+          </p:sp>
+          <p:cxnSp>
+            <p:nvCxnSpPr>
+              <p:cNvPr id="74" name="Straight Connector 73"/>
+              <p:cNvCxnSpPr/>
+              <p:nvPr/>
+            </p:nvCxnSpPr>
+            <p:spPr>
+              <a:xfrm flipV="1">
+                <a:off x="4648200" y="4114800"/>
+                <a:ext cx="0" cy="152400"/>
+              </a:xfrm>
+              <a:prstGeom prst="line">
+                <a:avLst/>
+              </a:prstGeom>
+              <a:ln w="38100">
+                <a:solidFill>
+                  <a:srgbClr val="FFC000"/>
+                </a:solidFill>
+              </a:ln>
+            </p:spPr>
+            <p:style>
+              <a:lnRef idx="1">
+                <a:schemeClr val="accent1"/>
+              </a:lnRef>
+              <a:fillRef idx="0">
+                <a:schemeClr val="accent1"/>
+              </a:fillRef>
+              <a:effectRef idx="0">
+                <a:schemeClr val="accent1"/>
+              </a:effectRef>
+              <a:fontRef idx="minor">
+                <a:schemeClr val="tx1"/>
+              </a:fontRef>
+            </p:style>
+          </p:cxnSp>
+          <p:cxnSp>
+            <p:nvCxnSpPr>
+              <p:cNvPr id="77" name="Straight Connector 76"/>
+              <p:cNvCxnSpPr/>
+              <p:nvPr/>
+            </p:nvCxnSpPr>
+            <p:spPr>
+              <a:xfrm flipV="1">
+                <a:off x="4648200" y="5222870"/>
+                <a:ext cx="0" cy="152400"/>
+              </a:xfrm>
+              <a:prstGeom prst="line">
+                <a:avLst/>
+              </a:prstGeom>
+              <a:ln w="38100">
+                <a:solidFill>
+                  <a:srgbClr val="FFC000"/>
+                </a:solidFill>
+              </a:ln>
+            </p:spPr>
+            <p:style>
+              <a:lnRef idx="1">
+                <a:schemeClr val="accent1"/>
+              </a:lnRef>
+              <a:fillRef idx="0">
+                <a:schemeClr val="accent1"/>
+              </a:fillRef>
+              <a:effectRef idx="0">
+                <a:schemeClr val="accent1"/>
+              </a:effectRef>
+              <a:fontRef idx="minor">
+                <a:schemeClr val="tx1"/>
+              </a:fontRef>
+            </p:style>
+          </p:cxnSp>
+        </p:grpSp>
+        <p:cxnSp>
+          <p:nvCxnSpPr>
+            <p:cNvPr id="72" name="Straight Arrow Connector 71"/>
+            <p:cNvCxnSpPr>
+              <a:stCxn id="73" idx="1"/>
+              <a:endCxn id="73" idx="3"/>
+            </p:cNvCxnSpPr>
+            <p:nvPr/>
+          </p:nvCxnSpPr>
+          <p:spPr>
+            <a:xfrm flipV="1">
+              <a:off x="3757122" y="3064407"/>
+              <a:ext cx="0" cy="468050"/>
+            </a:xfrm>
+            <a:prstGeom prst="straightConnector1">
+              <a:avLst/>
+            </a:prstGeom>
+            <a:ln w="19050">
+              <a:solidFill>
+                <a:schemeClr val="tx1"/>
+              </a:solidFill>
+              <a:prstDash val="dash"/>
+              <a:headEnd type="none"/>
+              <a:tailEnd type="none"/>
+            </a:ln>
+          </p:spPr>
+          <p:style>
+            <a:lnRef idx="1">
+              <a:schemeClr val="accent1"/>
+            </a:lnRef>
+            <a:fillRef idx="0">
+              <a:schemeClr val="accent1"/>
+            </a:fillRef>
+            <a:effectRef idx="0">
+              <a:schemeClr val="accent1"/>
+            </a:effectRef>
+            <a:fontRef idx="minor">
+              <a:schemeClr val="tx1"/>
+            </a:fontRef>
+          </p:style>
+        </p:cxnSp>
+      </p:grpSp>
+      <p:sp>
+        <p:nvSpPr>
+          <p:cNvPr id="82" name="Right Arrow 81"/>
+          <p:cNvSpPr/>
+          <p:nvPr/>
+        </p:nvSpPr>
+        <p:spPr>
+          <a:xfrm rot="1800000">
+            <a:off x="5403568" y="4190624"/>
+            <a:ext cx="1214060" cy="303180"/>
+          </a:xfrm>
+          <a:prstGeom prst="rightArrow">
+            <a:avLst/>
+          </a:prstGeom>
+        </p:spPr>
+        <p:style>
+          <a:lnRef idx="2">
+            <a:schemeClr val="accent1">
+              <a:shade val="50000"/>
+            </a:schemeClr>
+          </a:lnRef>
+          <a:fillRef idx="1">
+            <a:schemeClr val="accent1"/>
+          </a:fillRef>
+          <a:effectRef idx="0">
+            <a:schemeClr val="accent1"/>
+          </a:effectRef>
+          <a:fontRef idx="minor">
+            <a:schemeClr val="lt1"/>
+          </a:fontRef>
+        </p:style>
+        <p:txBody>
+          <a:bodyPr rtlCol="0" anchor="ctr"/>
+          <a:lstStyle/>
+          <a:p>
+            <a:pPr algn="ctr"/>
+            <a:r>
+              <a:rPr lang="en-US" sz="800" dirty="0" smtClean="0"/>
+              <a:t>¾ -16 m &gt; ¾ NPT M</a:t>
+            </a:r>
+            <a:endParaRPr lang="en-US" sz="800" dirty="0"/>
           </a:p>
         </p:txBody>
       </p:sp>

</xml_diff>